<commit_message>
Almost final slides and code
</commit_message>
<xml_diff>
--- a/CaseStudyPresentation.pptx
+++ b/CaseStudyPresentation.pptx
@@ -4,6 +4,9 @@
   <p:sldMasterIdLst>
     <p:sldMasterId id="2147483660" r:id="rId1"/>
   </p:sldMasterIdLst>
+  <p:notesMasterIdLst>
+    <p:notesMasterId r:id="rId8"/>
+  </p:notesMasterIdLst>
   <p:sldIdLst>
     <p:sldId id="263" r:id="rId2"/>
     <p:sldId id="256" r:id="rId3"/>
@@ -110,6 +113,4165 @@
     </a:lvl9pPr>
   </p:defaultTextStyle>
 </p:presentation>
+</file>
+
+<file path=ppt/charts/chart1.xml><?xml version="1.0" encoding="utf-8"?>
+<c:chartSpace xmlns:c="http://schemas.openxmlformats.org/drawingml/2006/chart" xmlns:a="http://schemas.openxmlformats.org/drawingml/2006/main" xmlns:r="http://schemas.openxmlformats.org/officeDocument/2006/relationships">
+  <c:date1904 val="0"/>
+  <c:lang val="en-US"/>
+  <c:roundedCorners val="0"/>
+  <mc:AlternateContent xmlns:mc="http://schemas.openxmlformats.org/markup-compatibility/2006">
+    <mc:Choice xmlns:c14="http://schemas.microsoft.com/office/drawing/2007/8/2/chart" Requires="c14">
+      <c14:style val="118"/>
+    </mc:Choice>
+    <mc:Fallback>
+      <c:style val="18"/>
+    </mc:Fallback>
+  </mc:AlternateContent>
+  <c:chart>
+    <c:title>
+      <c:layout/>
+      <c:overlay val="0"/>
+    </c:title>
+    <c:autoTitleDeleted val="0"/>
+    <c:plotArea>
+      <c:layout/>
+      <c:doughnutChart>
+        <c:varyColors val="1"/>
+        <c:ser>
+          <c:idx val="0"/>
+          <c:order val="0"/>
+          <c:tx>
+            <c:strRef>
+              <c:f>Sheet1!$B$1</c:f>
+              <c:strCache>
+                <c:ptCount val="1"/>
+                <c:pt idx="0">
+                  <c:v>% Cancellation Cause</c:v>
+                </c:pt>
+              </c:strCache>
+            </c:strRef>
+          </c:tx>
+          <c:dLbls>
+            <c:showLegendKey val="0"/>
+            <c:showVal val="1"/>
+            <c:showCatName val="0"/>
+            <c:showSerName val="0"/>
+            <c:showPercent val="0"/>
+            <c:showBubbleSize val="0"/>
+            <c:showLeaderLines val="1"/>
+          </c:dLbls>
+          <c:cat>
+            <c:strRef>
+              <c:f>Sheet1!$A$2:$A$6</c:f>
+              <c:strCache>
+                <c:ptCount val="5"/>
+                <c:pt idx="0">
+                  <c:v>Aircraft Model</c:v>
+                </c:pt>
+                <c:pt idx="1">
+                  <c:v>Airline</c:v>
+                </c:pt>
+                <c:pt idx="2">
+                  <c:v>Airport</c:v>
+                </c:pt>
+                <c:pt idx="3">
+                  <c:v>Other</c:v>
+                </c:pt>
+                <c:pt idx="4">
+                  <c:v>Unknown</c:v>
+                </c:pt>
+              </c:strCache>
+            </c:strRef>
+          </c:cat>
+          <c:val>
+            <c:numRef>
+              <c:f>Sheet1!$B$2:$B$6</c:f>
+              <c:numCache>
+                <c:formatCode>General</c:formatCode>
+                <c:ptCount val="5"/>
+                <c:pt idx="0">
+                  <c:v>55.0</c:v>
+                </c:pt>
+                <c:pt idx="1">
+                  <c:v>21.0</c:v>
+                </c:pt>
+                <c:pt idx="2">
+                  <c:v>8.0</c:v>
+                </c:pt>
+                <c:pt idx="3">
+                  <c:v>4.0</c:v>
+                </c:pt>
+                <c:pt idx="4">
+                  <c:v>14.0</c:v>
+                </c:pt>
+              </c:numCache>
+            </c:numRef>
+          </c:val>
+        </c:ser>
+        <c:dLbls>
+          <c:showLegendKey val="0"/>
+          <c:showVal val="0"/>
+          <c:showCatName val="0"/>
+          <c:showSerName val="0"/>
+          <c:showPercent val="0"/>
+          <c:showBubbleSize val="0"/>
+          <c:showLeaderLines val="1"/>
+        </c:dLbls>
+        <c:firstSliceAng val="0"/>
+        <c:holeSize val="50"/>
+      </c:doughnutChart>
+    </c:plotArea>
+    <c:legend>
+      <c:legendPos val="r"/>
+      <c:layout>
+        <c:manualLayout>
+          <c:xMode val="edge"/>
+          <c:yMode val="edge"/>
+          <c:x val="0.606551563654997"/>
+          <c:y val="0.256816754795967"/>
+          <c:w val="0.365518907823484"/>
+          <c:h val="0.59886432806317"/>
+        </c:manualLayout>
+      </c:layout>
+      <c:overlay val="0"/>
+    </c:legend>
+    <c:plotVisOnly val="1"/>
+    <c:dispBlanksAs val="gap"/>
+    <c:showDLblsOverMax val="0"/>
+  </c:chart>
+  <c:txPr>
+    <a:bodyPr/>
+    <a:lstStyle/>
+    <a:p>
+      <a:pPr>
+        <a:defRPr sz="1800"/>
+      </a:pPr>
+      <a:endParaRPr lang="en-US"/>
+    </a:p>
+  </c:txPr>
+  <c:externalData r:id="rId1">
+    <c:autoUpdate val="0"/>
+  </c:externalData>
+</c:chartSpace>
+</file>
+
+<file path=ppt/diagrams/colors1.xml><?xml version="1.0" encoding="utf-8"?>
+<dgm:colorsDef xmlns:dgm="http://schemas.openxmlformats.org/drawingml/2006/diagram" xmlns:a="http://schemas.openxmlformats.org/drawingml/2006/main" uniqueId="urn:microsoft.com/office/officeart/2005/8/colors/accent1_2">
+  <dgm:title val=""/>
+  <dgm:desc val=""/>
+  <dgm:catLst>
+    <dgm:cat type="accent1" pri="11200"/>
+  </dgm:catLst>
+  <dgm:styleLbl name="node0">
+    <dgm:fillClrLst meth="repeat">
+      <a:schemeClr val="accent1"/>
+    </dgm:fillClrLst>
+    <dgm:linClrLst meth="repeat">
+      <a:schemeClr val="lt1"/>
+    </dgm:linClrLst>
+    <dgm:effectClrLst/>
+    <dgm:txLinClrLst/>
+    <dgm:txFillClrLst/>
+    <dgm:txEffectClrLst/>
+  </dgm:styleLbl>
+  <dgm:styleLbl name="alignNode1">
+    <dgm:fillClrLst meth="repeat">
+      <a:schemeClr val="accent1"/>
+    </dgm:fillClrLst>
+    <dgm:linClrLst meth="repeat">
+      <a:schemeClr val="accent1"/>
+    </dgm:linClrLst>
+    <dgm:effectClrLst/>
+    <dgm:txLinClrLst/>
+    <dgm:txFillClrLst/>
+    <dgm:txEffectClrLst/>
+  </dgm:styleLbl>
+  <dgm:styleLbl name="node1">
+    <dgm:fillClrLst meth="repeat">
+      <a:schemeClr val="accent1"/>
+    </dgm:fillClrLst>
+    <dgm:linClrLst meth="repeat">
+      <a:schemeClr val="lt1"/>
+    </dgm:linClrLst>
+    <dgm:effectClrLst/>
+    <dgm:txLinClrLst/>
+    <dgm:txFillClrLst/>
+    <dgm:txEffectClrLst/>
+  </dgm:styleLbl>
+  <dgm:styleLbl name="lnNode1">
+    <dgm:fillClrLst meth="repeat">
+      <a:schemeClr val="accent1"/>
+    </dgm:fillClrLst>
+    <dgm:linClrLst meth="repeat">
+      <a:schemeClr val="lt1"/>
+    </dgm:linClrLst>
+    <dgm:effectClrLst/>
+    <dgm:txLinClrLst/>
+    <dgm:txFillClrLst/>
+    <dgm:txEffectClrLst/>
+  </dgm:styleLbl>
+  <dgm:styleLbl name="vennNode1">
+    <dgm:fillClrLst meth="repeat">
+      <a:schemeClr val="accent1">
+        <a:alpha val="50000"/>
+      </a:schemeClr>
+    </dgm:fillClrLst>
+    <dgm:linClrLst meth="repeat">
+      <a:schemeClr val="lt1"/>
+    </dgm:linClrLst>
+    <dgm:effectClrLst/>
+    <dgm:txLinClrLst/>
+    <dgm:txFillClrLst/>
+    <dgm:txEffectClrLst/>
+  </dgm:styleLbl>
+  <dgm:styleLbl name="node2">
+    <dgm:fillClrLst meth="repeat">
+      <a:schemeClr val="accent1"/>
+    </dgm:fillClrLst>
+    <dgm:linClrLst meth="repeat">
+      <a:schemeClr val="lt1"/>
+    </dgm:linClrLst>
+    <dgm:effectClrLst/>
+    <dgm:txLinClrLst/>
+    <dgm:txFillClrLst/>
+    <dgm:txEffectClrLst/>
+  </dgm:styleLbl>
+  <dgm:styleLbl name="node3">
+    <dgm:fillClrLst meth="repeat">
+      <a:schemeClr val="accent1"/>
+    </dgm:fillClrLst>
+    <dgm:linClrLst meth="repeat">
+      <a:schemeClr val="lt1"/>
+    </dgm:linClrLst>
+    <dgm:effectClrLst/>
+    <dgm:txLinClrLst/>
+    <dgm:txFillClrLst/>
+    <dgm:txEffectClrLst/>
+  </dgm:styleLbl>
+  <dgm:styleLbl name="node4">
+    <dgm:fillClrLst meth="repeat">
+      <a:schemeClr val="accent1"/>
+    </dgm:fillClrLst>
+    <dgm:linClrLst meth="repeat">
+      <a:schemeClr val="lt1"/>
+    </dgm:linClrLst>
+    <dgm:effectClrLst/>
+    <dgm:txLinClrLst/>
+    <dgm:txFillClrLst/>
+    <dgm:txEffectClrLst/>
+  </dgm:styleLbl>
+  <dgm:styleLbl name="fgImgPlace1">
+    <dgm:fillClrLst meth="repeat">
+      <a:schemeClr val="accent1">
+        <a:tint val="50000"/>
+      </a:schemeClr>
+    </dgm:fillClrLst>
+    <dgm:linClrLst meth="repeat">
+      <a:schemeClr val="lt1"/>
+    </dgm:linClrLst>
+    <dgm:effectClrLst/>
+    <dgm:txLinClrLst/>
+    <dgm:txFillClrLst meth="repeat">
+      <a:schemeClr val="lt1"/>
+    </dgm:txFillClrLst>
+    <dgm:txEffectClrLst/>
+  </dgm:styleLbl>
+  <dgm:styleLbl name="alignImgPlace1">
+    <dgm:fillClrLst meth="repeat">
+      <a:schemeClr val="accent1">
+        <a:tint val="50000"/>
+      </a:schemeClr>
+    </dgm:fillClrLst>
+    <dgm:linClrLst meth="repeat">
+      <a:schemeClr val="lt1"/>
+    </dgm:linClrLst>
+    <dgm:effectClrLst/>
+    <dgm:txLinClrLst/>
+    <dgm:txFillClrLst meth="repeat">
+      <a:schemeClr val="lt1"/>
+    </dgm:txFillClrLst>
+    <dgm:txEffectClrLst/>
+  </dgm:styleLbl>
+  <dgm:styleLbl name="bgImgPlace1">
+    <dgm:fillClrLst meth="repeat">
+      <a:schemeClr val="accent1">
+        <a:tint val="50000"/>
+      </a:schemeClr>
+    </dgm:fillClrLst>
+    <dgm:linClrLst meth="repeat">
+      <a:schemeClr val="lt1"/>
+    </dgm:linClrLst>
+    <dgm:effectClrLst/>
+    <dgm:txLinClrLst/>
+    <dgm:txFillClrLst meth="repeat">
+      <a:schemeClr val="lt1"/>
+    </dgm:txFillClrLst>
+    <dgm:txEffectClrLst/>
+  </dgm:styleLbl>
+  <dgm:styleLbl name="sibTrans2D1">
+    <dgm:fillClrLst meth="repeat">
+      <a:schemeClr val="accent1">
+        <a:tint val="60000"/>
+      </a:schemeClr>
+    </dgm:fillClrLst>
+    <dgm:linClrLst meth="repeat">
+      <a:schemeClr val="accent1">
+        <a:tint val="60000"/>
+      </a:schemeClr>
+    </dgm:linClrLst>
+    <dgm:effectClrLst/>
+    <dgm:txLinClrLst/>
+    <dgm:txFillClrLst/>
+    <dgm:txEffectClrLst/>
+  </dgm:styleLbl>
+  <dgm:styleLbl name="fgSibTrans2D1">
+    <dgm:fillClrLst meth="repeat">
+      <a:schemeClr val="accent1">
+        <a:tint val="60000"/>
+      </a:schemeClr>
+    </dgm:fillClrLst>
+    <dgm:linClrLst meth="repeat">
+      <a:schemeClr val="accent1">
+        <a:tint val="60000"/>
+      </a:schemeClr>
+    </dgm:linClrLst>
+    <dgm:effectClrLst/>
+    <dgm:txLinClrLst/>
+    <dgm:txFillClrLst/>
+    <dgm:txEffectClrLst/>
+  </dgm:styleLbl>
+  <dgm:styleLbl name="bgSibTrans2D1">
+    <dgm:fillClrLst meth="repeat">
+      <a:schemeClr val="accent1">
+        <a:tint val="60000"/>
+      </a:schemeClr>
+    </dgm:fillClrLst>
+    <dgm:linClrLst meth="repeat">
+      <a:schemeClr val="accent1">
+        <a:tint val="60000"/>
+      </a:schemeClr>
+    </dgm:linClrLst>
+    <dgm:effectClrLst/>
+    <dgm:txLinClrLst/>
+    <dgm:txFillClrLst/>
+    <dgm:txEffectClrLst/>
+  </dgm:styleLbl>
+  <dgm:styleLbl name="sibTrans1D1">
+    <dgm:fillClrLst meth="repeat">
+      <a:schemeClr val="accent1"/>
+    </dgm:fillClrLst>
+    <dgm:linClrLst meth="repeat">
+      <a:schemeClr val="accent1"/>
+    </dgm:linClrLst>
+    <dgm:effectClrLst/>
+    <dgm:txLinClrLst/>
+    <dgm:txFillClrLst meth="repeat">
+      <a:schemeClr val="tx1"/>
+    </dgm:txFillClrLst>
+    <dgm:txEffectClrLst/>
+  </dgm:styleLbl>
+  <dgm:styleLbl name="callout">
+    <dgm:fillClrLst meth="repeat">
+      <a:schemeClr val="accent1"/>
+    </dgm:fillClrLst>
+    <dgm:linClrLst meth="repeat">
+      <a:schemeClr val="accent1">
+        <a:tint val="50000"/>
+      </a:schemeClr>
+    </dgm:linClrLst>
+    <dgm:effectClrLst/>
+    <dgm:txLinClrLst/>
+    <dgm:txFillClrLst meth="repeat">
+      <a:schemeClr val="tx1"/>
+    </dgm:txFillClrLst>
+    <dgm:txEffectClrLst/>
+  </dgm:styleLbl>
+  <dgm:styleLbl name="asst0">
+    <dgm:fillClrLst meth="repeat">
+      <a:schemeClr val="accent1"/>
+    </dgm:fillClrLst>
+    <dgm:linClrLst meth="repeat">
+      <a:schemeClr val="lt1"/>
+    </dgm:linClrLst>
+    <dgm:effectClrLst/>
+    <dgm:txLinClrLst/>
+    <dgm:txFillClrLst/>
+    <dgm:txEffectClrLst/>
+  </dgm:styleLbl>
+  <dgm:styleLbl name="asst1">
+    <dgm:fillClrLst meth="repeat">
+      <a:schemeClr val="accent1"/>
+    </dgm:fillClrLst>
+    <dgm:linClrLst meth="repeat">
+      <a:schemeClr val="lt1"/>
+    </dgm:linClrLst>
+    <dgm:effectClrLst/>
+    <dgm:txLinClrLst/>
+    <dgm:txFillClrLst/>
+    <dgm:txEffectClrLst/>
+  </dgm:styleLbl>
+  <dgm:styleLbl name="asst2">
+    <dgm:fillClrLst meth="repeat">
+      <a:schemeClr val="accent1"/>
+    </dgm:fillClrLst>
+    <dgm:linClrLst meth="repeat">
+      <a:schemeClr val="lt1"/>
+    </dgm:linClrLst>
+    <dgm:effectClrLst/>
+    <dgm:txLinClrLst/>
+    <dgm:txFillClrLst/>
+    <dgm:txEffectClrLst/>
+  </dgm:styleLbl>
+  <dgm:styleLbl name="asst3">
+    <dgm:fillClrLst meth="repeat">
+      <a:schemeClr val="accent1"/>
+    </dgm:fillClrLst>
+    <dgm:linClrLst meth="repeat">
+      <a:schemeClr val="lt1"/>
+    </dgm:linClrLst>
+    <dgm:effectClrLst/>
+    <dgm:txLinClrLst/>
+    <dgm:txFillClrLst/>
+    <dgm:txEffectClrLst/>
+  </dgm:styleLbl>
+  <dgm:styleLbl name="asst4">
+    <dgm:fillClrLst meth="repeat">
+      <a:schemeClr val="accent1"/>
+    </dgm:fillClrLst>
+    <dgm:linClrLst meth="repeat">
+      <a:schemeClr val="lt1"/>
+    </dgm:linClrLst>
+    <dgm:effectClrLst/>
+    <dgm:txLinClrLst/>
+    <dgm:txFillClrLst/>
+    <dgm:txEffectClrLst/>
+  </dgm:styleLbl>
+  <dgm:styleLbl name="parChTrans2D1">
+    <dgm:fillClrLst meth="repeat">
+      <a:schemeClr val="accent1">
+        <a:tint val="60000"/>
+      </a:schemeClr>
+    </dgm:fillClrLst>
+    <dgm:linClrLst meth="repeat">
+      <a:schemeClr val="accent1">
+        <a:tint val="60000"/>
+      </a:schemeClr>
+    </dgm:linClrLst>
+    <dgm:effectClrLst/>
+    <dgm:txLinClrLst/>
+    <dgm:txFillClrLst meth="repeat">
+      <a:schemeClr val="lt1"/>
+    </dgm:txFillClrLst>
+    <dgm:txEffectClrLst/>
+  </dgm:styleLbl>
+  <dgm:styleLbl name="parChTrans2D2">
+    <dgm:fillClrLst meth="repeat">
+      <a:schemeClr val="accent1"/>
+    </dgm:fillClrLst>
+    <dgm:linClrLst meth="repeat">
+      <a:schemeClr val="accent1"/>
+    </dgm:linClrLst>
+    <dgm:effectClrLst/>
+    <dgm:txLinClrLst/>
+    <dgm:txFillClrLst meth="repeat">
+      <a:schemeClr val="lt1"/>
+    </dgm:txFillClrLst>
+    <dgm:txEffectClrLst/>
+  </dgm:styleLbl>
+  <dgm:styleLbl name="parChTrans2D3">
+    <dgm:fillClrLst meth="repeat">
+      <a:schemeClr val="accent1"/>
+    </dgm:fillClrLst>
+    <dgm:linClrLst meth="repeat">
+      <a:schemeClr val="accent1"/>
+    </dgm:linClrLst>
+    <dgm:effectClrLst/>
+    <dgm:txLinClrLst/>
+    <dgm:txFillClrLst meth="repeat">
+      <a:schemeClr val="lt1"/>
+    </dgm:txFillClrLst>
+    <dgm:txEffectClrLst/>
+  </dgm:styleLbl>
+  <dgm:styleLbl name="parChTrans2D4">
+    <dgm:fillClrLst meth="repeat">
+      <a:schemeClr val="accent1"/>
+    </dgm:fillClrLst>
+    <dgm:linClrLst meth="repeat">
+      <a:schemeClr val="accent1"/>
+    </dgm:linClrLst>
+    <dgm:effectClrLst/>
+    <dgm:txLinClrLst/>
+    <dgm:txFillClrLst meth="repeat">
+      <a:schemeClr val="lt1"/>
+    </dgm:txFillClrLst>
+    <dgm:txEffectClrLst/>
+  </dgm:styleLbl>
+  <dgm:styleLbl name="parChTrans1D1">
+    <dgm:fillClrLst meth="repeat">
+      <a:schemeClr val="accent1"/>
+    </dgm:fillClrLst>
+    <dgm:linClrLst meth="repeat">
+      <a:schemeClr val="accent1">
+        <a:shade val="60000"/>
+      </a:schemeClr>
+    </dgm:linClrLst>
+    <dgm:effectClrLst/>
+    <dgm:txLinClrLst/>
+    <dgm:txFillClrLst meth="repeat">
+      <a:schemeClr val="tx1"/>
+    </dgm:txFillClrLst>
+    <dgm:txEffectClrLst/>
+  </dgm:styleLbl>
+  <dgm:styleLbl name="parChTrans1D2">
+    <dgm:fillClrLst meth="repeat">
+      <a:schemeClr val="accent1"/>
+    </dgm:fillClrLst>
+    <dgm:linClrLst meth="repeat">
+      <a:schemeClr val="accent1">
+        <a:shade val="60000"/>
+      </a:schemeClr>
+    </dgm:linClrLst>
+    <dgm:effectClrLst/>
+    <dgm:txLinClrLst/>
+    <dgm:txFillClrLst meth="repeat">
+      <a:schemeClr val="tx1"/>
+    </dgm:txFillClrLst>
+    <dgm:txEffectClrLst/>
+  </dgm:styleLbl>
+  <dgm:styleLbl name="parChTrans1D3">
+    <dgm:fillClrLst meth="repeat">
+      <a:schemeClr val="accent1"/>
+    </dgm:fillClrLst>
+    <dgm:linClrLst meth="repeat">
+      <a:schemeClr val="accent1">
+        <a:shade val="80000"/>
+      </a:schemeClr>
+    </dgm:linClrLst>
+    <dgm:effectClrLst/>
+    <dgm:txLinClrLst/>
+    <dgm:txFillClrLst meth="repeat">
+      <a:schemeClr val="tx1"/>
+    </dgm:txFillClrLst>
+    <dgm:txEffectClrLst/>
+  </dgm:styleLbl>
+  <dgm:styleLbl name="parChTrans1D4">
+    <dgm:fillClrLst meth="repeat">
+      <a:schemeClr val="accent1"/>
+    </dgm:fillClrLst>
+    <dgm:linClrLst meth="repeat">
+      <a:schemeClr val="accent1">
+        <a:shade val="80000"/>
+      </a:schemeClr>
+    </dgm:linClrLst>
+    <dgm:effectClrLst/>
+    <dgm:txLinClrLst/>
+    <dgm:txFillClrLst meth="repeat">
+      <a:schemeClr val="tx1"/>
+    </dgm:txFillClrLst>
+    <dgm:txEffectClrLst/>
+  </dgm:styleLbl>
+  <dgm:styleLbl name="fgAcc1">
+    <dgm:fillClrLst meth="repeat">
+      <a:schemeClr val="lt1">
+        <a:alpha val="90000"/>
+      </a:schemeClr>
+    </dgm:fillClrLst>
+    <dgm:linClrLst meth="repeat">
+      <a:schemeClr val="accent1"/>
+    </dgm:linClrLst>
+    <dgm:effectClrLst/>
+    <dgm:txLinClrLst/>
+    <dgm:txFillClrLst meth="repeat">
+      <a:schemeClr val="dk1"/>
+    </dgm:txFillClrLst>
+    <dgm:txEffectClrLst/>
+  </dgm:styleLbl>
+  <dgm:styleLbl name="conFgAcc1">
+    <dgm:fillClrLst meth="repeat">
+      <a:schemeClr val="lt1">
+        <a:alpha val="90000"/>
+      </a:schemeClr>
+    </dgm:fillClrLst>
+    <dgm:linClrLst meth="repeat">
+      <a:schemeClr val="accent1"/>
+    </dgm:linClrLst>
+    <dgm:effectClrLst/>
+    <dgm:txLinClrLst/>
+    <dgm:txFillClrLst meth="repeat">
+      <a:schemeClr val="dk1"/>
+    </dgm:txFillClrLst>
+    <dgm:txEffectClrLst/>
+  </dgm:styleLbl>
+  <dgm:styleLbl name="alignAcc1">
+    <dgm:fillClrLst meth="repeat">
+      <a:schemeClr val="lt1">
+        <a:alpha val="90000"/>
+      </a:schemeClr>
+    </dgm:fillClrLst>
+    <dgm:linClrLst meth="repeat">
+      <a:schemeClr val="accent1"/>
+    </dgm:linClrLst>
+    <dgm:effectClrLst/>
+    <dgm:txLinClrLst/>
+    <dgm:txFillClrLst meth="repeat">
+      <a:schemeClr val="dk1"/>
+    </dgm:txFillClrLst>
+    <dgm:txEffectClrLst/>
+  </dgm:styleLbl>
+  <dgm:styleLbl name="trAlignAcc1">
+    <dgm:fillClrLst meth="repeat">
+      <a:schemeClr val="lt1">
+        <a:alpha val="40000"/>
+      </a:schemeClr>
+    </dgm:fillClrLst>
+    <dgm:linClrLst meth="repeat">
+      <a:schemeClr val="accent1"/>
+    </dgm:linClrLst>
+    <dgm:effectClrLst/>
+    <dgm:txLinClrLst/>
+    <dgm:txFillClrLst meth="repeat">
+      <a:schemeClr val="dk1"/>
+    </dgm:txFillClrLst>
+    <dgm:txEffectClrLst/>
+  </dgm:styleLbl>
+  <dgm:styleLbl name="bgAcc1">
+    <dgm:fillClrLst meth="repeat">
+      <a:schemeClr val="lt1">
+        <a:alpha val="90000"/>
+      </a:schemeClr>
+    </dgm:fillClrLst>
+    <dgm:linClrLst meth="repeat">
+      <a:schemeClr val="accent1"/>
+    </dgm:linClrLst>
+    <dgm:effectClrLst/>
+    <dgm:txLinClrLst/>
+    <dgm:txFillClrLst meth="repeat">
+      <a:schemeClr val="dk1"/>
+    </dgm:txFillClrLst>
+    <dgm:txEffectClrLst/>
+  </dgm:styleLbl>
+  <dgm:styleLbl name="solidFgAcc1">
+    <dgm:fillClrLst meth="repeat">
+      <a:schemeClr val="lt1"/>
+    </dgm:fillClrLst>
+    <dgm:linClrLst meth="repeat">
+      <a:schemeClr val="accent1"/>
+    </dgm:linClrLst>
+    <dgm:effectClrLst/>
+    <dgm:txLinClrLst/>
+    <dgm:txFillClrLst meth="repeat">
+      <a:schemeClr val="dk1"/>
+    </dgm:txFillClrLst>
+    <dgm:txEffectClrLst/>
+  </dgm:styleLbl>
+  <dgm:styleLbl name="solidAlignAcc1">
+    <dgm:fillClrLst meth="repeat">
+      <a:schemeClr val="lt1"/>
+    </dgm:fillClrLst>
+    <dgm:linClrLst meth="repeat">
+      <a:schemeClr val="accent1"/>
+    </dgm:linClrLst>
+    <dgm:effectClrLst/>
+    <dgm:txLinClrLst/>
+    <dgm:txFillClrLst meth="repeat">
+      <a:schemeClr val="dk1"/>
+    </dgm:txFillClrLst>
+    <dgm:txEffectClrLst/>
+  </dgm:styleLbl>
+  <dgm:styleLbl name="solidBgAcc1">
+    <dgm:fillClrLst meth="repeat">
+      <a:schemeClr val="lt1"/>
+    </dgm:fillClrLst>
+    <dgm:linClrLst meth="repeat">
+      <a:schemeClr val="accent1"/>
+    </dgm:linClrLst>
+    <dgm:effectClrLst/>
+    <dgm:txLinClrLst/>
+    <dgm:txFillClrLst meth="repeat">
+      <a:schemeClr val="dk1"/>
+    </dgm:txFillClrLst>
+    <dgm:txEffectClrLst/>
+  </dgm:styleLbl>
+  <dgm:styleLbl name="fgAccFollowNode1">
+    <dgm:fillClrLst meth="repeat">
+      <a:schemeClr val="accent1">
+        <a:alpha val="90000"/>
+        <a:tint val="40000"/>
+      </a:schemeClr>
+    </dgm:fillClrLst>
+    <dgm:linClrLst meth="repeat">
+      <a:schemeClr val="accent1">
+        <a:alpha val="90000"/>
+        <a:tint val="40000"/>
+      </a:schemeClr>
+    </dgm:linClrLst>
+    <dgm:effectClrLst/>
+    <dgm:txLinClrLst/>
+    <dgm:txFillClrLst meth="repeat">
+      <a:schemeClr val="dk1"/>
+    </dgm:txFillClrLst>
+    <dgm:txEffectClrLst/>
+  </dgm:styleLbl>
+  <dgm:styleLbl name="alignAccFollowNode1">
+    <dgm:fillClrLst meth="repeat">
+      <a:schemeClr val="accent1">
+        <a:alpha val="90000"/>
+        <a:tint val="40000"/>
+      </a:schemeClr>
+    </dgm:fillClrLst>
+    <dgm:linClrLst meth="repeat">
+      <a:schemeClr val="accent1">
+        <a:alpha val="90000"/>
+        <a:tint val="40000"/>
+      </a:schemeClr>
+    </dgm:linClrLst>
+    <dgm:effectClrLst/>
+    <dgm:txLinClrLst/>
+    <dgm:txFillClrLst meth="repeat">
+      <a:schemeClr val="dk1"/>
+    </dgm:txFillClrLst>
+    <dgm:txEffectClrLst/>
+  </dgm:styleLbl>
+  <dgm:styleLbl name="bgAccFollowNode1">
+    <dgm:fillClrLst meth="repeat">
+      <a:schemeClr val="accent1">
+        <a:alpha val="90000"/>
+        <a:tint val="40000"/>
+      </a:schemeClr>
+    </dgm:fillClrLst>
+    <dgm:linClrLst meth="repeat">
+      <a:schemeClr val="accent1">
+        <a:alpha val="90000"/>
+        <a:tint val="40000"/>
+      </a:schemeClr>
+    </dgm:linClrLst>
+    <dgm:effectClrLst/>
+    <dgm:txLinClrLst/>
+    <dgm:txFillClrLst meth="repeat">
+      <a:schemeClr val="dk1"/>
+    </dgm:txFillClrLst>
+    <dgm:txEffectClrLst/>
+  </dgm:styleLbl>
+  <dgm:styleLbl name="fgAcc0">
+    <dgm:fillClrLst meth="repeat">
+      <a:schemeClr val="lt1">
+        <a:alpha val="90000"/>
+      </a:schemeClr>
+    </dgm:fillClrLst>
+    <dgm:linClrLst meth="repeat">
+      <a:schemeClr val="accent1"/>
+    </dgm:linClrLst>
+    <dgm:effectClrLst/>
+    <dgm:txLinClrLst/>
+    <dgm:txFillClrLst meth="repeat">
+      <a:schemeClr val="dk1"/>
+    </dgm:txFillClrLst>
+    <dgm:txEffectClrLst/>
+  </dgm:styleLbl>
+  <dgm:styleLbl name="fgAcc2">
+    <dgm:fillClrLst meth="repeat">
+      <a:schemeClr val="lt1">
+        <a:alpha val="90000"/>
+      </a:schemeClr>
+    </dgm:fillClrLst>
+    <dgm:linClrLst meth="repeat">
+      <a:schemeClr val="accent1"/>
+    </dgm:linClrLst>
+    <dgm:effectClrLst/>
+    <dgm:txLinClrLst/>
+    <dgm:txFillClrLst meth="repeat">
+      <a:schemeClr val="dk1"/>
+    </dgm:txFillClrLst>
+    <dgm:txEffectClrLst/>
+  </dgm:styleLbl>
+  <dgm:styleLbl name="fgAcc3">
+    <dgm:fillClrLst meth="repeat">
+      <a:schemeClr val="lt1">
+        <a:alpha val="90000"/>
+      </a:schemeClr>
+    </dgm:fillClrLst>
+    <dgm:linClrLst meth="repeat">
+      <a:schemeClr val="accent1"/>
+    </dgm:linClrLst>
+    <dgm:effectClrLst/>
+    <dgm:txLinClrLst/>
+    <dgm:txFillClrLst meth="repeat">
+      <a:schemeClr val="dk1"/>
+    </dgm:txFillClrLst>
+    <dgm:txEffectClrLst/>
+  </dgm:styleLbl>
+  <dgm:styleLbl name="fgAcc4">
+    <dgm:fillClrLst meth="repeat">
+      <a:schemeClr val="lt1">
+        <a:alpha val="90000"/>
+      </a:schemeClr>
+    </dgm:fillClrLst>
+    <dgm:linClrLst meth="repeat">
+      <a:schemeClr val="accent1"/>
+    </dgm:linClrLst>
+    <dgm:effectClrLst/>
+    <dgm:txLinClrLst/>
+    <dgm:txFillClrLst meth="repeat">
+      <a:schemeClr val="dk1"/>
+    </dgm:txFillClrLst>
+    <dgm:txEffectClrLst/>
+  </dgm:styleLbl>
+  <dgm:styleLbl name="bgShp">
+    <dgm:fillClrLst meth="repeat">
+      <a:schemeClr val="accent1">
+        <a:tint val="40000"/>
+      </a:schemeClr>
+    </dgm:fillClrLst>
+    <dgm:linClrLst meth="repeat">
+      <a:schemeClr val="accent1"/>
+    </dgm:linClrLst>
+    <dgm:effectClrLst/>
+    <dgm:txLinClrLst/>
+    <dgm:txFillClrLst meth="repeat">
+      <a:schemeClr val="dk1"/>
+    </dgm:txFillClrLst>
+    <dgm:txEffectClrLst/>
+  </dgm:styleLbl>
+  <dgm:styleLbl name="dkBgShp">
+    <dgm:fillClrLst meth="repeat">
+      <a:schemeClr val="accent1">
+        <a:shade val="80000"/>
+      </a:schemeClr>
+    </dgm:fillClrLst>
+    <dgm:linClrLst meth="repeat">
+      <a:schemeClr val="accent1"/>
+    </dgm:linClrLst>
+    <dgm:effectClrLst/>
+    <dgm:txLinClrLst/>
+    <dgm:txFillClrLst meth="repeat">
+      <a:schemeClr val="lt1"/>
+    </dgm:txFillClrLst>
+    <dgm:txEffectClrLst/>
+  </dgm:styleLbl>
+  <dgm:styleLbl name="trBgShp">
+    <dgm:fillClrLst meth="repeat">
+      <a:schemeClr val="accent1">
+        <a:tint val="50000"/>
+        <a:alpha val="40000"/>
+      </a:schemeClr>
+    </dgm:fillClrLst>
+    <dgm:linClrLst meth="repeat">
+      <a:schemeClr val="accent1"/>
+    </dgm:linClrLst>
+    <dgm:effectClrLst/>
+    <dgm:txLinClrLst/>
+    <dgm:txFillClrLst meth="repeat">
+      <a:schemeClr val="lt1"/>
+    </dgm:txFillClrLst>
+    <dgm:txEffectClrLst/>
+  </dgm:styleLbl>
+  <dgm:styleLbl name="fgShp">
+    <dgm:fillClrLst meth="repeat">
+      <a:schemeClr val="accent1">
+        <a:tint val="60000"/>
+      </a:schemeClr>
+    </dgm:fillClrLst>
+    <dgm:linClrLst meth="repeat">
+      <a:schemeClr val="lt1"/>
+    </dgm:linClrLst>
+    <dgm:effectClrLst/>
+    <dgm:txLinClrLst/>
+    <dgm:txFillClrLst meth="repeat">
+      <a:schemeClr val="dk1"/>
+    </dgm:txFillClrLst>
+    <dgm:txEffectClrLst/>
+  </dgm:styleLbl>
+  <dgm:styleLbl name="revTx">
+    <dgm:fillClrLst meth="repeat">
+      <a:schemeClr val="lt1">
+        <a:alpha val="0"/>
+      </a:schemeClr>
+    </dgm:fillClrLst>
+    <dgm:linClrLst meth="repeat">
+      <a:schemeClr val="dk1">
+        <a:alpha val="0"/>
+      </a:schemeClr>
+    </dgm:linClrLst>
+    <dgm:effectClrLst/>
+    <dgm:txLinClrLst/>
+    <dgm:txFillClrLst meth="repeat">
+      <a:schemeClr val="tx1"/>
+    </dgm:txFillClrLst>
+    <dgm:txEffectClrLst/>
+  </dgm:styleLbl>
+</dgm:colorsDef>
+</file>
+
+<file path=ppt/diagrams/data1.xml><?xml version="1.0" encoding="utf-8"?>
+<dgm:dataModel xmlns:dgm="http://schemas.openxmlformats.org/drawingml/2006/diagram" xmlns:a="http://schemas.openxmlformats.org/drawingml/2006/main">
+  <dgm:ptLst>
+    <dgm:pt modelId="{CB043929-D75F-7645-B97E-47DA82CBFB62}" type="doc">
+      <dgm:prSet loTypeId="urn:microsoft.com/office/officeart/2005/8/layout/radial4" loCatId="" qsTypeId="urn:microsoft.com/office/officeart/2005/8/quickstyle/simple4" qsCatId="simple" csTypeId="urn:microsoft.com/office/officeart/2005/8/colors/accent1_2" csCatId="accent1" phldr="1"/>
+      <dgm:spPr/>
+      <dgm:t>
+        <a:bodyPr/>
+        <a:lstStyle/>
+        <a:p>
+          <a:endParaRPr lang="en-US"/>
+        </a:p>
+      </dgm:t>
+    </dgm:pt>
+    <dgm:pt modelId="{F84BC6B2-6544-F341-8315-BF10641E397B}">
+      <dgm:prSet/>
+      <dgm:spPr/>
+      <dgm:t>
+        <a:bodyPr/>
+        <a:lstStyle/>
+        <a:p>
+          <a:pPr rtl="0"/>
+          <a:r>
+            <a:rPr lang="en-US" smtClean="0"/>
+            <a:t>Consider carefully</a:t>
+          </a:r>
+          <a:endParaRPr lang="en-US"/>
+        </a:p>
+      </dgm:t>
+    </dgm:pt>
+    <dgm:pt modelId="{A15B75FC-2507-7949-B653-B3F9C46CE9EB}" type="parTrans" cxnId="{A43FB8EB-80BC-B74C-80F1-74924C22311A}">
+      <dgm:prSet/>
+      <dgm:spPr/>
+      <dgm:t>
+        <a:bodyPr/>
+        <a:lstStyle/>
+        <a:p>
+          <a:endParaRPr lang="en-US"/>
+        </a:p>
+      </dgm:t>
+    </dgm:pt>
+    <dgm:pt modelId="{F8C2CF69-6629-D644-99D3-15AFC10DB2AF}" type="sibTrans" cxnId="{A43FB8EB-80BC-B74C-80F1-74924C22311A}">
+      <dgm:prSet/>
+      <dgm:spPr/>
+      <dgm:t>
+        <a:bodyPr/>
+        <a:lstStyle/>
+        <a:p>
+          <a:endParaRPr lang="en-US"/>
+        </a:p>
+      </dgm:t>
+    </dgm:pt>
+    <dgm:pt modelId="{103C3735-D34A-244B-B1E6-52F77DFE0524}">
+      <dgm:prSet/>
+      <dgm:spPr/>
+      <dgm:t>
+        <a:bodyPr/>
+        <a:lstStyle/>
+        <a:p>
+          <a:pPr rtl="0"/>
+          <a:r>
+            <a:rPr lang="en-US" smtClean="0"/>
+            <a:t>The airline that will operate your customer’s flight</a:t>
+          </a:r>
+          <a:endParaRPr lang="en-US"/>
+        </a:p>
+      </dgm:t>
+    </dgm:pt>
+    <dgm:pt modelId="{F1CD2443-2EE5-DE40-946E-F639D0089575}" type="parTrans" cxnId="{36470E74-A029-0E43-BB4F-0453B470898A}">
+      <dgm:prSet/>
+      <dgm:spPr/>
+      <dgm:t>
+        <a:bodyPr/>
+        <a:lstStyle/>
+        <a:p>
+          <a:endParaRPr lang="en-US"/>
+        </a:p>
+      </dgm:t>
+    </dgm:pt>
+    <dgm:pt modelId="{E717B430-9B35-1340-A721-9B7CC9E7EF73}" type="sibTrans" cxnId="{36470E74-A029-0E43-BB4F-0453B470898A}">
+      <dgm:prSet/>
+      <dgm:spPr/>
+      <dgm:t>
+        <a:bodyPr/>
+        <a:lstStyle/>
+        <a:p>
+          <a:endParaRPr lang="en-US"/>
+        </a:p>
+      </dgm:t>
+    </dgm:pt>
+    <dgm:pt modelId="{61188121-0149-CF49-9F2A-8D7DA66114B5}">
+      <dgm:prSet/>
+      <dgm:spPr/>
+      <dgm:t>
+        <a:bodyPr/>
+        <a:lstStyle/>
+        <a:p>
+          <a:pPr rtl="0"/>
+          <a:r>
+            <a:rPr lang="en-US" smtClean="0"/>
+            <a:t>The model of the aircraft that they will be flying in</a:t>
+          </a:r>
+          <a:endParaRPr lang="en-US"/>
+        </a:p>
+      </dgm:t>
+    </dgm:pt>
+    <dgm:pt modelId="{2A033920-EDBF-6340-BCDC-5A97215724E3}" type="parTrans" cxnId="{7093566A-C944-CD4F-8272-FC0AB5943932}">
+      <dgm:prSet/>
+      <dgm:spPr/>
+      <dgm:t>
+        <a:bodyPr/>
+        <a:lstStyle/>
+        <a:p>
+          <a:endParaRPr lang="en-US"/>
+        </a:p>
+      </dgm:t>
+    </dgm:pt>
+    <dgm:pt modelId="{B8EEF7A6-43A7-4B4E-9514-565DC68BDDE8}" type="sibTrans" cxnId="{7093566A-C944-CD4F-8272-FC0AB5943932}">
+      <dgm:prSet/>
+      <dgm:spPr/>
+      <dgm:t>
+        <a:bodyPr/>
+        <a:lstStyle/>
+        <a:p>
+          <a:endParaRPr lang="en-US"/>
+        </a:p>
+      </dgm:t>
+    </dgm:pt>
+    <dgm:pt modelId="{BA4A4DE6-8A16-6D44-90EB-1CB3DBE34A35}">
+      <dgm:prSet/>
+      <dgm:spPr/>
+      <dgm:t>
+        <a:bodyPr/>
+        <a:lstStyle/>
+        <a:p>
+          <a:pPr rtl="0"/>
+          <a:r>
+            <a:rPr lang="en-US" dirty="0" smtClean="0"/>
+            <a:t>The origin and destination airport</a:t>
+          </a:r>
+          <a:endParaRPr lang="en-US" dirty="0"/>
+        </a:p>
+      </dgm:t>
+    </dgm:pt>
+    <dgm:pt modelId="{6EBFFEFD-0A87-BE47-9DF7-1FF03D6F0662}" type="parTrans" cxnId="{F5588F66-D28B-5C46-AA59-BB2D18302763}">
+      <dgm:prSet/>
+      <dgm:spPr/>
+      <dgm:t>
+        <a:bodyPr/>
+        <a:lstStyle/>
+        <a:p>
+          <a:endParaRPr lang="en-US"/>
+        </a:p>
+      </dgm:t>
+    </dgm:pt>
+    <dgm:pt modelId="{12463954-8317-0F40-A148-A144656C8FE8}" type="sibTrans" cxnId="{F5588F66-D28B-5C46-AA59-BB2D18302763}">
+      <dgm:prSet/>
+      <dgm:spPr/>
+      <dgm:t>
+        <a:bodyPr/>
+        <a:lstStyle/>
+        <a:p>
+          <a:endParaRPr lang="en-US"/>
+        </a:p>
+      </dgm:t>
+    </dgm:pt>
+    <dgm:pt modelId="{61DFA804-1803-EC46-8AFD-8AA23F819AF1}">
+      <dgm:prSet/>
+      <dgm:spPr/>
+      <dgm:t>
+        <a:bodyPr/>
+        <a:lstStyle/>
+        <a:p>
+          <a:pPr rtl="0"/>
+          <a:r>
+            <a:rPr lang="en-US" dirty="0" smtClean="0"/>
+            <a:t>Long range weather forecasts</a:t>
+          </a:r>
+          <a:endParaRPr lang="en-US" dirty="0"/>
+        </a:p>
+      </dgm:t>
+    </dgm:pt>
+    <dgm:pt modelId="{CF95CB62-C1C8-C046-A6A5-22891E0361C9}" type="parTrans" cxnId="{9CE89C70-76B4-2241-939B-ED8F6ECFDAA1}">
+      <dgm:prSet/>
+      <dgm:spPr/>
+      <dgm:t>
+        <a:bodyPr/>
+        <a:lstStyle/>
+        <a:p>
+          <a:endParaRPr lang="en-US"/>
+        </a:p>
+      </dgm:t>
+    </dgm:pt>
+    <dgm:pt modelId="{C45C0424-328F-6049-B74A-BD2705F31E30}" type="sibTrans" cxnId="{9CE89C70-76B4-2241-939B-ED8F6ECFDAA1}">
+      <dgm:prSet/>
+      <dgm:spPr/>
+      <dgm:t>
+        <a:bodyPr/>
+        <a:lstStyle/>
+        <a:p>
+          <a:endParaRPr lang="en-US"/>
+        </a:p>
+      </dgm:t>
+    </dgm:pt>
+    <dgm:pt modelId="{020D0830-D55D-F84E-92B9-964691138509}">
+      <dgm:prSet/>
+      <dgm:spPr/>
+      <dgm:t>
+        <a:bodyPr/>
+        <a:lstStyle/>
+        <a:p>
+          <a:pPr rtl="0"/>
+          <a:r>
+            <a:rPr lang="en-US" dirty="0" smtClean="0"/>
+            <a:t>Seasonal factors</a:t>
+          </a:r>
+          <a:endParaRPr lang="en-US" dirty="0"/>
+        </a:p>
+      </dgm:t>
+    </dgm:pt>
+    <dgm:pt modelId="{05A012A5-D8F1-E241-9904-CED3CF8A2D8A}" type="parTrans" cxnId="{D8E1838F-F2A1-674D-8523-5E7256CFF1F4}">
+      <dgm:prSet/>
+      <dgm:spPr/>
+      <dgm:t>
+        <a:bodyPr/>
+        <a:lstStyle/>
+        <a:p>
+          <a:endParaRPr lang="en-US"/>
+        </a:p>
+      </dgm:t>
+    </dgm:pt>
+    <dgm:pt modelId="{C100DD2E-1696-5D42-B436-BEB4C856ADC5}" type="sibTrans" cxnId="{D8E1838F-F2A1-674D-8523-5E7256CFF1F4}">
+      <dgm:prSet/>
+      <dgm:spPr/>
+      <dgm:t>
+        <a:bodyPr/>
+        <a:lstStyle/>
+        <a:p>
+          <a:endParaRPr lang="en-US"/>
+        </a:p>
+      </dgm:t>
+    </dgm:pt>
+    <dgm:pt modelId="{CFF8D64B-87A3-A745-9C2C-373FA064A6E7}" type="pres">
+      <dgm:prSet presAssocID="{CB043929-D75F-7645-B97E-47DA82CBFB62}" presName="cycle" presStyleCnt="0">
+        <dgm:presLayoutVars>
+          <dgm:chMax val="1"/>
+          <dgm:dir/>
+          <dgm:animLvl val="ctr"/>
+          <dgm:resizeHandles val="exact"/>
+        </dgm:presLayoutVars>
+      </dgm:prSet>
+      <dgm:spPr/>
+    </dgm:pt>
+    <dgm:pt modelId="{7A4E3F55-D067-4840-BF00-13DFBFF4872F}" type="pres">
+      <dgm:prSet presAssocID="{F84BC6B2-6544-F341-8315-BF10641E397B}" presName="centerShape" presStyleLbl="node0" presStyleIdx="0" presStyleCnt="1"/>
+      <dgm:spPr/>
+    </dgm:pt>
+    <dgm:pt modelId="{FA6F56ED-1FAF-9C44-B9DB-8FB602AF2B4A}" type="pres">
+      <dgm:prSet presAssocID="{F1CD2443-2EE5-DE40-946E-F639D0089575}" presName="parTrans" presStyleLbl="bgSibTrans2D1" presStyleIdx="0" presStyleCnt="5"/>
+      <dgm:spPr/>
+    </dgm:pt>
+    <dgm:pt modelId="{6E17DAF6-F013-684C-9B80-7FCB343F36B3}" type="pres">
+      <dgm:prSet presAssocID="{103C3735-D34A-244B-B1E6-52F77DFE0524}" presName="node" presStyleLbl="node1" presStyleIdx="0" presStyleCnt="5">
+        <dgm:presLayoutVars>
+          <dgm:bulletEnabled val="1"/>
+        </dgm:presLayoutVars>
+      </dgm:prSet>
+      <dgm:spPr/>
+    </dgm:pt>
+    <dgm:pt modelId="{BBF8A350-7B23-1347-9A4D-0D0801DD22DD}" type="pres">
+      <dgm:prSet presAssocID="{2A033920-EDBF-6340-BCDC-5A97215724E3}" presName="parTrans" presStyleLbl="bgSibTrans2D1" presStyleIdx="1" presStyleCnt="5"/>
+      <dgm:spPr/>
+    </dgm:pt>
+    <dgm:pt modelId="{163BD269-E582-154A-8E4F-CC07B87B2396}" type="pres">
+      <dgm:prSet presAssocID="{61188121-0149-CF49-9F2A-8D7DA66114B5}" presName="node" presStyleLbl="node1" presStyleIdx="1" presStyleCnt="5">
+        <dgm:presLayoutVars>
+          <dgm:bulletEnabled val="1"/>
+        </dgm:presLayoutVars>
+      </dgm:prSet>
+      <dgm:spPr/>
+    </dgm:pt>
+    <dgm:pt modelId="{C1FFF8C4-7FEF-FA46-AD40-CF3B65E28326}" type="pres">
+      <dgm:prSet presAssocID="{6EBFFEFD-0A87-BE47-9DF7-1FF03D6F0662}" presName="parTrans" presStyleLbl="bgSibTrans2D1" presStyleIdx="2" presStyleCnt="5"/>
+      <dgm:spPr/>
+    </dgm:pt>
+    <dgm:pt modelId="{EAACD24D-7FD7-5C45-A629-68E82AB1AE08}" type="pres">
+      <dgm:prSet presAssocID="{BA4A4DE6-8A16-6D44-90EB-1CB3DBE34A35}" presName="node" presStyleLbl="node1" presStyleIdx="2" presStyleCnt="5">
+        <dgm:presLayoutVars>
+          <dgm:bulletEnabled val="1"/>
+        </dgm:presLayoutVars>
+      </dgm:prSet>
+      <dgm:spPr/>
+      <dgm:t>
+        <a:bodyPr/>
+        <a:lstStyle/>
+        <a:p>
+          <a:endParaRPr lang="en-US"/>
+        </a:p>
+      </dgm:t>
+    </dgm:pt>
+    <dgm:pt modelId="{F576E38B-9087-D747-8966-E716FA4A803F}" type="pres">
+      <dgm:prSet presAssocID="{05A012A5-D8F1-E241-9904-CED3CF8A2D8A}" presName="parTrans" presStyleLbl="bgSibTrans2D1" presStyleIdx="3" presStyleCnt="5"/>
+      <dgm:spPr/>
+    </dgm:pt>
+    <dgm:pt modelId="{59FFC04D-89F6-434B-8544-6B3B192E821F}" type="pres">
+      <dgm:prSet presAssocID="{020D0830-D55D-F84E-92B9-964691138509}" presName="node" presStyleLbl="node1" presStyleIdx="3" presStyleCnt="5">
+        <dgm:presLayoutVars>
+          <dgm:bulletEnabled val="1"/>
+        </dgm:presLayoutVars>
+      </dgm:prSet>
+      <dgm:spPr/>
+      <dgm:t>
+        <a:bodyPr/>
+        <a:lstStyle/>
+        <a:p>
+          <a:endParaRPr lang="en-US"/>
+        </a:p>
+      </dgm:t>
+    </dgm:pt>
+    <dgm:pt modelId="{C6D53F4B-CCD0-0646-8423-4A8B01223E51}" type="pres">
+      <dgm:prSet presAssocID="{CF95CB62-C1C8-C046-A6A5-22891E0361C9}" presName="parTrans" presStyleLbl="bgSibTrans2D1" presStyleIdx="4" presStyleCnt="5"/>
+      <dgm:spPr/>
+    </dgm:pt>
+    <dgm:pt modelId="{AED10C36-196C-DC40-8282-184DF90E130D}" type="pres">
+      <dgm:prSet presAssocID="{61DFA804-1803-EC46-8AFD-8AA23F819AF1}" presName="node" presStyleLbl="node1" presStyleIdx="4" presStyleCnt="5">
+        <dgm:presLayoutVars>
+          <dgm:bulletEnabled val="1"/>
+        </dgm:presLayoutVars>
+      </dgm:prSet>
+      <dgm:spPr/>
+      <dgm:t>
+        <a:bodyPr/>
+        <a:lstStyle/>
+        <a:p>
+          <a:endParaRPr lang="en-US"/>
+        </a:p>
+      </dgm:t>
+    </dgm:pt>
+  </dgm:ptLst>
+  <dgm:cxnLst>
+    <dgm:cxn modelId="{8A5E740A-849A-E246-83D3-1E8A2F704B84}" type="presOf" srcId="{CB043929-D75F-7645-B97E-47DA82CBFB62}" destId="{CFF8D64B-87A3-A745-9C2C-373FA064A6E7}" srcOrd="0" destOrd="0" presId="urn:microsoft.com/office/officeart/2005/8/layout/radial4"/>
+    <dgm:cxn modelId="{67D25ADE-5DD3-DE41-9426-6FD27245C97F}" type="presOf" srcId="{05A012A5-D8F1-E241-9904-CED3CF8A2D8A}" destId="{F576E38B-9087-D747-8966-E716FA4A803F}" srcOrd="0" destOrd="0" presId="urn:microsoft.com/office/officeart/2005/8/layout/radial4"/>
+    <dgm:cxn modelId="{E3D05887-368C-ED4D-B054-0564D6DD976E}" type="presOf" srcId="{020D0830-D55D-F84E-92B9-964691138509}" destId="{59FFC04D-89F6-434B-8544-6B3B192E821F}" srcOrd="0" destOrd="0" presId="urn:microsoft.com/office/officeart/2005/8/layout/radial4"/>
+    <dgm:cxn modelId="{F5588F66-D28B-5C46-AA59-BB2D18302763}" srcId="{F84BC6B2-6544-F341-8315-BF10641E397B}" destId="{BA4A4DE6-8A16-6D44-90EB-1CB3DBE34A35}" srcOrd="2" destOrd="0" parTransId="{6EBFFEFD-0A87-BE47-9DF7-1FF03D6F0662}" sibTransId="{12463954-8317-0F40-A148-A144656C8FE8}"/>
+    <dgm:cxn modelId="{EF625DC0-1941-9249-BC8B-95B49170FA5B}" type="presOf" srcId="{BA4A4DE6-8A16-6D44-90EB-1CB3DBE34A35}" destId="{EAACD24D-7FD7-5C45-A629-68E82AB1AE08}" srcOrd="0" destOrd="0" presId="urn:microsoft.com/office/officeart/2005/8/layout/radial4"/>
+    <dgm:cxn modelId="{16D9A0B5-A001-D046-A690-B22D065BBD51}" type="presOf" srcId="{6EBFFEFD-0A87-BE47-9DF7-1FF03D6F0662}" destId="{C1FFF8C4-7FEF-FA46-AD40-CF3B65E28326}" srcOrd="0" destOrd="0" presId="urn:microsoft.com/office/officeart/2005/8/layout/radial4"/>
+    <dgm:cxn modelId="{42BD6580-E599-1B42-9CF4-E876A0BAF0CD}" type="presOf" srcId="{F1CD2443-2EE5-DE40-946E-F639D0089575}" destId="{FA6F56ED-1FAF-9C44-B9DB-8FB602AF2B4A}" srcOrd="0" destOrd="0" presId="urn:microsoft.com/office/officeart/2005/8/layout/radial4"/>
+    <dgm:cxn modelId="{D8E1838F-F2A1-674D-8523-5E7256CFF1F4}" srcId="{F84BC6B2-6544-F341-8315-BF10641E397B}" destId="{020D0830-D55D-F84E-92B9-964691138509}" srcOrd="3" destOrd="0" parTransId="{05A012A5-D8F1-E241-9904-CED3CF8A2D8A}" sibTransId="{C100DD2E-1696-5D42-B436-BEB4C856ADC5}"/>
+    <dgm:cxn modelId="{42B4604D-0935-A745-AECF-4246EB93E394}" type="presOf" srcId="{103C3735-D34A-244B-B1E6-52F77DFE0524}" destId="{6E17DAF6-F013-684C-9B80-7FCB343F36B3}" srcOrd="0" destOrd="0" presId="urn:microsoft.com/office/officeart/2005/8/layout/radial4"/>
+    <dgm:cxn modelId="{D9783984-67FB-A143-9FB5-48E051A3B3DF}" type="presOf" srcId="{F84BC6B2-6544-F341-8315-BF10641E397B}" destId="{7A4E3F55-D067-4840-BF00-13DFBFF4872F}" srcOrd="0" destOrd="0" presId="urn:microsoft.com/office/officeart/2005/8/layout/radial4"/>
+    <dgm:cxn modelId="{9CE89C70-76B4-2241-939B-ED8F6ECFDAA1}" srcId="{F84BC6B2-6544-F341-8315-BF10641E397B}" destId="{61DFA804-1803-EC46-8AFD-8AA23F819AF1}" srcOrd="4" destOrd="0" parTransId="{CF95CB62-C1C8-C046-A6A5-22891E0361C9}" sibTransId="{C45C0424-328F-6049-B74A-BD2705F31E30}"/>
+    <dgm:cxn modelId="{EE388C0F-0E43-3541-9E48-310AC905B59F}" type="presOf" srcId="{CF95CB62-C1C8-C046-A6A5-22891E0361C9}" destId="{C6D53F4B-CCD0-0646-8423-4A8B01223E51}" srcOrd="0" destOrd="0" presId="urn:microsoft.com/office/officeart/2005/8/layout/radial4"/>
+    <dgm:cxn modelId="{7093566A-C944-CD4F-8272-FC0AB5943932}" srcId="{F84BC6B2-6544-F341-8315-BF10641E397B}" destId="{61188121-0149-CF49-9F2A-8D7DA66114B5}" srcOrd="1" destOrd="0" parTransId="{2A033920-EDBF-6340-BCDC-5A97215724E3}" sibTransId="{B8EEF7A6-43A7-4B4E-9514-565DC68BDDE8}"/>
+    <dgm:cxn modelId="{36470E74-A029-0E43-BB4F-0453B470898A}" srcId="{F84BC6B2-6544-F341-8315-BF10641E397B}" destId="{103C3735-D34A-244B-B1E6-52F77DFE0524}" srcOrd="0" destOrd="0" parTransId="{F1CD2443-2EE5-DE40-946E-F639D0089575}" sibTransId="{E717B430-9B35-1340-A721-9B7CC9E7EF73}"/>
+    <dgm:cxn modelId="{7DBCCC45-09EC-D347-8331-CF89FAC72AB1}" type="presOf" srcId="{61188121-0149-CF49-9F2A-8D7DA66114B5}" destId="{163BD269-E582-154A-8E4F-CC07B87B2396}" srcOrd="0" destOrd="0" presId="urn:microsoft.com/office/officeart/2005/8/layout/radial4"/>
+    <dgm:cxn modelId="{A43FB8EB-80BC-B74C-80F1-74924C22311A}" srcId="{CB043929-D75F-7645-B97E-47DA82CBFB62}" destId="{F84BC6B2-6544-F341-8315-BF10641E397B}" srcOrd="0" destOrd="0" parTransId="{A15B75FC-2507-7949-B653-B3F9C46CE9EB}" sibTransId="{F8C2CF69-6629-D644-99D3-15AFC10DB2AF}"/>
+    <dgm:cxn modelId="{7514FAD0-9E44-3D41-9F99-FBE57282ADB5}" type="presOf" srcId="{61DFA804-1803-EC46-8AFD-8AA23F819AF1}" destId="{AED10C36-196C-DC40-8282-184DF90E130D}" srcOrd="0" destOrd="0" presId="urn:microsoft.com/office/officeart/2005/8/layout/radial4"/>
+    <dgm:cxn modelId="{85C30496-0493-6A4A-9D87-2EE8D5CC7B0C}" type="presOf" srcId="{2A033920-EDBF-6340-BCDC-5A97215724E3}" destId="{BBF8A350-7B23-1347-9A4D-0D0801DD22DD}" srcOrd="0" destOrd="0" presId="urn:microsoft.com/office/officeart/2005/8/layout/radial4"/>
+    <dgm:cxn modelId="{E935735A-9038-2142-9CFC-D1764D31F550}" type="presParOf" srcId="{CFF8D64B-87A3-A745-9C2C-373FA064A6E7}" destId="{7A4E3F55-D067-4840-BF00-13DFBFF4872F}" srcOrd="0" destOrd="0" presId="urn:microsoft.com/office/officeart/2005/8/layout/radial4"/>
+    <dgm:cxn modelId="{D45424D6-A2D4-6C4F-8EDC-6D976E3A9CF5}" type="presParOf" srcId="{CFF8D64B-87A3-A745-9C2C-373FA064A6E7}" destId="{FA6F56ED-1FAF-9C44-B9DB-8FB602AF2B4A}" srcOrd="1" destOrd="0" presId="urn:microsoft.com/office/officeart/2005/8/layout/radial4"/>
+    <dgm:cxn modelId="{BD65EA11-113F-3444-8FB8-426FA7E8D118}" type="presParOf" srcId="{CFF8D64B-87A3-A745-9C2C-373FA064A6E7}" destId="{6E17DAF6-F013-684C-9B80-7FCB343F36B3}" srcOrd="2" destOrd="0" presId="urn:microsoft.com/office/officeart/2005/8/layout/radial4"/>
+    <dgm:cxn modelId="{983F311E-AA83-5744-B98F-1670FF907AFE}" type="presParOf" srcId="{CFF8D64B-87A3-A745-9C2C-373FA064A6E7}" destId="{BBF8A350-7B23-1347-9A4D-0D0801DD22DD}" srcOrd="3" destOrd="0" presId="urn:microsoft.com/office/officeart/2005/8/layout/radial4"/>
+    <dgm:cxn modelId="{AF7EE5BA-4711-574A-9826-0E57D187F6D1}" type="presParOf" srcId="{CFF8D64B-87A3-A745-9C2C-373FA064A6E7}" destId="{163BD269-E582-154A-8E4F-CC07B87B2396}" srcOrd="4" destOrd="0" presId="urn:microsoft.com/office/officeart/2005/8/layout/radial4"/>
+    <dgm:cxn modelId="{B612FC03-EAB7-2B4C-84AF-42904633FE50}" type="presParOf" srcId="{CFF8D64B-87A3-A745-9C2C-373FA064A6E7}" destId="{C1FFF8C4-7FEF-FA46-AD40-CF3B65E28326}" srcOrd="5" destOrd="0" presId="urn:microsoft.com/office/officeart/2005/8/layout/radial4"/>
+    <dgm:cxn modelId="{3C48A4FB-7E18-2149-AD86-5366DAC850C3}" type="presParOf" srcId="{CFF8D64B-87A3-A745-9C2C-373FA064A6E7}" destId="{EAACD24D-7FD7-5C45-A629-68E82AB1AE08}" srcOrd="6" destOrd="0" presId="urn:microsoft.com/office/officeart/2005/8/layout/radial4"/>
+    <dgm:cxn modelId="{86014A00-92CD-694D-B0C4-EE865A7BD092}" type="presParOf" srcId="{CFF8D64B-87A3-A745-9C2C-373FA064A6E7}" destId="{F576E38B-9087-D747-8966-E716FA4A803F}" srcOrd="7" destOrd="0" presId="urn:microsoft.com/office/officeart/2005/8/layout/radial4"/>
+    <dgm:cxn modelId="{55AC69B0-439B-D542-8748-8EE4DB014375}" type="presParOf" srcId="{CFF8D64B-87A3-A745-9C2C-373FA064A6E7}" destId="{59FFC04D-89F6-434B-8544-6B3B192E821F}" srcOrd="8" destOrd="0" presId="urn:microsoft.com/office/officeart/2005/8/layout/radial4"/>
+    <dgm:cxn modelId="{F24DE202-D495-E542-80B5-3A41EC8F20A4}" type="presParOf" srcId="{CFF8D64B-87A3-A745-9C2C-373FA064A6E7}" destId="{C6D53F4B-CCD0-0646-8423-4A8B01223E51}" srcOrd="9" destOrd="0" presId="urn:microsoft.com/office/officeart/2005/8/layout/radial4"/>
+    <dgm:cxn modelId="{8FD89769-90AA-3242-B7FA-A8ED78B21BBA}" type="presParOf" srcId="{CFF8D64B-87A3-A745-9C2C-373FA064A6E7}" destId="{AED10C36-196C-DC40-8282-184DF90E130D}" srcOrd="10" destOrd="0" presId="urn:microsoft.com/office/officeart/2005/8/layout/radial4"/>
+  </dgm:cxnLst>
+  <dgm:bg/>
+  <dgm:whole/>
+  <dgm:extLst>
+    <a:ext uri="http://schemas.microsoft.com/office/drawing/2008/diagram">
+      <dsp:dataModelExt xmlns:dsp="http://schemas.microsoft.com/office/drawing/2008/diagram" relId="rId6" minVer="http://schemas.openxmlformats.org/drawingml/2006/diagram"/>
+    </a:ext>
+  </dgm:extLst>
+</dgm:dataModel>
+</file>
+
+<file path=ppt/diagrams/drawing1.xml><?xml version="1.0" encoding="utf-8"?>
+<dsp:drawing xmlns:dgm="http://schemas.openxmlformats.org/drawingml/2006/diagram" xmlns:dsp="http://schemas.microsoft.com/office/drawing/2008/diagram" xmlns:a="http://schemas.openxmlformats.org/drawingml/2006/main">
+  <dsp:spTree>
+    <dsp:nvGrpSpPr>
+      <dsp:cNvPr id="0" name=""/>
+      <dsp:cNvGrpSpPr/>
+    </dsp:nvGrpSpPr>
+    <dsp:grpSpPr/>
+    <dsp:sp modelId="{7A4E3F55-D067-4840-BF00-13DFBFF4872F}">
+      <dsp:nvSpPr>
+        <dsp:cNvPr id="0" name=""/>
+        <dsp:cNvSpPr/>
+      </dsp:nvSpPr>
+      <dsp:spPr>
+        <a:xfrm>
+          <a:off x="3136386" y="1876440"/>
+          <a:ext cx="1390091" cy="1390091"/>
+        </a:xfrm>
+        <a:prstGeom prst="ellipse">
+          <a:avLst/>
+        </a:prstGeom>
+        <a:gradFill rotWithShape="0">
+          <a:gsLst>
+            <a:gs pos="0">
+              <a:schemeClr val="accent1">
+                <a:hueOff val="0"/>
+                <a:satOff val="0"/>
+                <a:lumOff val="0"/>
+                <a:alphaOff val="0"/>
+                <a:tint val="50000"/>
+                <a:shade val="100000"/>
+                <a:alpha val="100000"/>
+                <a:satMod val="150000"/>
+              </a:schemeClr>
+            </a:gs>
+            <a:gs pos="40000">
+              <a:schemeClr val="accent1">
+                <a:hueOff val="0"/>
+                <a:satOff val="0"/>
+                <a:lumOff val="0"/>
+                <a:alphaOff val="0"/>
+                <a:tint val="70000"/>
+                <a:shade val="100000"/>
+                <a:alpha val="100000"/>
+                <a:satMod val="150000"/>
+              </a:schemeClr>
+            </a:gs>
+            <a:gs pos="100000">
+              <a:schemeClr val="accent1">
+                <a:hueOff val="0"/>
+                <a:satOff val="0"/>
+                <a:lumOff val="0"/>
+                <a:alphaOff val="0"/>
+                <a:shade val="90000"/>
+                <a:satMod val="110000"/>
+              </a:schemeClr>
+            </a:gs>
+          </a:gsLst>
+          <a:lin ang="5400000" scaled="0"/>
+        </a:gradFill>
+        <a:ln>
+          <a:noFill/>
+        </a:ln>
+        <a:effectLst>
+          <a:outerShdw blurRad="88900" dist="50800" dir="11400000" sx="102000" sy="101000" algn="tl" rotWithShape="0">
+            <a:srgbClr val="000000">
+              <a:alpha val="35000"/>
+            </a:srgbClr>
+          </a:outerShdw>
+        </a:effectLst>
+        <a:scene3d>
+          <a:camera prst="perspectiveFront" fov="4800000"/>
+          <a:lightRig rig="morning" dir="tl"/>
+        </a:scene3d>
+        <a:sp3d prstMaterial="softmetal">
+          <a:bevelT w="0" h="0"/>
+        </a:sp3d>
+      </dsp:spPr>
+      <dsp:style>
+        <a:lnRef idx="0">
+          <a:scrgbClr r="0" g="0" b="0"/>
+        </a:lnRef>
+        <a:fillRef idx="3">
+          <a:scrgbClr r="0" g="0" b="0"/>
+        </a:fillRef>
+        <a:effectRef idx="2">
+          <a:scrgbClr r="0" g="0" b="0"/>
+        </a:effectRef>
+        <a:fontRef idx="minor">
+          <a:schemeClr val="lt1"/>
+        </a:fontRef>
+      </dsp:style>
+      <dsp:txBody>
+        <a:bodyPr spcFirstLastPara="0" vert="horz" wrap="square" lIns="12065" tIns="12065" rIns="12065" bIns="12065" numCol="1" spcCol="1270" anchor="ctr" anchorCtr="0">
+          <a:noAutofit/>
+        </a:bodyPr>
+        <a:lstStyle/>
+        <a:p>
+          <a:pPr lvl="0" algn="ctr" defTabSz="844550" rtl="0">
+            <a:lnSpc>
+              <a:spcPct val="90000"/>
+            </a:lnSpc>
+            <a:spcBef>
+              <a:spcPct val="0"/>
+            </a:spcBef>
+            <a:spcAft>
+              <a:spcPct val="35000"/>
+            </a:spcAft>
+          </a:pPr>
+          <a:r>
+            <a:rPr lang="en-US" sz="1900" kern="1200" smtClean="0"/>
+            <a:t>Consider carefully</a:t>
+          </a:r>
+          <a:endParaRPr lang="en-US" sz="1900" kern="1200"/>
+        </a:p>
+      </dsp:txBody>
+      <dsp:txXfrm>
+        <a:off x="3339960" y="2080014"/>
+        <a:ext cx="982943" cy="982943"/>
+      </dsp:txXfrm>
+    </dsp:sp>
+    <dsp:sp modelId="{FA6F56ED-1FAF-9C44-B9DB-8FB602AF2B4A}">
+      <dsp:nvSpPr>
+        <dsp:cNvPr id="0" name=""/>
+        <dsp:cNvSpPr/>
+      </dsp:nvSpPr>
+      <dsp:spPr>
+        <a:xfrm rot="10800000">
+          <a:off x="1788817" y="2373398"/>
+          <a:ext cx="1273452" cy="396176"/>
+        </a:xfrm>
+        <a:prstGeom prst="leftArrow">
+          <a:avLst>
+            <a:gd name="adj1" fmla="val 60000"/>
+            <a:gd name="adj2" fmla="val 50000"/>
+          </a:avLst>
+        </a:prstGeom>
+        <a:gradFill rotWithShape="0">
+          <a:gsLst>
+            <a:gs pos="0">
+              <a:schemeClr val="accent1">
+                <a:tint val="60000"/>
+                <a:hueOff val="0"/>
+                <a:satOff val="0"/>
+                <a:lumOff val="0"/>
+                <a:alphaOff val="0"/>
+                <a:tint val="50000"/>
+                <a:shade val="100000"/>
+                <a:alpha val="100000"/>
+                <a:satMod val="150000"/>
+              </a:schemeClr>
+            </a:gs>
+            <a:gs pos="40000">
+              <a:schemeClr val="accent1">
+                <a:tint val="60000"/>
+                <a:hueOff val="0"/>
+                <a:satOff val="0"/>
+                <a:lumOff val="0"/>
+                <a:alphaOff val="0"/>
+                <a:tint val="70000"/>
+                <a:shade val="100000"/>
+                <a:alpha val="100000"/>
+                <a:satMod val="150000"/>
+              </a:schemeClr>
+            </a:gs>
+            <a:gs pos="100000">
+              <a:schemeClr val="accent1">
+                <a:tint val="60000"/>
+                <a:hueOff val="0"/>
+                <a:satOff val="0"/>
+                <a:lumOff val="0"/>
+                <a:alphaOff val="0"/>
+                <a:shade val="90000"/>
+                <a:satMod val="110000"/>
+              </a:schemeClr>
+            </a:gs>
+          </a:gsLst>
+          <a:lin ang="5400000" scaled="0"/>
+        </a:gradFill>
+        <a:ln>
+          <a:noFill/>
+        </a:ln>
+        <a:effectLst>
+          <a:outerShdw blurRad="88900" dist="50800" dir="11400000" sx="102000" sy="101000" algn="tl" rotWithShape="0">
+            <a:srgbClr val="000000">
+              <a:alpha val="35000"/>
+            </a:srgbClr>
+          </a:outerShdw>
+        </a:effectLst>
+        <a:scene3d>
+          <a:camera prst="perspectiveFront" fov="4800000"/>
+          <a:lightRig rig="morning" dir="tl"/>
+        </a:scene3d>
+        <a:sp3d prstMaterial="softmetal">
+          <a:bevelT w="0" h="0"/>
+        </a:sp3d>
+      </dsp:spPr>
+      <dsp:style>
+        <a:lnRef idx="0">
+          <a:scrgbClr r="0" g="0" b="0"/>
+        </a:lnRef>
+        <a:fillRef idx="3">
+          <a:scrgbClr r="0" g="0" b="0"/>
+        </a:fillRef>
+        <a:effectRef idx="2">
+          <a:scrgbClr r="0" g="0" b="0"/>
+        </a:effectRef>
+        <a:fontRef idx="minor">
+          <a:schemeClr val="lt1"/>
+        </a:fontRef>
+      </dsp:style>
+    </dsp:sp>
+    <dsp:sp modelId="{6E17DAF6-F013-684C-9B80-7FCB343F36B3}">
+      <dsp:nvSpPr>
+        <dsp:cNvPr id="0" name=""/>
+        <dsp:cNvSpPr/>
+      </dsp:nvSpPr>
+      <dsp:spPr>
+        <a:xfrm>
+          <a:off x="1128524" y="2043251"/>
+          <a:ext cx="1320586" cy="1056469"/>
+        </a:xfrm>
+        <a:prstGeom prst="roundRect">
+          <a:avLst>
+            <a:gd name="adj" fmla="val 10000"/>
+          </a:avLst>
+        </a:prstGeom>
+        <a:gradFill rotWithShape="0">
+          <a:gsLst>
+            <a:gs pos="0">
+              <a:schemeClr val="accent1">
+                <a:hueOff val="0"/>
+                <a:satOff val="0"/>
+                <a:lumOff val="0"/>
+                <a:alphaOff val="0"/>
+                <a:tint val="50000"/>
+                <a:shade val="100000"/>
+                <a:alpha val="100000"/>
+                <a:satMod val="150000"/>
+              </a:schemeClr>
+            </a:gs>
+            <a:gs pos="40000">
+              <a:schemeClr val="accent1">
+                <a:hueOff val="0"/>
+                <a:satOff val="0"/>
+                <a:lumOff val="0"/>
+                <a:alphaOff val="0"/>
+                <a:tint val="70000"/>
+                <a:shade val="100000"/>
+                <a:alpha val="100000"/>
+                <a:satMod val="150000"/>
+              </a:schemeClr>
+            </a:gs>
+            <a:gs pos="100000">
+              <a:schemeClr val="accent1">
+                <a:hueOff val="0"/>
+                <a:satOff val="0"/>
+                <a:lumOff val="0"/>
+                <a:alphaOff val="0"/>
+                <a:shade val="90000"/>
+                <a:satMod val="110000"/>
+              </a:schemeClr>
+            </a:gs>
+          </a:gsLst>
+          <a:lin ang="5400000" scaled="0"/>
+        </a:gradFill>
+        <a:ln>
+          <a:noFill/>
+        </a:ln>
+        <a:effectLst>
+          <a:outerShdw blurRad="88900" dist="50800" dir="11400000" sx="102000" sy="101000" algn="tl" rotWithShape="0">
+            <a:srgbClr val="000000">
+              <a:alpha val="35000"/>
+            </a:srgbClr>
+          </a:outerShdw>
+        </a:effectLst>
+        <a:scene3d>
+          <a:camera prst="perspectiveFront" fov="4800000"/>
+          <a:lightRig rig="morning" dir="tl"/>
+        </a:scene3d>
+        <a:sp3d prstMaterial="softmetal">
+          <a:bevelT w="0" h="0"/>
+        </a:sp3d>
+      </dsp:spPr>
+      <dsp:style>
+        <a:lnRef idx="0">
+          <a:scrgbClr r="0" g="0" b="0"/>
+        </a:lnRef>
+        <a:fillRef idx="3">
+          <a:scrgbClr r="0" g="0" b="0"/>
+        </a:fillRef>
+        <a:effectRef idx="2">
+          <a:scrgbClr r="0" g="0" b="0"/>
+        </a:effectRef>
+        <a:fontRef idx="minor">
+          <a:schemeClr val="lt1"/>
+        </a:fontRef>
+      </dsp:style>
+      <dsp:txBody>
+        <a:bodyPr spcFirstLastPara="0" vert="horz" wrap="square" lIns="26670" tIns="26670" rIns="26670" bIns="26670" numCol="1" spcCol="1270" anchor="ctr" anchorCtr="0">
+          <a:noAutofit/>
+        </a:bodyPr>
+        <a:lstStyle/>
+        <a:p>
+          <a:pPr lvl="0" algn="ctr" defTabSz="622300" rtl="0">
+            <a:lnSpc>
+              <a:spcPct val="90000"/>
+            </a:lnSpc>
+            <a:spcBef>
+              <a:spcPct val="0"/>
+            </a:spcBef>
+            <a:spcAft>
+              <a:spcPct val="35000"/>
+            </a:spcAft>
+          </a:pPr>
+          <a:r>
+            <a:rPr lang="en-US" sz="1400" kern="1200" smtClean="0"/>
+            <a:t>The airline that will operate your customer’s flight</a:t>
+          </a:r>
+          <a:endParaRPr lang="en-US" sz="1400" kern="1200"/>
+        </a:p>
+      </dsp:txBody>
+      <dsp:txXfrm>
+        <a:off x="1159467" y="2074194"/>
+        <a:ext cx="1258700" cy="994583"/>
+      </dsp:txXfrm>
+    </dsp:sp>
+    <dsp:sp modelId="{BBF8A350-7B23-1347-9A4D-0D0801DD22DD}">
+      <dsp:nvSpPr>
+        <dsp:cNvPr id="0" name=""/>
+        <dsp:cNvSpPr/>
+      </dsp:nvSpPr>
+      <dsp:spPr>
+        <a:xfrm rot="13500000">
+          <a:off x="2200592" y="1379285"/>
+          <a:ext cx="1273452" cy="396176"/>
+        </a:xfrm>
+        <a:prstGeom prst="leftArrow">
+          <a:avLst>
+            <a:gd name="adj1" fmla="val 60000"/>
+            <a:gd name="adj2" fmla="val 50000"/>
+          </a:avLst>
+        </a:prstGeom>
+        <a:gradFill rotWithShape="0">
+          <a:gsLst>
+            <a:gs pos="0">
+              <a:schemeClr val="accent1">
+                <a:tint val="60000"/>
+                <a:hueOff val="0"/>
+                <a:satOff val="0"/>
+                <a:lumOff val="0"/>
+                <a:alphaOff val="0"/>
+                <a:tint val="50000"/>
+                <a:shade val="100000"/>
+                <a:alpha val="100000"/>
+                <a:satMod val="150000"/>
+              </a:schemeClr>
+            </a:gs>
+            <a:gs pos="40000">
+              <a:schemeClr val="accent1">
+                <a:tint val="60000"/>
+                <a:hueOff val="0"/>
+                <a:satOff val="0"/>
+                <a:lumOff val="0"/>
+                <a:alphaOff val="0"/>
+                <a:tint val="70000"/>
+                <a:shade val="100000"/>
+                <a:alpha val="100000"/>
+                <a:satMod val="150000"/>
+              </a:schemeClr>
+            </a:gs>
+            <a:gs pos="100000">
+              <a:schemeClr val="accent1">
+                <a:tint val="60000"/>
+                <a:hueOff val="0"/>
+                <a:satOff val="0"/>
+                <a:lumOff val="0"/>
+                <a:alphaOff val="0"/>
+                <a:shade val="90000"/>
+                <a:satMod val="110000"/>
+              </a:schemeClr>
+            </a:gs>
+          </a:gsLst>
+          <a:lin ang="5400000" scaled="0"/>
+        </a:gradFill>
+        <a:ln>
+          <a:noFill/>
+        </a:ln>
+        <a:effectLst>
+          <a:outerShdw blurRad="88900" dist="50800" dir="11400000" sx="102000" sy="101000" algn="tl" rotWithShape="0">
+            <a:srgbClr val="000000">
+              <a:alpha val="35000"/>
+            </a:srgbClr>
+          </a:outerShdw>
+        </a:effectLst>
+        <a:scene3d>
+          <a:camera prst="perspectiveFront" fov="4800000"/>
+          <a:lightRig rig="morning" dir="tl"/>
+        </a:scene3d>
+        <a:sp3d prstMaterial="softmetal">
+          <a:bevelT w="0" h="0"/>
+        </a:sp3d>
+      </dsp:spPr>
+      <dsp:style>
+        <a:lnRef idx="0">
+          <a:scrgbClr r="0" g="0" b="0"/>
+        </a:lnRef>
+        <a:fillRef idx="3">
+          <a:scrgbClr r="0" g="0" b="0"/>
+        </a:fillRef>
+        <a:effectRef idx="2">
+          <a:scrgbClr r="0" g="0" b="0"/>
+        </a:effectRef>
+        <a:fontRef idx="minor">
+          <a:schemeClr val="lt1"/>
+        </a:fontRef>
+      </dsp:style>
+    </dsp:sp>
+    <dsp:sp modelId="{163BD269-E582-154A-8E4F-CC07B87B2396}">
+      <dsp:nvSpPr>
+        <dsp:cNvPr id="0" name=""/>
+        <dsp:cNvSpPr/>
+      </dsp:nvSpPr>
+      <dsp:spPr>
+        <a:xfrm>
+          <a:off x="1726792" y="598904"/>
+          <a:ext cx="1320586" cy="1056469"/>
+        </a:xfrm>
+        <a:prstGeom prst="roundRect">
+          <a:avLst>
+            <a:gd name="adj" fmla="val 10000"/>
+          </a:avLst>
+        </a:prstGeom>
+        <a:gradFill rotWithShape="0">
+          <a:gsLst>
+            <a:gs pos="0">
+              <a:schemeClr val="accent1">
+                <a:hueOff val="0"/>
+                <a:satOff val="0"/>
+                <a:lumOff val="0"/>
+                <a:alphaOff val="0"/>
+                <a:tint val="50000"/>
+                <a:shade val="100000"/>
+                <a:alpha val="100000"/>
+                <a:satMod val="150000"/>
+              </a:schemeClr>
+            </a:gs>
+            <a:gs pos="40000">
+              <a:schemeClr val="accent1">
+                <a:hueOff val="0"/>
+                <a:satOff val="0"/>
+                <a:lumOff val="0"/>
+                <a:alphaOff val="0"/>
+                <a:tint val="70000"/>
+                <a:shade val="100000"/>
+                <a:alpha val="100000"/>
+                <a:satMod val="150000"/>
+              </a:schemeClr>
+            </a:gs>
+            <a:gs pos="100000">
+              <a:schemeClr val="accent1">
+                <a:hueOff val="0"/>
+                <a:satOff val="0"/>
+                <a:lumOff val="0"/>
+                <a:alphaOff val="0"/>
+                <a:shade val="90000"/>
+                <a:satMod val="110000"/>
+              </a:schemeClr>
+            </a:gs>
+          </a:gsLst>
+          <a:lin ang="5400000" scaled="0"/>
+        </a:gradFill>
+        <a:ln>
+          <a:noFill/>
+        </a:ln>
+        <a:effectLst>
+          <a:outerShdw blurRad="88900" dist="50800" dir="11400000" sx="102000" sy="101000" algn="tl" rotWithShape="0">
+            <a:srgbClr val="000000">
+              <a:alpha val="35000"/>
+            </a:srgbClr>
+          </a:outerShdw>
+        </a:effectLst>
+        <a:scene3d>
+          <a:camera prst="perspectiveFront" fov="4800000"/>
+          <a:lightRig rig="morning" dir="tl"/>
+        </a:scene3d>
+        <a:sp3d prstMaterial="softmetal">
+          <a:bevelT w="0" h="0"/>
+        </a:sp3d>
+      </dsp:spPr>
+      <dsp:style>
+        <a:lnRef idx="0">
+          <a:scrgbClr r="0" g="0" b="0"/>
+        </a:lnRef>
+        <a:fillRef idx="3">
+          <a:scrgbClr r="0" g="0" b="0"/>
+        </a:fillRef>
+        <a:effectRef idx="2">
+          <a:scrgbClr r="0" g="0" b="0"/>
+        </a:effectRef>
+        <a:fontRef idx="minor">
+          <a:schemeClr val="lt1"/>
+        </a:fontRef>
+      </dsp:style>
+      <dsp:txBody>
+        <a:bodyPr spcFirstLastPara="0" vert="horz" wrap="square" lIns="26670" tIns="26670" rIns="26670" bIns="26670" numCol="1" spcCol="1270" anchor="ctr" anchorCtr="0">
+          <a:noAutofit/>
+        </a:bodyPr>
+        <a:lstStyle/>
+        <a:p>
+          <a:pPr lvl="0" algn="ctr" defTabSz="622300" rtl="0">
+            <a:lnSpc>
+              <a:spcPct val="90000"/>
+            </a:lnSpc>
+            <a:spcBef>
+              <a:spcPct val="0"/>
+            </a:spcBef>
+            <a:spcAft>
+              <a:spcPct val="35000"/>
+            </a:spcAft>
+          </a:pPr>
+          <a:r>
+            <a:rPr lang="en-US" sz="1400" kern="1200" smtClean="0"/>
+            <a:t>The model of the aircraft that they will be flying in</a:t>
+          </a:r>
+          <a:endParaRPr lang="en-US" sz="1400" kern="1200"/>
+        </a:p>
+      </dsp:txBody>
+      <dsp:txXfrm>
+        <a:off x="1757735" y="629847"/>
+        <a:ext cx="1258700" cy="994583"/>
+      </dsp:txXfrm>
+    </dsp:sp>
+    <dsp:sp modelId="{C1FFF8C4-7FEF-FA46-AD40-CF3B65E28326}">
+      <dsp:nvSpPr>
+        <dsp:cNvPr id="0" name=""/>
+        <dsp:cNvSpPr/>
+      </dsp:nvSpPr>
+      <dsp:spPr>
+        <a:xfrm rot="16200000">
+          <a:off x="3194705" y="967509"/>
+          <a:ext cx="1273452" cy="396176"/>
+        </a:xfrm>
+        <a:prstGeom prst="leftArrow">
+          <a:avLst>
+            <a:gd name="adj1" fmla="val 60000"/>
+            <a:gd name="adj2" fmla="val 50000"/>
+          </a:avLst>
+        </a:prstGeom>
+        <a:gradFill rotWithShape="0">
+          <a:gsLst>
+            <a:gs pos="0">
+              <a:schemeClr val="accent1">
+                <a:tint val="60000"/>
+                <a:hueOff val="0"/>
+                <a:satOff val="0"/>
+                <a:lumOff val="0"/>
+                <a:alphaOff val="0"/>
+                <a:tint val="50000"/>
+                <a:shade val="100000"/>
+                <a:alpha val="100000"/>
+                <a:satMod val="150000"/>
+              </a:schemeClr>
+            </a:gs>
+            <a:gs pos="40000">
+              <a:schemeClr val="accent1">
+                <a:tint val="60000"/>
+                <a:hueOff val="0"/>
+                <a:satOff val="0"/>
+                <a:lumOff val="0"/>
+                <a:alphaOff val="0"/>
+                <a:tint val="70000"/>
+                <a:shade val="100000"/>
+                <a:alpha val="100000"/>
+                <a:satMod val="150000"/>
+              </a:schemeClr>
+            </a:gs>
+            <a:gs pos="100000">
+              <a:schemeClr val="accent1">
+                <a:tint val="60000"/>
+                <a:hueOff val="0"/>
+                <a:satOff val="0"/>
+                <a:lumOff val="0"/>
+                <a:alphaOff val="0"/>
+                <a:shade val="90000"/>
+                <a:satMod val="110000"/>
+              </a:schemeClr>
+            </a:gs>
+          </a:gsLst>
+          <a:lin ang="5400000" scaled="0"/>
+        </a:gradFill>
+        <a:ln>
+          <a:noFill/>
+        </a:ln>
+        <a:effectLst>
+          <a:outerShdw blurRad="88900" dist="50800" dir="11400000" sx="102000" sy="101000" algn="tl" rotWithShape="0">
+            <a:srgbClr val="000000">
+              <a:alpha val="35000"/>
+            </a:srgbClr>
+          </a:outerShdw>
+        </a:effectLst>
+        <a:scene3d>
+          <a:camera prst="perspectiveFront" fov="4800000"/>
+          <a:lightRig rig="morning" dir="tl"/>
+        </a:scene3d>
+        <a:sp3d prstMaterial="softmetal">
+          <a:bevelT w="0" h="0"/>
+        </a:sp3d>
+      </dsp:spPr>
+      <dsp:style>
+        <a:lnRef idx="0">
+          <a:scrgbClr r="0" g="0" b="0"/>
+        </a:lnRef>
+        <a:fillRef idx="3">
+          <a:scrgbClr r="0" g="0" b="0"/>
+        </a:fillRef>
+        <a:effectRef idx="2">
+          <a:scrgbClr r="0" g="0" b="0"/>
+        </a:effectRef>
+        <a:fontRef idx="minor">
+          <a:schemeClr val="lt1"/>
+        </a:fontRef>
+      </dsp:style>
+    </dsp:sp>
+    <dsp:sp modelId="{EAACD24D-7FD7-5C45-A629-68E82AB1AE08}">
+      <dsp:nvSpPr>
+        <dsp:cNvPr id="0" name=""/>
+        <dsp:cNvSpPr/>
+      </dsp:nvSpPr>
+      <dsp:spPr>
+        <a:xfrm>
+          <a:off x="3171138" y="637"/>
+          <a:ext cx="1320586" cy="1056469"/>
+        </a:xfrm>
+        <a:prstGeom prst="roundRect">
+          <a:avLst>
+            <a:gd name="adj" fmla="val 10000"/>
+          </a:avLst>
+        </a:prstGeom>
+        <a:gradFill rotWithShape="0">
+          <a:gsLst>
+            <a:gs pos="0">
+              <a:schemeClr val="accent1">
+                <a:hueOff val="0"/>
+                <a:satOff val="0"/>
+                <a:lumOff val="0"/>
+                <a:alphaOff val="0"/>
+                <a:tint val="50000"/>
+                <a:shade val="100000"/>
+                <a:alpha val="100000"/>
+                <a:satMod val="150000"/>
+              </a:schemeClr>
+            </a:gs>
+            <a:gs pos="40000">
+              <a:schemeClr val="accent1">
+                <a:hueOff val="0"/>
+                <a:satOff val="0"/>
+                <a:lumOff val="0"/>
+                <a:alphaOff val="0"/>
+                <a:tint val="70000"/>
+                <a:shade val="100000"/>
+                <a:alpha val="100000"/>
+                <a:satMod val="150000"/>
+              </a:schemeClr>
+            </a:gs>
+            <a:gs pos="100000">
+              <a:schemeClr val="accent1">
+                <a:hueOff val="0"/>
+                <a:satOff val="0"/>
+                <a:lumOff val="0"/>
+                <a:alphaOff val="0"/>
+                <a:shade val="90000"/>
+                <a:satMod val="110000"/>
+              </a:schemeClr>
+            </a:gs>
+          </a:gsLst>
+          <a:lin ang="5400000" scaled="0"/>
+        </a:gradFill>
+        <a:ln>
+          <a:noFill/>
+        </a:ln>
+        <a:effectLst>
+          <a:outerShdw blurRad="88900" dist="50800" dir="11400000" sx="102000" sy="101000" algn="tl" rotWithShape="0">
+            <a:srgbClr val="000000">
+              <a:alpha val="35000"/>
+            </a:srgbClr>
+          </a:outerShdw>
+        </a:effectLst>
+        <a:scene3d>
+          <a:camera prst="perspectiveFront" fov="4800000"/>
+          <a:lightRig rig="morning" dir="tl"/>
+        </a:scene3d>
+        <a:sp3d prstMaterial="softmetal">
+          <a:bevelT w="0" h="0"/>
+        </a:sp3d>
+      </dsp:spPr>
+      <dsp:style>
+        <a:lnRef idx="0">
+          <a:scrgbClr r="0" g="0" b="0"/>
+        </a:lnRef>
+        <a:fillRef idx="3">
+          <a:scrgbClr r="0" g="0" b="0"/>
+        </a:fillRef>
+        <a:effectRef idx="2">
+          <a:scrgbClr r="0" g="0" b="0"/>
+        </a:effectRef>
+        <a:fontRef idx="minor">
+          <a:schemeClr val="lt1"/>
+        </a:fontRef>
+      </dsp:style>
+      <dsp:txBody>
+        <a:bodyPr spcFirstLastPara="0" vert="horz" wrap="square" lIns="26670" tIns="26670" rIns="26670" bIns="26670" numCol="1" spcCol="1270" anchor="ctr" anchorCtr="0">
+          <a:noAutofit/>
+        </a:bodyPr>
+        <a:lstStyle/>
+        <a:p>
+          <a:pPr lvl="0" algn="ctr" defTabSz="622300" rtl="0">
+            <a:lnSpc>
+              <a:spcPct val="90000"/>
+            </a:lnSpc>
+            <a:spcBef>
+              <a:spcPct val="0"/>
+            </a:spcBef>
+            <a:spcAft>
+              <a:spcPct val="35000"/>
+            </a:spcAft>
+          </a:pPr>
+          <a:r>
+            <a:rPr lang="en-US" sz="1400" kern="1200" dirty="0" smtClean="0"/>
+            <a:t>The origin and destination airport</a:t>
+          </a:r>
+          <a:endParaRPr lang="en-US" sz="1400" kern="1200" dirty="0"/>
+        </a:p>
+      </dsp:txBody>
+      <dsp:txXfrm>
+        <a:off x="3202081" y="31580"/>
+        <a:ext cx="1258700" cy="994583"/>
+      </dsp:txXfrm>
+    </dsp:sp>
+    <dsp:sp modelId="{F576E38B-9087-D747-8966-E716FA4A803F}">
+      <dsp:nvSpPr>
+        <dsp:cNvPr id="0" name=""/>
+        <dsp:cNvSpPr/>
+      </dsp:nvSpPr>
+      <dsp:spPr>
+        <a:xfrm rot="18900000">
+          <a:off x="4188818" y="1379285"/>
+          <a:ext cx="1273452" cy="396176"/>
+        </a:xfrm>
+        <a:prstGeom prst="leftArrow">
+          <a:avLst>
+            <a:gd name="adj1" fmla="val 60000"/>
+            <a:gd name="adj2" fmla="val 50000"/>
+          </a:avLst>
+        </a:prstGeom>
+        <a:gradFill rotWithShape="0">
+          <a:gsLst>
+            <a:gs pos="0">
+              <a:schemeClr val="accent1">
+                <a:tint val="60000"/>
+                <a:hueOff val="0"/>
+                <a:satOff val="0"/>
+                <a:lumOff val="0"/>
+                <a:alphaOff val="0"/>
+                <a:tint val="50000"/>
+                <a:shade val="100000"/>
+                <a:alpha val="100000"/>
+                <a:satMod val="150000"/>
+              </a:schemeClr>
+            </a:gs>
+            <a:gs pos="40000">
+              <a:schemeClr val="accent1">
+                <a:tint val="60000"/>
+                <a:hueOff val="0"/>
+                <a:satOff val="0"/>
+                <a:lumOff val="0"/>
+                <a:alphaOff val="0"/>
+                <a:tint val="70000"/>
+                <a:shade val="100000"/>
+                <a:alpha val="100000"/>
+                <a:satMod val="150000"/>
+              </a:schemeClr>
+            </a:gs>
+            <a:gs pos="100000">
+              <a:schemeClr val="accent1">
+                <a:tint val="60000"/>
+                <a:hueOff val="0"/>
+                <a:satOff val="0"/>
+                <a:lumOff val="0"/>
+                <a:alphaOff val="0"/>
+                <a:shade val="90000"/>
+                <a:satMod val="110000"/>
+              </a:schemeClr>
+            </a:gs>
+          </a:gsLst>
+          <a:lin ang="5400000" scaled="0"/>
+        </a:gradFill>
+        <a:ln>
+          <a:noFill/>
+        </a:ln>
+        <a:effectLst>
+          <a:outerShdw blurRad="88900" dist="50800" dir="11400000" sx="102000" sy="101000" algn="tl" rotWithShape="0">
+            <a:srgbClr val="000000">
+              <a:alpha val="35000"/>
+            </a:srgbClr>
+          </a:outerShdw>
+        </a:effectLst>
+        <a:scene3d>
+          <a:camera prst="perspectiveFront" fov="4800000"/>
+          <a:lightRig rig="morning" dir="tl"/>
+        </a:scene3d>
+        <a:sp3d prstMaterial="softmetal">
+          <a:bevelT w="0" h="0"/>
+        </a:sp3d>
+      </dsp:spPr>
+      <dsp:style>
+        <a:lnRef idx="0">
+          <a:scrgbClr r="0" g="0" b="0"/>
+        </a:lnRef>
+        <a:fillRef idx="3">
+          <a:scrgbClr r="0" g="0" b="0"/>
+        </a:fillRef>
+        <a:effectRef idx="2">
+          <a:scrgbClr r="0" g="0" b="0"/>
+        </a:effectRef>
+        <a:fontRef idx="minor">
+          <a:schemeClr val="lt1"/>
+        </a:fontRef>
+      </dsp:style>
+    </dsp:sp>
+    <dsp:sp modelId="{59FFC04D-89F6-434B-8544-6B3B192E821F}">
+      <dsp:nvSpPr>
+        <dsp:cNvPr id="0" name=""/>
+        <dsp:cNvSpPr/>
+      </dsp:nvSpPr>
+      <dsp:spPr>
+        <a:xfrm>
+          <a:off x="4615485" y="598904"/>
+          <a:ext cx="1320586" cy="1056469"/>
+        </a:xfrm>
+        <a:prstGeom prst="roundRect">
+          <a:avLst>
+            <a:gd name="adj" fmla="val 10000"/>
+          </a:avLst>
+        </a:prstGeom>
+        <a:gradFill rotWithShape="0">
+          <a:gsLst>
+            <a:gs pos="0">
+              <a:schemeClr val="accent1">
+                <a:hueOff val="0"/>
+                <a:satOff val="0"/>
+                <a:lumOff val="0"/>
+                <a:alphaOff val="0"/>
+                <a:tint val="50000"/>
+                <a:shade val="100000"/>
+                <a:alpha val="100000"/>
+                <a:satMod val="150000"/>
+              </a:schemeClr>
+            </a:gs>
+            <a:gs pos="40000">
+              <a:schemeClr val="accent1">
+                <a:hueOff val="0"/>
+                <a:satOff val="0"/>
+                <a:lumOff val="0"/>
+                <a:alphaOff val="0"/>
+                <a:tint val="70000"/>
+                <a:shade val="100000"/>
+                <a:alpha val="100000"/>
+                <a:satMod val="150000"/>
+              </a:schemeClr>
+            </a:gs>
+            <a:gs pos="100000">
+              <a:schemeClr val="accent1">
+                <a:hueOff val="0"/>
+                <a:satOff val="0"/>
+                <a:lumOff val="0"/>
+                <a:alphaOff val="0"/>
+                <a:shade val="90000"/>
+                <a:satMod val="110000"/>
+              </a:schemeClr>
+            </a:gs>
+          </a:gsLst>
+          <a:lin ang="5400000" scaled="0"/>
+        </a:gradFill>
+        <a:ln>
+          <a:noFill/>
+        </a:ln>
+        <a:effectLst>
+          <a:outerShdw blurRad="88900" dist="50800" dir="11400000" sx="102000" sy="101000" algn="tl" rotWithShape="0">
+            <a:srgbClr val="000000">
+              <a:alpha val="35000"/>
+            </a:srgbClr>
+          </a:outerShdw>
+        </a:effectLst>
+        <a:scene3d>
+          <a:camera prst="perspectiveFront" fov="4800000"/>
+          <a:lightRig rig="morning" dir="tl"/>
+        </a:scene3d>
+        <a:sp3d prstMaterial="softmetal">
+          <a:bevelT w="0" h="0"/>
+        </a:sp3d>
+      </dsp:spPr>
+      <dsp:style>
+        <a:lnRef idx="0">
+          <a:scrgbClr r="0" g="0" b="0"/>
+        </a:lnRef>
+        <a:fillRef idx="3">
+          <a:scrgbClr r="0" g="0" b="0"/>
+        </a:fillRef>
+        <a:effectRef idx="2">
+          <a:scrgbClr r="0" g="0" b="0"/>
+        </a:effectRef>
+        <a:fontRef idx="minor">
+          <a:schemeClr val="lt1"/>
+        </a:fontRef>
+      </dsp:style>
+      <dsp:txBody>
+        <a:bodyPr spcFirstLastPara="0" vert="horz" wrap="square" lIns="26670" tIns="26670" rIns="26670" bIns="26670" numCol="1" spcCol="1270" anchor="ctr" anchorCtr="0">
+          <a:noAutofit/>
+        </a:bodyPr>
+        <a:lstStyle/>
+        <a:p>
+          <a:pPr lvl="0" algn="ctr" defTabSz="622300" rtl="0">
+            <a:lnSpc>
+              <a:spcPct val="90000"/>
+            </a:lnSpc>
+            <a:spcBef>
+              <a:spcPct val="0"/>
+            </a:spcBef>
+            <a:spcAft>
+              <a:spcPct val="35000"/>
+            </a:spcAft>
+          </a:pPr>
+          <a:r>
+            <a:rPr lang="en-US" sz="1400" kern="1200" dirty="0" smtClean="0"/>
+            <a:t>Seasonal factors</a:t>
+          </a:r>
+          <a:endParaRPr lang="en-US" sz="1400" kern="1200" dirty="0"/>
+        </a:p>
+      </dsp:txBody>
+      <dsp:txXfrm>
+        <a:off x="4646428" y="629847"/>
+        <a:ext cx="1258700" cy="994583"/>
+      </dsp:txXfrm>
+    </dsp:sp>
+    <dsp:sp modelId="{C6D53F4B-CCD0-0646-8423-4A8B01223E51}">
+      <dsp:nvSpPr>
+        <dsp:cNvPr id="0" name=""/>
+        <dsp:cNvSpPr/>
+      </dsp:nvSpPr>
+      <dsp:spPr>
+        <a:xfrm>
+          <a:off x="4600593" y="2373398"/>
+          <a:ext cx="1273452" cy="396176"/>
+        </a:xfrm>
+        <a:prstGeom prst="leftArrow">
+          <a:avLst>
+            <a:gd name="adj1" fmla="val 60000"/>
+            <a:gd name="adj2" fmla="val 50000"/>
+          </a:avLst>
+        </a:prstGeom>
+        <a:gradFill rotWithShape="0">
+          <a:gsLst>
+            <a:gs pos="0">
+              <a:schemeClr val="accent1">
+                <a:tint val="60000"/>
+                <a:hueOff val="0"/>
+                <a:satOff val="0"/>
+                <a:lumOff val="0"/>
+                <a:alphaOff val="0"/>
+                <a:tint val="50000"/>
+                <a:shade val="100000"/>
+                <a:alpha val="100000"/>
+                <a:satMod val="150000"/>
+              </a:schemeClr>
+            </a:gs>
+            <a:gs pos="40000">
+              <a:schemeClr val="accent1">
+                <a:tint val="60000"/>
+                <a:hueOff val="0"/>
+                <a:satOff val="0"/>
+                <a:lumOff val="0"/>
+                <a:alphaOff val="0"/>
+                <a:tint val="70000"/>
+                <a:shade val="100000"/>
+                <a:alpha val="100000"/>
+                <a:satMod val="150000"/>
+              </a:schemeClr>
+            </a:gs>
+            <a:gs pos="100000">
+              <a:schemeClr val="accent1">
+                <a:tint val="60000"/>
+                <a:hueOff val="0"/>
+                <a:satOff val="0"/>
+                <a:lumOff val="0"/>
+                <a:alphaOff val="0"/>
+                <a:shade val="90000"/>
+                <a:satMod val="110000"/>
+              </a:schemeClr>
+            </a:gs>
+          </a:gsLst>
+          <a:lin ang="5400000" scaled="0"/>
+        </a:gradFill>
+        <a:ln>
+          <a:noFill/>
+        </a:ln>
+        <a:effectLst>
+          <a:outerShdw blurRad="88900" dist="50800" dir="11400000" sx="102000" sy="101000" algn="tl" rotWithShape="0">
+            <a:srgbClr val="000000">
+              <a:alpha val="35000"/>
+            </a:srgbClr>
+          </a:outerShdw>
+        </a:effectLst>
+        <a:scene3d>
+          <a:camera prst="perspectiveFront" fov="4800000"/>
+          <a:lightRig rig="morning" dir="tl"/>
+        </a:scene3d>
+        <a:sp3d prstMaterial="softmetal">
+          <a:bevelT w="0" h="0"/>
+        </a:sp3d>
+      </dsp:spPr>
+      <dsp:style>
+        <a:lnRef idx="0">
+          <a:scrgbClr r="0" g="0" b="0"/>
+        </a:lnRef>
+        <a:fillRef idx="3">
+          <a:scrgbClr r="0" g="0" b="0"/>
+        </a:fillRef>
+        <a:effectRef idx="2">
+          <a:scrgbClr r="0" g="0" b="0"/>
+        </a:effectRef>
+        <a:fontRef idx="minor">
+          <a:schemeClr val="lt1"/>
+        </a:fontRef>
+      </dsp:style>
+    </dsp:sp>
+    <dsp:sp modelId="{AED10C36-196C-DC40-8282-184DF90E130D}">
+      <dsp:nvSpPr>
+        <dsp:cNvPr id="0" name=""/>
+        <dsp:cNvSpPr/>
+      </dsp:nvSpPr>
+      <dsp:spPr>
+        <a:xfrm>
+          <a:off x="5213753" y="2043251"/>
+          <a:ext cx="1320586" cy="1056469"/>
+        </a:xfrm>
+        <a:prstGeom prst="roundRect">
+          <a:avLst>
+            <a:gd name="adj" fmla="val 10000"/>
+          </a:avLst>
+        </a:prstGeom>
+        <a:gradFill rotWithShape="0">
+          <a:gsLst>
+            <a:gs pos="0">
+              <a:schemeClr val="accent1">
+                <a:hueOff val="0"/>
+                <a:satOff val="0"/>
+                <a:lumOff val="0"/>
+                <a:alphaOff val="0"/>
+                <a:tint val="50000"/>
+                <a:shade val="100000"/>
+                <a:alpha val="100000"/>
+                <a:satMod val="150000"/>
+              </a:schemeClr>
+            </a:gs>
+            <a:gs pos="40000">
+              <a:schemeClr val="accent1">
+                <a:hueOff val="0"/>
+                <a:satOff val="0"/>
+                <a:lumOff val="0"/>
+                <a:alphaOff val="0"/>
+                <a:tint val="70000"/>
+                <a:shade val="100000"/>
+                <a:alpha val="100000"/>
+                <a:satMod val="150000"/>
+              </a:schemeClr>
+            </a:gs>
+            <a:gs pos="100000">
+              <a:schemeClr val="accent1">
+                <a:hueOff val="0"/>
+                <a:satOff val="0"/>
+                <a:lumOff val="0"/>
+                <a:alphaOff val="0"/>
+                <a:shade val="90000"/>
+                <a:satMod val="110000"/>
+              </a:schemeClr>
+            </a:gs>
+          </a:gsLst>
+          <a:lin ang="5400000" scaled="0"/>
+        </a:gradFill>
+        <a:ln>
+          <a:noFill/>
+        </a:ln>
+        <a:effectLst>
+          <a:outerShdw blurRad="88900" dist="50800" dir="11400000" sx="102000" sy="101000" algn="tl" rotWithShape="0">
+            <a:srgbClr val="000000">
+              <a:alpha val="35000"/>
+            </a:srgbClr>
+          </a:outerShdw>
+        </a:effectLst>
+        <a:scene3d>
+          <a:camera prst="perspectiveFront" fov="4800000"/>
+          <a:lightRig rig="morning" dir="tl"/>
+        </a:scene3d>
+        <a:sp3d prstMaterial="softmetal">
+          <a:bevelT w="0" h="0"/>
+        </a:sp3d>
+      </dsp:spPr>
+      <dsp:style>
+        <a:lnRef idx="0">
+          <a:scrgbClr r="0" g="0" b="0"/>
+        </a:lnRef>
+        <a:fillRef idx="3">
+          <a:scrgbClr r="0" g="0" b="0"/>
+        </a:fillRef>
+        <a:effectRef idx="2">
+          <a:scrgbClr r="0" g="0" b="0"/>
+        </a:effectRef>
+        <a:fontRef idx="minor">
+          <a:schemeClr val="lt1"/>
+        </a:fontRef>
+      </dsp:style>
+      <dsp:txBody>
+        <a:bodyPr spcFirstLastPara="0" vert="horz" wrap="square" lIns="26670" tIns="26670" rIns="26670" bIns="26670" numCol="1" spcCol="1270" anchor="ctr" anchorCtr="0">
+          <a:noAutofit/>
+        </a:bodyPr>
+        <a:lstStyle/>
+        <a:p>
+          <a:pPr lvl="0" algn="ctr" defTabSz="622300" rtl="0">
+            <a:lnSpc>
+              <a:spcPct val="90000"/>
+            </a:lnSpc>
+            <a:spcBef>
+              <a:spcPct val="0"/>
+            </a:spcBef>
+            <a:spcAft>
+              <a:spcPct val="35000"/>
+            </a:spcAft>
+          </a:pPr>
+          <a:r>
+            <a:rPr lang="en-US" sz="1400" kern="1200" dirty="0" smtClean="0"/>
+            <a:t>Long range weather forecasts</a:t>
+          </a:r>
+          <a:endParaRPr lang="en-US" sz="1400" kern="1200" dirty="0"/>
+        </a:p>
+      </dsp:txBody>
+      <dsp:txXfrm>
+        <a:off x="5244696" y="2074194"/>
+        <a:ext cx="1258700" cy="994583"/>
+      </dsp:txXfrm>
+    </dsp:sp>
+  </dsp:spTree>
+</dsp:drawing>
+</file>
+
+<file path=ppt/diagrams/layout1.xml><?xml version="1.0" encoding="utf-8"?>
+<dgm:layoutDef xmlns:dgm="http://schemas.openxmlformats.org/drawingml/2006/diagram" xmlns:a="http://schemas.openxmlformats.org/drawingml/2006/main" uniqueId="urn:microsoft.com/office/officeart/2005/8/layout/radial4">
+  <dgm:title val=""/>
+  <dgm:desc val=""/>
+  <dgm:catLst>
+    <dgm:cat type="relationship" pri="19000"/>
+  </dgm:catLst>
+  <dgm:sampData>
+    <dgm:dataModel>
+      <dgm:ptLst>
+        <dgm:pt modelId="0" type="doc"/>
+        <dgm:pt modelId="1">
+          <dgm:prSet phldr="1"/>
+        </dgm:pt>
+        <dgm:pt modelId="11">
+          <dgm:prSet phldr="1"/>
+        </dgm:pt>
+        <dgm:pt modelId="12">
+          <dgm:prSet phldr="1"/>
+        </dgm:pt>
+        <dgm:pt modelId="13">
+          <dgm:prSet phldr="1"/>
+        </dgm:pt>
+      </dgm:ptLst>
+      <dgm:cxnLst>
+        <dgm:cxn modelId="2" srcId="0" destId="1" srcOrd="0" destOrd="0"/>
+        <dgm:cxn modelId="3" srcId="1" destId="11" srcOrd="0" destOrd="0"/>
+        <dgm:cxn modelId="4" srcId="1" destId="12" srcOrd="1" destOrd="0"/>
+        <dgm:cxn modelId="5" srcId="1" destId="13" srcOrd="2" destOrd="0"/>
+      </dgm:cxnLst>
+      <dgm:bg/>
+      <dgm:whole/>
+    </dgm:dataModel>
+  </dgm:sampData>
+  <dgm:styleData>
+    <dgm:dataModel>
+      <dgm:ptLst>
+        <dgm:pt modelId="0" type="doc"/>
+        <dgm:pt modelId="1"/>
+        <dgm:pt modelId="11"/>
+        <dgm:pt modelId="12"/>
+      </dgm:ptLst>
+      <dgm:cxnLst>
+        <dgm:cxn modelId="2" srcId="0" destId="1" srcOrd="0" destOrd="0"/>
+        <dgm:cxn modelId="15" srcId="1" destId="11" srcOrd="0" destOrd="0"/>
+        <dgm:cxn modelId="16" srcId="1" destId="12" srcOrd="1" destOrd="0"/>
+      </dgm:cxnLst>
+      <dgm:bg/>
+      <dgm:whole/>
+    </dgm:dataModel>
+  </dgm:styleData>
+  <dgm:clrData>
+    <dgm:dataModel>
+      <dgm:ptLst>
+        <dgm:pt modelId="0" type="doc"/>
+        <dgm:pt modelId="1"/>
+        <dgm:pt modelId="11"/>
+        <dgm:pt modelId="12"/>
+        <dgm:pt modelId="13"/>
+        <dgm:pt modelId="14"/>
+        <dgm:pt modelId="15"/>
+        <dgm:pt modelId="16"/>
+      </dgm:ptLst>
+      <dgm:cxnLst>
+        <dgm:cxn modelId="2" srcId="0" destId="1" srcOrd="0" destOrd="0"/>
+        <dgm:cxn modelId="16" srcId="1" destId="11" srcOrd="0" destOrd="0"/>
+        <dgm:cxn modelId="17" srcId="1" destId="12" srcOrd="1" destOrd="0"/>
+        <dgm:cxn modelId="18" srcId="1" destId="13" srcOrd="2" destOrd="0"/>
+        <dgm:cxn modelId="19" srcId="1" destId="14" srcOrd="3" destOrd="0"/>
+        <dgm:cxn modelId="20" srcId="1" destId="15" srcOrd="4" destOrd="0"/>
+        <dgm:cxn modelId="21" srcId="1" destId="16" srcOrd="5" destOrd="0"/>
+      </dgm:cxnLst>
+      <dgm:bg/>
+      <dgm:whole/>
+    </dgm:dataModel>
+  </dgm:clrData>
+  <dgm:layoutNode name="cycle">
+    <dgm:varLst>
+      <dgm:chMax val="1"/>
+      <dgm:dir/>
+      <dgm:animLvl val="ctr"/>
+      <dgm:resizeHandles val="exact"/>
+    </dgm:varLst>
+    <dgm:choose name="Name0">
+      <dgm:if name="Name1" func="var" arg="dir" op="equ" val="norm">
+        <dgm:choose name="Name2">
+          <dgm:if name="Name3" axis="ch ch" ptType="node node" st="1 1" cnt="1 0" func="cnt" op="lte" val="1">
+            <dgm:alg type="cycle">
+              <dgm:param type="stAng" val="0"/>
+              <dgm:param type="spanAng" val="360"/>
+              <dgm:param type="ctrShpMap" val="fNode"/>
+            </dgm:alg>
+          </dgm:if>
+          <dgm:else name="Name4">
+            <dgm:choose name="Name5">
+              <dgm:if name="Name6" axis="ch ch" ptType="node node" st="1 1" cnt="1 0" func="cnt" op="lte" val="3">
+                <dgm:alg type="cycle">
+                  <dgm:param type="stAng" val="-55"/>
+                  <dgm:param type="spanAng" val="110"/>
+                  <dgm:param type="ctrShpMap" val="fNode"/>
+                </dgm:alg>
+              </dgm:if>
+              <dgm:else name="Name7">
+                <dgm:choose name="Name8">
+                  <dgm:if name="Name9" axis="ch ch" ptType="node node" st="1 1" cnt="1 0" func="cnt" op="equ" val="4">
+                    <dgm:alg type="cycle">
+                      <dgm:param type="stAng" val="-75"/>
+                      <dgm:param type="spanAng" val="150"/>
+                      <dgm:param type="ctrShpMap" val="fNode"/>
+                    </dgm:alg>
+                  </dgm:if>
+                  <dgm:else name="Name10">
+                    <dgm:alg type="cycle">
+                      <dgm:param type="stAng" val="-90"/>
+                      <dgm:param type="spanAng" val="180"/>
+                      <dgm:param type="ctrShpMap" val="fNode"/>
+                    </dgm:alg>
+                  </dgm:else>
+                </dgm:choose>
+              </dgm:else>
+            </dgm:choose>
+          </dgm:else>
+        </dgm:choose>
+      </dgm:if>
+      <dgm:else name="Name11">
+        <dgm:choose name="Name12">
+          <dgm:if name="Name13" axis="ch ch" ptType="node node" st="1 1" cnt="1 0" func="cnt" op="lte" val="1">
+            <dgm:alg type="cycle">
+              <dgm:param type="stAng" val="0"/>
+              <dgm:param type="spanAng" val="-360"/>
+              <dgm:param type="ctrShpMap" val="fNode"/>
+            </dgm:alg>
+          </dgm:if>
+          <dgm:else name="Name14">
+            <dgm:choose name="Name15">
+              <dgm:if name="Name16" axis="ch ch" ptType="node node" st="1 1" cnt="1 0" func="cnt" op="lte" val="3">
+                <dgm:alg type="cycle">
+                  <dgm:param type="stAng" val="55"/>
+                  <dgm:param type="spanAng" val="-110"/>
+                  <dgm:param type="ctrShpMap" val="fNode"/>
+                </dgm:alg>
+              </dgm:if>
+              <dgm:else name="Name17">
+                <dgm:choose name="Name18">
+                  <dgm:if name="Name19" axis="ch ch" ptType="node node" st="1 1" cnt="1 0" func="cnt" op="equ" val="4">
+                    <dgm:alg type="cycle">
+                      <dgm:param type="stAng" val="75"/>
+                      <dgm:param type="spanAng" val="-150"/>
+                      <dgm:param type="ctrShpMap" val="fNode"/>
+                    </dgm:alg>
+                  </dgm:if>
+                  <dgm:else name="Name20">
+                    <dgm:alg type="cycle">
+                      <dgm:param type="stAng" val="90"/>
+                      <dgm:param type="spanAng" val="-180"/>
+                      <dgm:param type="ctrShpMap" val="fNode"/>
+                    </dgm:alg>
+                  </dgm:else>
+                </dgm:choose>
+              </dgm:else>
+            </dgm:choose>
+          </dgm:else>
+        </dgm:choose>
+      </dgm:else>
+    </dgm:choose>
+    <dgm:shape xmlns:r="http://schemas.openxmlformats.org/officeDocument/2006/relationships" r:blip="">
+      <dgm:adjLst/>
+    </dgm:shape>
+    <dgm:presOf/>
+    <dgm:constrLst>
+      <dgm:constr type="w" for="ch" forName="centerShape" refType="w"/>
+      <dgm:constr type="w" for="ch" forName="node" refType="w" refFor="ch" refForName="centerShape" fact="0.95"/>
+      <dgm:constr type="h" for="ch" forName="parTrans" refType="w" refFor="ch" refForName="centerShape" fact="0.285"/>
+      <dgm:constr type="sp" refType="w" refFor="ch" refForName="centerShape" op="equ" fact="0.23"/>
+      <dgm:constr type="sibSp" refType="w" refFor="ch" refForName="node" fact="0.1"/>
+      <dgm:constr type="primFontSz" for="ch" forName="node" op="equ"/>
+    </dgm:constrLst>
+    <dgm:choose name="Name21">
+      <dgm:if name="Name22" axis="ch ch" ptType="node node" st="1 1" cnt="1 0" func="cnt" op="lte" val="5">
+        <dgm:ruleLst>
+          <dgm:rule type="w" for="ch" forName="centerShape" val="NaN" fact="0.27" max="NaN"/>
+        </dgm:ruleLst>
+      </dgm:if>
+      <dgm:else name="Name23">
+        <dgm:ruleLst>
+          <dgm:rule type="w" for="ch" forName="centerShape" val="NaN" fact="0.27" max="NaN"/>
+          <dgm:rule type="w" for="ch" forName="node" val="NaN" fact="0.7" max="NaN"/>
+        </dgm:ruleLst>
+      </dgm:else>
+    </dgm:choose>
+    <dgm:forEach name="Name24" axis="ch" ptType="node" cnt="1">
+      <dgm:layoutNode name="centerShape" styleLbl="node0">
+        <dgm:alg type="tx"/>
+        <dgm:shape xmlns:r="http://schemas.openxmlformats.org/officeDocument/2006/relationships" type="ellipse" r:blip="">
+          <dgm:adjLst/>
+        </dgm:shape>
+        <dgm:presOf axis="self"/>
+        <dgm:constrLst>
+          <dgm:constr type="tMarg" refType="primFontSz" fact="0.05"/>
+          <dgm:constr type="bMarg" refType="primFontSz" fact="0.05"/>
+          <dgm:constr type="lMarg" refType="primFontSz" fact="0.05"/>
+          <dgm:constr type="rMarg" refType="primFontSz" fact="0.05"/>
+          <dgm:constr type="primFontSz" val="65"/>
+          <dgm:constr type="h" refType="w"/>
+        </dgm:constrLst>
+        <dgm:ruleLst>
+          <dgm:rule type="primFontSz" val="5" fact="NaN" max="NaN"/>
+        </dgm:ruleLst>
+      </dgm:layoutNode>
+      <dgm:forEach name="Name25" axis="ch">
+        <dgm:forEach name="Name26" axis="self" ptType="parTrans">
+          <dgm:layoutNode name="parTrans" styleLbl="bgSibTrans2D1">
+            <dgm:alg type="conn">
+              <dgm:param type="begPts" val="auto"/>
+              <dgm:param type="endPts" val="ctr"/>
+              <dgm:param type="endSty" val="noArr"/>
+              <dgm:param type="begSty" val="arr"/>
+            </dgm:alg>
+            <dgm:shape xmlns:r="http://schemas.openxmlformats.org/officeDocument/2006/relationships" type="conn" r:blip="">
+              <dgm:adjLst/>
+            </dgm:shape>
+            <dgm:presOf axis="self"/>
+            <dgm:constrLst>
+              <dgm:constr type="begPad" refType="connDist" fact="0.055"/>
+              <dgm:constr type="endPad"/>
+            </dgm:constrLst>
+            <dgm:ruleLst/>
+          </dgm:layoutNode>
+        </dgm:forEach>
+        <dgm:forEach name="Name27" axis="self" ptType="node">
+          <dgm:layoutNode name="node" styleLbl="node1">
+            <dgm:varLst>
+              <dgm:bulletEnabled val="1"/>
+            </dgm:varLst>
+            <dgm:alg type="tx"/>
+            <dgm:shape xmlns:r="http://schemas.openxmlformats.org/officeDocument/2006/relationships" type="roundRect" r:blip="">
+              <dgm:adjLst>
+                <dgm:adj idx="1" val="0.1"/>
+              </dgm:adjLst>
+            </dgm:shape>
+            <dgm:presOf axis="desOrSelf" ptType="node"/>
+            <dgm:constrLst>
+              <dgm:constr type="primFontSz" val="65"/>
+              <dgm:constr type="h" refType="w" fact="0.8"/>
+              <dgm:constr type="tMarg" refType="primFontSz" fact="0.15"/>
+              <dgm:constr type="bMarg" refType="primFontSz" fact="0.15"/>
+              <dgm:constr type="lMarg" refType="primFontSz" fact="0.15"/>
+              <dgm:constr type="rMarg" refType="primFontSz" fact="0.15"/>
+            </dgm:constrLst>
+            <dgm:ruleLst>
+              <dgm:rule type="primFontSz" val="5" fact="NaN" max="NaN"/>
+            </dgm:ruleLst>
+          </dgm:layoutNode>
+        </dgm:forEach>
+      </dgm:forEach>
+    </dgm:forEach>
+  </dgm:layoutNode>
+</dgm:layoutDef>
+</file>
+
+<file path=ppt/diagrams/quickStyle1.xml><?xml version="1.0" encoding="utf-8"?>
+<dgm:styleDef xmlns:dgm="http://schemas.openxmlformats.org/drawingml/2006/diagram" xmlns:a="http://schemas.openxmlformats.org/drawingml/2006/main" uniqueId="urn:microsoft.com/office/officeart/2005/8/quickstyle/simple4">
+  <dgm:title val=""/>
+  <dgm:desc val=""/>
+  <dgm:catLst>
+    <dgm:cat type="simple" pri="10400"/>
+  </dgm:catLst>
+  <dgm:scene3d>
+    <a:camera prst="orthographicFront"/>
+    <a:lightRig rig="threePt" dir="t"/>
+  </dgm:scene3d>
+  <dgm:styleLbl name="node0">
+    <dgm:scene3d>
+      <a:camera prst="orthographicFront"/>
+      <a:lightRig rig="threePt" dir="t"/>
+    </dgm:scene3d>
+    <dgm:sp3d/>
+    <dgm:txPr/>
+    <dgm:style>
+      <a:lnRef idx="0">
+        <a:scrgbClr r="0" g="0" b="0"/>
+      </a:lnRef>
+      <a:fillRef idx="3">
+        <a:scrgbClr r="0" g="0" b="0"/>
+      </a:fillRef>
+      <a:effectRef idx="2">
+        <a:scrgbClr r="0" g="0" b="0"/>
+      </a:effectRef>
+      <a:fontRef idx="minor">
+        <a:schemeClr val="lt1"/>
+      </a:fontRef>
+    </dgm:style>
+  </dgm:styleLbl>
+  <dgm:styleLbl name="lnNode1">
+    <dgm:scene3d>
+      <a:camera prst="orthographicFront"/>
+      <a:lightRig rig="threePt" dir="t"/>
+    </dgm:scene3d>
+    <dgm:sp3d/>
+    <dgm:txPr/>
+    <dgm:style>
+      <a:lnRef idx="1">
+        <a:scrgbClr r="0" g="0" b="0"/>
+      </a:lnRef>
+      <a:fillRef idx="3">
+        <a:scrgbClr r="0" g="0" b="0"/>
+      </a:fillRef>
+      <a:effectRef idx="2">
+        <a:scrgbClr r="0" g="0" b="0"/>
+      </a:effectRef>
+      <a:fontRef idx="minor">
+        <a:schemeClr val="lt1"/>
+      </a:fontRef>
+    </dgm:style>
+  </dgm:styleLbl>
+  <dgm:styleLbl name="vennNode1">
+    <dgm:scene3d>
+      <a:camera prst="orthographicFront"/>
+      <a:lightRig rig="threePt" dir="t"/>
+    </dgm:scene3d>
+    <dgm:sp3d/>
+    <dgm:txPr/>
+    <dgm:style>
+      <a:lnRef idx="0">
+        <a:scrgbClr r="0" g="0" b="0"/>
+      </a:lnRef>
+      <a:fillRef idx="3">
+        <a:scrgbClr r="0" g="0" b="0"/>
+      </a:fillRef>
+      <a:effectRef idx="0">
+        <a:scrgbClr r="0" g="0" b="0"/>
+      </a:effectRef>
+      <a:fontRef idx="minor">
+        <a:schemeClr val="tx1"/>
+      </a:fontRef>
+    </dgm:style>
+  </dgm:styleLbl>
+  <dgm:styleLbl name="alignNode1">
+    <dgm:scene3d>
+      <a:camera prst="orthographicFront"/>
+      <a:lightRig rig="threePt" dir="t"/>
+    </dgm:scene3d>
+    <dgm:sp3d/>
+    <dgm:txPr/>
+    <dgm:style>
+      <a:lnRef idx="1">
+        <a:scrgbClr r="0" g="0" b="0"/>
+      </a:lnRef>
+      <a:fillRef idx="3">
+        <a:scrgbClr r="0" g="0" b="0"/>
+      </a:fillRef>
+      <a:effectRef idx="2">
+        <a:scrgbClr r="0" g="0" b="0"/>
+      </a:effectRef>
+      <a:fontRef idx="minor">
+        <a:schemeClr val="lt1"/>
+      </a:fontRef>
+    </dgm:style>
+  </dgm:styleLbl>
+  <dgm:styleLbl name="node1">
+    <dgm:scene3d>
+      <a:camera prst="orthographicFront"/>
+      <a:lightRig rig="threePt" dir="t"/>
+    </dgm:scene3d>
+    <dgm:sp3d/>
+    <dgm:txPr/>
+    <dgm:style>
+      <a:lnRef idx="0">
+        <a:scrgbClr r="0" g="0" b="0"/>
+      </a:lnRef>
+      <a:fillRef idx="3">
+        <a:scrgbClr r="0" g="0" b="0"/>
+      </a:fillRef>
+      <a:effectRef idx="2">
+        <a:scrgbClr r="0" g="0" b="0"/>
+      </a:effectRef>
+      <a:fontRef idx="minor">
+        <a:schemeClr val="lt1"/>
+      </a:fontRef>
+    </dgm:style>
+  </dgm:styleLbl>
+  <dgm:styleLbl name="node2">
+    <dgm:scene3d>
+      <a:camera prst="orthographicFront"/>
+      <a:lightRig rig="threePt" dir="t"/>
+    </dgm:scene3d>
+    <dgm:sp3d/>
+    <dgm:txPr/>
+    <dgm:style>
+      <a:lnRef idx="0">
+        <a:scrgbClr r="0" g="0" b="0"/>
+      </a:lnRef>
+      <a:fillRef idx="3">
+        <a:scrgbClr r="0" g="0" b="0"/>
+      </a:fillRef>
+      <a:effectRef idx="2">
+        <a:scrgbClr r="0" g="0" b="0"/>
+      </a:effectRef>
+      <a:fontRef idx="minor">
+        <a:schemeClr val="lt1"/>
+      </a:fontRef>
+    </dgm:style>
+  </dgm:styleLbl>
+  <dgm:styleLbl name="node3">
+    <dgm:scene3d>
+      <a:camera prst="orthographicFront"/>
+      <a:lightRig rig="threePt" dir="t"/>
+    </dgm:scene3d>
+    <dgm:sp3d/>
+    <dgm:txPr/>
+    <dgm:style>
+      <a:lnRef idx="0">
+        <a:scrgbClr r="0" g="0" b="0"/>
+      </a:lnRef>
+      <a:fillRef idx="3">
+        <a:scrgbClr r="0" g="0" b="0"/>
+      </a:fillRef>
+      <a:effectRef idx="2">
+        <a:scrgbClr r="0" g="0" b="0"/>
+      </a:effectRef>
+      <a:fontRef idx="minor">
+        <a:schemeClr val="lt1"/>
+      </a:fontRef>
+    </dgm:style>
+  </dgm:styleLbl>
+  <dgm:styleLbl name="node4">
+    <dgm:scene3d>
+      <a:camera prst="orthographicFront"/>
+      <a:lightRig rig="threePt" dir="t"/>
+    </dgm:scene3d>
+    <dgm:sp3d/>
+    <dgm:txPr/>
+    <dgm:style>
+      <a:lnRef idx="0">
+        <a:scrgbClr r="0" g="0" b="0"/>
+      </a:lnRef>
+      <a:fillRef idx="3">
+        <a:scrgbClr r="0" g="0" b="0"/>
+      </a:fillRef>
+      <a:effectRef idx="2">
+        <a:scrgbClr r="0" g="0" b="0"/>
+      </a:effectRef>
+      <a:fontRef idx="minor">
+        <a:schemeClr val="lt1"/>
+      </a:fontRef>
+    </dgm:style>
+  </dgm:styleLbl>
+  <dgm:styleLbl name="fgImgPlace1">
+    <dgm:scene3d>
+      <a:camera prst="orthographicFront"/>
+      <a:lightRig rig="threePt" dir="t"/>
+    </dgm:scene3d>
+    <dgm:sp3d/>
+    <dgm:txPr/>
+    <dgm:style>
+      <a:lnRef idx="0">
+        <a:scrgbClr r="0" g="0" b="0"/>
+      </a:lnRef>
+      <a:fillRef idx="1">
+        <a:scrgbClr r="0" g="0" b="0"/>
+      </a:fillRef>
+      <a:effectRef idx="2">
+        <a:scrgbClr r="0" g="0" b="0"/>
+      </a:effectRef>
+      <a:fontRef idx="minor"/>
+    </dgm:style>
+  </dgm:styleLbl>
+  <dgm:styleLbl name="alignImgPlace1">
+    <dgm:scene3d>
+      <a:camera prst="orthographicFront"/>
+      <a:lightRig rig="threePt" dir="t"/>
+    </dgm:scene3d>
+    <dgm:sp3d/>
+    <dgm:txPr/>
+    <dgm:style>
+      <a:lnRef idx="0">
+        <a:scrgbClr r="0" g="0" b="0"/>
+      </a:lnRef>
+      <a:fillRef idx="1">
+        <a:scrgbClr r="0" g="0" b="0"/>
+      </a:fillRef>
+      <a:effectRef idx="2">
+        <a:scrgbClr r="0" g="0" b="0"/>
+      </a:effectRef>
+      <a:fontRef idx="minor"/>
+    </dgm:style>
+  </dgm:styleLbl>
+  <dgm:styleLbl name="bgImgPlace1">
+    <dgm:scene3d>
+      <a:camera prst="orthographicFront"/>
+      <a:lightRig rig="threePt" dir="t"/>
+    </dgm:scene3d>
+    <dgm:sp3d/>
+    <dgm:txPr/>
+    <dgm:style>
+      <a:lnRef idx="0">
+        <a:scrgbClr r="0" g="0" b="0"/>
+      </a:lnRef>
+      <a:fillRef idx="1">
+        <a:scrgbClr r="0" g="0" b="0"/>
+      </a:fillRef>
+      <a:effectRef idx="2">
+        <a:scrgbClr r="0" g="0" b="0"/>
+      </a:effectRef>
+      <a:fontRef idx="minor"/>
+    </dgm:style>
+  </dgm:styleLbl>
+  <dgm:styleLbl name="sibTrans2D1">
+    <dgm:scene3d>
+      <a:camera prst="orthographicFront"/>
+      <a:lightRig rig="threePt" dir="t"/>
+    </dgm:scene3d>
+    <dgm:sp3d/>
+    <dgm:txPr/>
+    <dgm:style>
+      <a:lnRef idx="0">
+        <a:scrgbClr r="0" g="0" b="0"/>
+      </a:lnRef>
+      <a:fillRef idx="3">
+        <a:scrgbClr r="0" g="0" b="0"/>
+      </a:fillRef>
+      <a:effectRef idx="2">
+        <a:scrgbClr r="0" g="0" b="0"/>
+      </a:effectRef>
+      <a:fontRef idx="minor">
+        <a:schemeClr val="lt1"/>
+      </a:fontRef>
+    </dgm:style>
+  </dgm:styleLbl>
+  <dgm:styleLbl name="fgSibTrans2D1">
+    <dgm:scene3d>
+      <a:camera prst="orthographicFront"/>
+      <a:lightRig rig="threePt" dir="t"/>
+    </dgm:scene3d>
+    <dgm:sp3d/>
+    <dgm:txPr/>
+    <dgm:style>
+      <a:lnRef idx="0">
+        <a:scrgbClr r="0" g="0" b="0"/>
+      </a:lnRef>
+      <a:fillRef idx="3">
+        <a:scrgbClr r="0" g="0" b="0"/>
+      </a:fillRef>
+      <a:effectRef idx="2">
+        <a:scrgbClr r="0" g="0" b="0"/>
+      </a:effectRef>
+      <a:fontRef idx="minor">
+        <a:schemeClr val="lt1"/>
+      </a:fontRef>
+    </dgm:style>
+  </dgm:styleLbl>
+  <dgm:styleLbl name="bgSibTrans2D1">
+    <dgm:scene3d>
+      <a:camera prst="orthographicFront"/>
+      <a:lightRig rig="threePt" dir="t"/>
+    </dgm:scene3d>
+    <dgm:sp3d/>
+    <dgm:txPr/>
+    <dgm:style>
+      <a:lnRef idx="0">
+        <a:scrgbClr r="0" g="0" b="0"/>
+      </a:lnRef>
+      <a:fillRef idx="3">
+        <a:scrgbClr r="0" g="0" b="0"/>
+      </a:fillRef>
+      <a:effectRef idx="2">
+        <a:scrgbClr r="0" g="0" b="0"/>
+      </a:effectRef>
+      <a:fontRef idx="minor">
+        <a:schemeClr val="lt1"/>
+      </a:fontRef>
+    </dgm:style>
+  </dgm:styleLbl>
+  <dgm:styleLbl name="sibTrans1D1">
+    <dgm:scene3d>
+      <a:camera prst="orthographicFront"/>
+      <a:lightRig rig="threePt" dir="t"/>
+    </dgm:scene3d>
+    <dgm:sp3d/>
+    <dgm:txPr/>
+    <dgm:style>
+      <a:lnRef idx="1">
+        <a:scrgbClr r="0" g="0" b="0"/>
+      </a:lnRef>
+      <a:fillRef idx="0">
+        <a:scrgbClr r="0" g="0" b="0"/>
+      </a:fillRef>
+      <a:effectRef idx="0">
+        <a:scrgbClr r="0" g="0" b="0"/>
+      </a:effectRef>
+      <a:fontRef idx="minor"/>
+    </dgm:style>
+  </dgm:styleLbl>
+  <dgm:styleLbl name="callout">
+    <dgm:scene3d>
+      <a:camera prst="orthographicFront"/>
+      <a:lightRig rig="threePt" dir="t"/>
+    </dgm:scene3d>
+    <dgm:sp3d/>
+    <dgm:txPr/>
+    <dgm:style>
+      <a:lnRef idx="2">
+        <a:scrgbClr r="0" g="0" b="0"/>
+      </a:lnRef>
+      <a:fillRef idx="1">
+        <a:scrgbClr r="0" g="0" b="0"/>
+      </a:fillRef>
+      <a:effectRef idx="1">
+        <a:scrgbClr r="0" g="0" b="0"/>
+      </a:effectRef>
+      <a:fontRef idx="minor"/>
+    </dgm:style>
+  </dgm:styleLbl>
+  <dgm:styleLbl name="asst0">
+    <dgm:scene3d>
+      <a:camera prst="orthographicFront"/>
+      <a:lightRig rig="threePt" dir="t"/>
+    </dgm:scene3d>
+    <dgm:sp3d/>
+    <dgm:txPr/>
+    <dgm:style>
+      <a:lnRef idx="0">
+        <a:scrgbClr r="0" g="0" b="0"/>
+      </a:lnRef>
+      <a:fillRef idx="3">
+        <a:scrgbClr r="0" g="0" b="0"/>
+      </a:fillRef>
+      <a:effectRef idx="2">
+        <a:scrgbClr r="0" g="0" b="0"/>
+      </a:effectRef>
+      <a:fontRef idx="minor">
+        <a:schemeClr val="lt1"/>
+      </a:fontRef>
+    </dgm:style>
+  </dgm:styleLbl>
+  <dgm:styleLbl name="asst1">
+    <dgm:scene3d>
+      <a:camera prst="orthographicFront"/>
+      <a:lightRig rig="threePt" dir="t"/>
+    </dgm:scene3d>
+    <dgm:sp3d/>
+    <dgm:txPr/>
+    <dgm:style>
+      <a:lnRef idx="0">
+        <a:scrgbClr r="0" g="0" b="0"/>
+      </a:lnRef>
+      <a:fillRef idx="3">
+        <a:scrgbClr r="0" g="0" b="0"/>
+      </a:fillRef>
+      <a:effectRef idx="2">
+        <a:scrgbClr r="0" g="0" b="0"/>
+      </a:effectRef>
+      <a:fontRef idx="minor">
+        <a:schemeClr val="lt1"/>
+      </a:fontRef>
+    </dgm:style>
+  </dgm:styleLbl>
+  <dgm:styleLbl name="asst2">
+    <dgm:scene3d>
+      <a:camera prst="orthographicFront"/>
+      <a:lightRig rig="threePt" dir="t"/>
+    </dgm:scene3d>
+    <dgm:sp3d/>
+    <dgm:txPr/>
+    <dgm:style>
+      <a:lnRef idx="0">
+        <a:scrgbClr r="0" g="0" b="0"/>
+      </a:lnRef>
+      <a:fillRef idx="3">
+        <a:scrgbClr r="0" g="0" b="0"/>
+      </a:fillRef>
+      <a:effectRef idx="2">
+        <a:scrgbClr r="0" g="0" b="0"/>
+      </a:effectRef>
+      <a:fontRef idx="minor">
+        <a:schemeClr val="lt1"/>
+      </a:fontRef>
+    </dgm:style>
+  </dgm:styleLbl>
+  <dgm:styleLbl name="asst3">
+    <dgm:scene3d>
+      <a:camera prst="orthographicFront"/>
+      <a:lightRig rig="threePt" dir="t"/>
+    </dgm:scene3d>
+    <dgm:sp3d/>
+    <dgm:txPr/>
+    <dgm:style>
+      <a:lnRef idx="0">
+        <a:scrgbClr r="0" g="0" b="0"/>
+      </a:lnRef>
+      <a:fillRef idx="3">
+        <a:scrgbClr r="0" g="0" b="0"/>
+      </a:fillRef>
+      <a:effectRef idx="2">
+        <a:scrgbClr r="0" g="0" b="0"/>
+      </a:effectRef>
+      <a:fontRef idx="minor">
+        <a:schemeClr val="lt1"/>
+      </a:fontRef>
+    </dgm:style>
+  </dgm:styleLbl>
+  <dgm:styleLbl name="asst4">
+    <dgm:scene3d>
+      <a:camera prst="orthographicFront"/>
+      <a:lightRig rig="threePt" dir="t"/>
+    </dgm:scene3d>
+    <dgm:sp3d/>
+    <dgm:txPr/>
+    <dgm:style>
+      <a:lnRef idx="0">
+        <a:scrgbClr r="0" g="0" b="0"/>
+      </a:lnRef>
+      <a:fillRef idx="3">
+        <a:scrgbClr r="0" g="0" b="0"/>
+      </a:fillRef>
+      <a:effectRef idx="2">
+        <a:scrgbClr r="0" g="0" b="0"/>
+      </a:effectRef>
+      <a:fontRef idx="minor">
+        <a:schemeClr val="lt1"/>
+      </a:fontRef>
+    </dgm:style>
+  </dgm:styleLbl>
+  <dgm:styleLbl name="parChTrans2D1">
+    <dgm:scene3d>
+      <a:camera prst="orthographicFront"/>
+      <a:lightRig rig="threePt" dir="t"/>
+    </dgm:scene3d>
+    <dgm:sp3d/>
+    <dgm:txPr/>
+    <dgm:style>
+      <a:lnRef idx="0">
+        <a:scrgbClr r="0" g="0" b="0"/>
+      </a:lnRef>
+      <a:fillRef idx="3">
+        <a:scrgbClr r="0" g="0" b="0"/>
+      </a:fillRef>
+      <a:effectRef idx="2">
+        <a:scrgbClr r="0" g="0" b="0"/>
+      </a:effectRef>
+      <a:fontRef idx="minor">
+        <a:schemeClr val="lt1"/>
+      </a:fontRef>
+    </dgm:style>
+  </dgm:styleLbl>
+  <dgm:styleLbl name="parChTrans2D2">
+    <dgm:scene3d>
+      <a:camera prst="orthographicFront"/>
+      <a:lightRig rig="threePt" dir="t"/>
+    </dgm:scene3d>
+    <dgm:sp3d/>
+    <dgm:txPr/>
+    <dgm:style>
+      <a:lnRef idx="0">
+        <a:scrgbClr r="0" g="0" b="0"/>
+      </a:lnRef>
+      <a:fillRef idx="3">
+        <a:scrgbClr r="0" g="0" b="0"/>
+      </a:fillRef>
+      <a:effectRef idx="2">
+        <a:scrgbClr r="0" g="0" b="0"/>
+      </a:effectRef>
+      <a:fontRef idx="minor">
+        <a:schemeClr val="lt1"/>
+      </a:fontRef>
+    </dgm:style>
+  </dgm:styleLbl>
+  <dgm:styleLbl name="parChTrans2D3">
+    <dgm:scene3d>
+      <a:camera prst="orthographicFront"/>
+      <a:lightRig rig="threePt" dir="t"/>
+    </dgm:scene3d>
+    <dgm:sp3d/>
+    <dgm:txPr/>
+    <dgm:style>
+      <a:lnRef idx="1">
+        <a:scrgbClr r="0" g="0" b="0"/>
+      </a:lnRef>
+      <a:fillRef idx="3">
+        <a:scrgbClr r="0" g="0" b="0"/>
+      </a:fillRef>
+      <a:effectRef idx="2">
+        <a:scrgbClr r="0" g="0" b="0"/>
+      </a:effectRef>
+      <a:fontRef idx="minor">
+        <a:schemeClr val="lt1"/>
+      </a:fontRef>
+    </dgm:style>
+  </dgm:styleLbl>
+  <dgm:styleLbl name="parChTrans2D4">
+    <dgm:scene3d>
+      <a:camera prst="orthographicFront"/>
+      <a:lightRig rig="threePt" dir="t"/>
+    </dgm:scene3d>
+    <dgm:sp3d/>
+    <dgm:txPr/>
+    <dgm:style>
+      <a:lnRef idx="1">
+        <a:scrgbClr r="0" g="0" b="0"/>
+      </a:lnRef>
+      <a:fillRef idx="3">
+        <a:scrgbClr r="0" g="0" b="0"/>
+      </a:fillRef>
+      <a:effectRef idx="2">
+        <a:scrgbClr r="0" g="0" b="0"/>
+      </a:effectRef>
+      <a:fontRef idx="minor">
+        <a:schemeClr val="lt1"/>
+      </a:fontRef>
+    </dgm:style>
+  </dgm:styleLbl>
+  <dgm:styleLbl name="parChTrans1D1">
+    <dgm:scene3d>
+      <a:camera prst="orthographicFront"/>
+      <a:lightRig rig="threePt" dir="t"/>
+    </dgm:scene3d>
+    <dgm:sp3d/>
+    <dgm:txPr/>
+    <dgm:style>
+      <a:lnRef idx="1">
+        <a:scrgbClr r="0" g="0" b="0"/>
+      </a:lnRef>
+      <a:fillRef idx="0">
+        <a:scrgbClr r="0" g="0" b="0"/>
+      </a:fillRef>
+      <a:effectRef idx="0">
+        <a:scrgbClr r="0" g="0" b="0"/>
+      </a:effectRef>
+      <a:fontRef idx="minor"/>
+    </dgm:style>
+  </dgm:styleLbl>
+  <dgm:styleLbl name="parChTrans1D2">
+    <dgm:scene3d>
+      <a:camera prst="orthographicFront"/>
+      <a:lightRig rig="threePt" dir="t"/>
+    </dgm:scene3d>
+    <dgm:sp3d/>
+    <dgm:txPr/>
+    <dgm:style>
+      <a:lnRef idx="1">
+        <a:scrgbClr r="0" g="0" b="0"/>
+      </a:lnRef>
+      <a:fillRef idx="0">
+        <a:scrgbClr r="0" g="0" b="0"/>
+      </a:fillRef>
+      <a:effectRef idx="0">
+        <a:scrgbClr r="0" g="0" b="0"/>
+      </a:effectRef>
+      <a:fontRef idx="minor"/>
+    </dgm:style>
+  </dgm:styleLbl>
+  <dgm:styleLbl name="parChTrans1D3">
+    <dgm:scene3d>
+      <a:camera prst="orthographicFront"/>
+      <a:lightRig rig="threePt" dir="t"/>
+    </dgm:scene3d>
+    <dgm:sp3d/>
+    <dgm:txPr/>
+    <dgm:style>
+      <a:lnRef idx="1">
+        <a:scrgbClr r="0" g="0" b="0"/>
+      </a:lnRef>
+      <a:fillRef idx="0">
+        <a:scrgbClr r="0" g="0" b="0"/>
+      </a:fillRef>
+      <a:effectRef idx="0">
+        <a:scrgbClr r="0" g="0" b="0"/>
+      </a:effectRef>
+      <a:fontRef idx="minor"/>
+    </dgm:style>
+  </dgm:styleLbl>
+  <dgm:styleLbl name="parChTrans1D4">
+    <dgm:scene3d>
+      <a:camera prst="orthographicFront"/>
+      <a:lightRig rig="threePt" dir="t"/>
+    </dgm:scene3d>
+    <dgm:sp3d/>
+    <dgm:txPr/>
+    <dgm:style>
+      <a:lnRef idx="1">
+        <a:scrgbClr r="0" g="0" b="0"/>
+      </a:lnRef>
+      <a:fillRef idx="0">
+        <a:scrgbClr r="0" g="0" b="0"/>
+      </a:fillRef>
+      <a:effectRef idx="0">
+        <a:scrgbClr r="0" g="0" b="0"/>
+      </a:effectRef>
+      <a:fontRef idx="minor"/>
+    </dgm:style>
+  </dgm:styleLbl>
+  <dgm:styleLbl name="fgAcc1">
+    <dgm:scene3d>
+      <a:camera prst="orthographicFront"/>
+      <a:lightRig rig="threePt" dir="t"/>
+    </dgm:scene3d>
+    <dgm:sp3d/>
+    <dgm:txPr/>
+    <dgm:style>
+      <a:lnRef idx="1">
+        <a:scrgbClr r="0" g="0" b="0"/>
+      </a:lnRef>
+      <a:fillRef idx="1">
+        <a:scrgbClr r="0" g="0" b="0"/>
+      </a:fillRef>
+      <a:effectRef idx="0">
+        <a:scrgbClr r="0" g="0" b="0"/>
+      </a:effectRef>
+      <a:fontRef idx="minor"/>
+    </dgm:style>
+  </dgm:styleLbl>
+  <dgm:styleLbl name="conFgAcc1">
+    <dgm:scene3d>
+      <a:camera prst="orthographicFront"/>
+      <a:lightRig rig="threePt" dir="t"/>
+    </dgm:scene3d>
+    <dgm:sp3d/>
+    <dgm:txPr/>
+    <dgm:style>
+      <a:lnRef idx="1">
+        <a:scrgbClr r="0" g="0" b="0"/>
+      </a:lnRef>
+      <a:fillRef idx="1">
+        <a:scrgbClr r="0" g="0" b="0"/>
+      </a:fillRef>
+      <a:effectRef idx="0">
+        <a:scrgbClr r="0" g="0" b="0"/>
+      </a:effectRef>
+      <a:fontRef idx="minor"/>
+    </dgm:style>
+  </dgm:styleLbl>
+  <dgm:styleLbl name="alignAcc1">
+    <dgm:scene3d>
+      <a:camera prst="orthographicFront"/>
+      <a:lightRig rig="threePt" dir="t"/>
+    </dgm:scene3d>
+    <dgm:sp3d/>
+    <dgm:txPr/>
+    <dgm:style>
+      <a:lnRef idx="1">
+        <a:scrgbClr r="0" g="0" b="0"/>
+      </a:lnRef>
+      <a:fillRef idx="1">
+        <a:scrgbClr r="0" g="0" b="0"/>
+      </a:fillRef>
+      <a:effectRef idx="0">
+        <a:scrgbClr r="0" g="0" b="0"/>
+      </a:effectRef>
+      <a:fontRef idx="minor"/>
+    </dgm:style>
+  </dgm:styleLbl>
+  <dgm:styleLbl name="trAlignAcc1">
+    <dgm:scene3d>
+      <a:camera prst="orthographicFront"/>
+      <a:lightRig rig="threePt" dir="t"/>
+    </dgm:scene3d>
+    <dgm:sp3d/>
+    <dgm:txPr/>
+    <dgm:style>
+      <a:lnRef idx="1">
+        <a:scrgbClr r="0" g="0" b="0"/>
+      </a:lnRef>
+      <a:fillRef idx="1">
+        <a:scrgbClr r="0" g="0" b="0"/>
+      </a:fillRef>
+      <a:effectRef idx="0">
+        <a:scrgbClr r="0" g="0" b="0"/>
+      </a:effectRef>
+      <a:fontRef idx="minor"/>
+    </dgm:style>
+  </dgm:styleLbl>
+  <dgm:styleLbl name="bgAcc1">
+    <dgm:scene3d>
+      <a:camera prst="orthographicFront"/>
+      <a:lightRig rig="threePt" dir="t"/>
+    </dgm:scene3d>
+    <dgm:sp3d/>
+    <dgm:txPr/>
+    <dgm:style>
+      <a:lnRef idx="1">
+        <a:scrgbClr r="0" g="0" b="0"/>
+      </a:lnRef>
+      <a:fillRef idx="1">
+        <a:scrgbClr r="0" g="0" b="0"/>
+      </a:fillRef>
+      <a:effectRef idx="0">
+        <a:scrgbClr r="0" g="0" b="0"/>
+      </a:effectRef>
+      <a:fontRef idx="minor"/>
+    </dgm:style>
+  </dgm:styleLbl>
+  <dgm:styleLbl name="solidFgAcc1">
+    <dgm:scene3d>
+      <a:camera prst="orthographicFront"/>
+      <a:lightRig rig="threePt" dir="t"/>
+    </dgm:scene3d>
+    <dgm:sp3d/>
+    <dgm:txPr/>
+    <dgm:style>
+      <a:lnRef idx="1">
+        <a:scrgbClr r="0" g="0" b="0"/>
+      </a:lnRef>
+      <a:fillRef idx="1">
+        <a:scrgbClr r="0" g="0" b="0"/>
+      </a:fillRef>
+      <a:effectRef idx="0">
+        <a:scrgbClr r="0" g="0" b="0"/>
+      </a:effectRef>
+      <a:fontRef idx="minor"/>
+    </dgm:style>
+  </dgm:styleLbl>
+  <dgm:styleLbl name="solidAlignAcc1">
+    <dgm:scene3d>
+      <a:camera prst="orthographicFront"/>
+      <a:lightRig rig="threePt" dir="t"/>
+    </dgm:scene3d>
+    <dgm:sp3d/>
+    <dgm:txPr/>
+    <dgm:style>
+      <a:lnRef idx="1">
+        <a:scrgbClr r="0" g="0" b="0"/>
+      </a:lnRef>
+      <a:fillRef idx="1">
+        <a:scrgbClr r="0" g="0" b="0"/>
+      </a:fillRef>
+      <a:effectRef idx="0">
+        <a:scrgbClr r="0" g="0" b="0"/>
+      </a:effectRef>
+      <a:fontRef idx="minor"/>
+    </dgm:style>
+  </dgm:styleLbl>
+  <dgm:styleLbl name="solidBgAcc1">
+    <dgm:scene3d>
+      <a:camera prst="orthographicFront"/>
+      <a:lightRig rig="threePt" dir="t"/>
+    </dgm:scene3d>
+    <dgm:sp3d/>
+    <dgm:txPr/>
+    <dgm:style>
+      <a:lnRef idx="1">
+        <a:scrgbClr r="0" g="0" b="0"/>
+      </a:lnRef>
+      <a:fillRef idx="1">
+        <a:scrgbClr r="0" g="0" b="0"/>
+      </a:fillRef>
+      <a:effectRef idx="0">
+        <a:scrgbClr r="0" g="0" b="0"/>
+      </a:effectRef>
+      <a:fontRef idx="minor"/>
+    </dgm:style>
+  </dgm:styleLbl>
+  <dgm:styleLbl name="fgAccFollowNode1">
+    <dgm:scene3d>
+      <a:camera prst="orthographicFront"/>
+      <a:lightRig rig="threePt" dir="t"/>
+    </dgm:scene3d>
+    <dgm:sp3d/>
+    <dgm:txPr/>
+    <dgm:style>
+      <a:lnRef idx="1">
+        <a:scrgbClr r="0" g="0" b="0"/>
+      </a:lnRef>
+      <a:fillRef idx="1">
+        <a:scrgbClr r="0" g="0" b="0"/>
+      </a:fillRef>
+      <a:effectRef idx="0">
+        <a:scrgbClr r="0" g="0" b="0"/>
+      </a:effectRef>
+      <a:fontRef idx="minor"/>
+    </dgm:style>
+  </dgm:styleLbl>
+  <dgm:styleLbl name="alignAccFollowNode1">
+    <dgm:scene3d>
+      <a:camera prst="orthographicFront"/>
+      <a:lightRig rig="threePt" dir="t"/>
+    </dgm:scene3d>
+    <dgm:sp3d/>
+    <dgm:txPr/>
+    <dgm:style>
+      <a:lnRef idx="1">
+        <a:scrgbClr r="0" g="0" b="0"/>
+      </a:lnRef>
+      <a:fillRef idx="1">
+        <a:scrgbClr r="0" g="0" b="0"/>
+      </a:fillRef>
+      <a:effectRef idx="0">
+        <a:scrgbClr r="0" g="0" b="0"/>
+      </a:effectRef>
+      <a:fontRef idx="minor"/>
+    </dgm:style>
+  </dgm:styleLbl>
+  <dgm:styleLbl name="bgAccFollowNode1">
+    <dgm:scene3d>
+      <a:camera prst="orthographicFront"/>
+      <a:lightRig rig="threePt" dir="t"/>
+    </dgm:scene3d>
+    <dgm:sp3d/>
+    <dgm:txPr/>
+    <dgm:style>
+      <a:lnRef idx="1">
+        <a:scrgbClr r="0" g="0" b="0"/>
+      </a:lnRef>
+      <a:fillRef idx="1">
+        <a:scrgbClr r="0" g="0" b="0"/>
+      </a:fillRef>
+      <a:effectRef idx="0">
+        <a:scrgbClr r="0" g="0" b="0"/>
+      </a:effectRef>
+      <a:fontRef idx="minor"/>
+    </dgm:style>
+  </dgm:styleLbl>
+  <dgm:styleLbl name="fgAcc0">
+    <dgm:scene3d>
+      <a:camera prst="orthographicFront"/>
+      <a:lightRig rig="threePt" dir="t"/>
+    </dgm:scene3d>
+    <dgm:sp3d/>
+    <dgm:txPr/>
+    <dgm:style>
+      <a:lnRef idx="1">
+        <a:scrgbClr r="0" g="0" b="0"/>
+      </a:lnRef>
+      <a:fillRef idx="1">
+        <a:scrgbClr r="0" g="0" b="0"/>
+      </a:fillRef>
+      <a:effectRef idx="0">
+        <a:scrgbClr r="0" g="0" b="0"/>
+      </a:effectRef>
+      <a:fontRef idx="minor"/>
+    </dgm:style>
+  </dgm:styleLbl>
+  <dgm:styleLbl name="fgAcc2">
+    <dgm:scene3d>
+      <a:camera prst="orthographicFront"/>
+      <a:lightRig rig="threePt" dir="t"/>
+    </dgm:scene3d>
+    <dgm:sp3d/>
+    <dgm:txPr/>
+    <dgm:style>
+      <a:lnRef idx="1">
+        <a:scrgbClr r="0" g="0" b="0"/>
+      </a:lnRef>
+      <a:fillRef idx="1">
+        <a:scrgbClr r="0" g="0" b="0"/>
+      </a:fillRef>
+      <a:effectRef idx="0">
+        <a:scrgbClr r="0" g="0" b="0"/>
+      </a:effectRef>
+      <a:fontRef idx="minor"/>
+    </dgm:style>
+  </dgm:styleLbl>
+  <dgm:styleLbl name="fgAcc3">
+    <dgm:scene3d>
+      <a:camera prst="orthographicFront"/>
+      <a:lightRig rig="threePt" dir="t"/>
+    </dgm:scene3d>
+    <dgm:sp3d/>
+    <dgm:txPr/>
+    <dgm:style>
+      <a:lnRef idx="1">
+        <a:scrgbClr r="0" g="0" b="0"/>
+      </a:lnRef>
+      <a:fillRef idx="1">
+        <a:scrgbClr r="0" g="0" b="0"/>
+      </a:fillRef>
+      <a:effectRef idx="0">
+        <a:scrgbClr r="0" g="0" b="0"/>
+      </a:effectRef>
+      <a:fontRef idx="minor"/>
+    </dgm:style>
+  </dgm:styleLbl>
+  <dgm:styleLbl name="fgAcc4">
+    <dgm:scene3d>
+      <a:camera prst="orthographicFront"/>
+      <a:lightRig rig="threePt" dir="t"/>
+    </dgm:scene3d>
+    <dgm:sp3d/>
+    <dgm:txPr/>
+    <dgm:style>
+      <a:lnRef idx="1">
+        <a:scrgbClr r="0" g="0" b="0"/>
+      </a:lnRef>
+      <a:fillRef idx="1">
+        <a:scrgbClr r="0" g="0" b="0"/>
+      </a:fillRef>
+      <a:effectRef idx="0">
+        <a:scrgbClr r="0" g="0" b="0"/>
+      </a:effectRef>
+      <a:fontRef idx="minor"/>
+    </dgm:style>
+  </dgm:styleLbl>
+  <dgm:styleLbl name="bgShp">
+    <dgm:scene3d>
+      <a:camera prst="orthographicFront"/>
+      <a:lightRig rig="threePt" dir="t"/>
+    </dgm:scene3d>
+    <dgm:sp3d/>
+    <dgm:txPr/>
+    <dgm:style>
+      <a:lnRef idx="0">
+        <a:scrgbClr r="0" g="0" b="0"/>
+      </a:lnRef>
+      <a:fillRef idx="1">
+        <a:scrgbClr r="0" g="0" b="0"/>
+      </a:fillRef>
+      <a:effectRef idx="2">
+        <a:scrgbClr r="0" g="0" b="0"/>
+      </a:effectRef>
+      <a:fontRef idx="minor"/>
+    </dgm:style>
+  </dgm:styleLbl>
+  <dgm:styleLbl name="dkBgShp">
+    <dgm:scene3d>
+      <a:camera prst="orthographicFront"/>
+      <a:lightRig rig="threePt" dir="t"/>
+    </dgm:scene3d>
+    <dgm:sp3d/>
+    <dgm:txPr/>
+    <dgm:style>
+      <a:lnRef idx="0">
+        <a:scrgbClr r="0" g="0" b="0"/>
+      </a:lnRef>
+      <a:fillRef idx="1">
+        <a:scrgbClr r="0" g="0" b="0"/>
+      </a:fillRef>
+      <a:effectRef idx="2">
+        <a:scrgbClr r="0" g="0" b="0"/>
+      </a:effectRef>
+      <a:fontRef idx="minor"/>
+    </dgm:style>
+  </dgm:styleLbl>
+  <dgm:styleLbl name="trBgShp">
+    <dgm:scene3d>
+      <a:camera prst="orthographicFront"/>
+      <a:lightRig rig="threePt" dir="t"/>
+    </dgm:scene3d>
+    <dgm:sp3d/>
+    <dgm:txPr/>
+    <dgm:style>
+      <a:lnRef idx="0">
+        <a:scrgbClr r="0" g="0" b="0"/>
+      </a:lnRef>
+      <a:fillRef idx="1">
+        <a:scrgbClr r="0" g="0" b="0"/>
+      </a:fillRef>
+      <a:effectRef idx="0">
+        <a:scrgbClr r="0" g="0" b="0"/>
+      </a:effectRef>
+      <a:fontRef idx="minor"/>
+    </dgm:style>
+  </dgm:styleLbl>
+  <dgm:styleLbl name="fgShp">
+    <dgm:scene3d>
+      <a:camera prst="orthographicFront"/>
+      <a:lightRig rig="threePt" dir="t"/>
+    </dgm:scene3d>
+    <dgm:sp3d/>
+    <dgm:txPr/>
+    <dgm:style>
+      <a:lnRef idx="0">
+        <a:scrgbClr r="0" g="0" b="0"/>
+      </a:lnRef>
+      <a:fillRef idx="3">
+        <a:scrgbClr r="0" g="0" b="0"/>
+      </a:fillRef>
+      <a:effectRef idx="2">
+        <a:scrgbClr r="0" g="0" b="0"/>
+      </a:effectRef>
+      <a:fontRef idx="minor"/>
+    </dgm:style>
+  </dgm:styleLbl>
+  <dgm:styleLbl name="revTx">
+    <dgm:scene3d>
+      <a:camera prst="orthographicFront"/>
+      <a:lightRig rig="threePt" dir="t"/>
+    </dgm:scene3d>
+    <dgm:sp3d/>
+    <dgm:txPr/>
+    <dgm:style>
+      <a:lnRef idx="0">
+        <a:scrgbClr r="0" g="0" b="0"/>
+      </a:lnRef>
+      <a:fillRef idx="0">
+        <a:scrgbClr r="0" g="0" b="0"/>
+      </a:fillRef>
+      <a:effectRef idx="0">
+        <a:scrgbClr r="0" g="0" b="0"/>
+      </a:effectRef>
+      <a:fontRef idx="minor"/>
+    </dgm:style>
+  </dgm:styleLbl>
+</dgm:styleDef>
+</file>
+
+<file path=ppt/notesMasters/notesMaster1.xml><?xml version="1.0" encoding="utf-8"?>
+<p:notesMaster xmlns:a="http://schemas.openxmlformats.org/drawingml/2006/main" xmlns:r="http://schemas.openxmlformats.org/officeDocument/2006/relationships" xmlns:p="http://schemas.openxmlformats.org/presentationml/2006/main">
+  <p:cSld>
+    <p:bg>
+      <p:bgRef idx="1001">
+        <a:schemeClr val="bg1"/>
+      </p:bgRef>
+    </p:bg>
+    <p:spTree>
+      <p:nvGrpSpPr>
+        <p:cNvPr id="1" name=""/>
+        <p:cNvGrpSpPr/>
+        <p:nvPr/>
+      </p:nvGrpSpPr>
+      <p:grpSpPr>
+        <a:xfrm>
+          <a:off x="0" y="0"/>
+          <a:ext cx="0" cy="0"/>
+          <a:chOff x="0" y="0"/>
+          <a:chExt cx="0" cy="0"/>
+        </a:xfrm>
+      </p:grpSpPr>
+      <p:sp>
+        <p:nvSpPr>
+          <p:cNvPr id="2" name="Header Placeholder 1"/>
+          <p:cNvSpPr>
+            <a:spLocks noGrp="1"/>
+          </p:cNvSpPr>
+          <p:nvPr>
+            <p:ph type="hdr" sz="quarter"/>
+          </p:nvPr>
+        </p:nvSpPr>
+        <p:spPr>
+          <a:xfrm>
+            <a:off x="0" y="0"/>
+            <a:ext cx="2971800" cy="457200"/>
+          </a:xfrm>
+          <a:prstGeom prst="rect">
+            <a:avLst/>
+          </a:prstGeom>
+        </p:spPr>
+        <p:txBody>
+          <a:bodyPr vert="horz" lIns="91440" tIns="45720" rIns="91440" bIns="45720" rtlCol="0"/>
+          <a:lstStyle>
+            <a:lvl1pPr algn="l">
+              <a:defRPr sz="1200"/>
+            </a:lvl1pPr>
+          </a:lstStyle>
+          <a:p>
+            <a:endParaRPr lang="en-US"/>
+          </a:p>
+        </p:txBody>
+      </p:sp>
+      <p:sp>
+        <p:nvSpPr>
+          <p:cNvPr id="3" name="Date Placeholder 2"/>
+          <p:cNvSpPr>
+            <a:spLocks noGrp="1"/>
+          </p:cNvSpPr>
+          <p:nvPr>
+            <p:ph type="dt" idx="1"/>
+          </p:nvPr>
+        </p:nvSpPr>
+        <p:spPr>
+          <a:xfrm>
+            <a:off x="3884613" y="0"/>
+            <a:ext cx="2971800" cy="457200"/>
+          </a:xfrm>
+          <a:prstGeom prst="rect">
+            <a:avLst/>
+          </a:prstGeom>
+        </p:spPr>
+        <p:txBody>
+          <a:bodyPr vert="horz" lIns="91440" tIns="45720" rIns="91440" bIns="45720" rtlCol="0"/>
+          <a:lstStyle>
+            <a:lvl1pPr algn="r">
+              <a:defRPr sz="1200"/>
+            </a:lvl1pPr>
+          </a:lstStyle>
+          <a:p>
+            <a:fld id="{08E864F3-A54A-EB4B-9A17-DA060B0C2424}" type="datetimeFigureOut">
+              <a:rPr lang="en-US" smtClean="0"/>
+              <a:t>21/06/19</a:t>
+            </a:fld>
+            <a:endParaRPr lang="en-US"/>
+          </a:p>
+        </p:txBody>
+      </p:sp>
+      <p:sp>
+        <p:nvSpPr>
+          <p:cNvPr id="4" name="Slide Image Placeholder 3"/>
+          <p:cNvSpPr>
+            <a:spLocks noGrp="1" noRot="1" noChangeAspect="1"/>
+          </p:cNvSpPr>
+          <p:nvPr>
+            <p:ph type="sldImg" idx="2"/>
+          </p:nvPr>
+        </p:nvSpPr>
+        <p:spPr>
+          <a:xfrm>
+            <a:off x="1143000" y="685800"/>
+            <a:ext cx="4572000" cy="3429000"/>
+          </a:xfrm>
+          <a:prstGeom prst="rect">
+            <a:avLst/>
+          </a:prstGeom>
+          <a:noFill/>
+          <a:ln w="12700">
+            <a:solidFill>
+              <a:prstClr val="black"/>
+            </a:solidFill>
+          </a:ln>
+        </p:spPr>
+        <p:txBody>
+          <a:bodyPr vert="horz" lIns="91440" tIns="45720" rIns="91440" bIns="45720" rtlCol="0" anchor="ctr"/>
+          <a:lstStyle/>
+          <a:p>
+            <a:endParaRPr lang="en-US"/>
+          </a:p>
+        </p:txBody>
+      </p:sp>
+      <p:sp>
+        <p:nvSpPr>
+          <p:cNvPr id="5" name="Notes Placeholder 4"/>
+          <p:cNvSpPr>
+            <a:spLocks noGrp="1"/>
+          </p:cNvSpPr>
+          <p:nvPr>
+            <p:ph type="body" sz="quarter" idx="3"/>
+          </p:nvPr>
+        </p:nvSpPr>
+        <p:spPr>
+          <a:xfrm>
+            <a:off x="685800" y="4343400"/>
+            <a:ext cx="5486400" cy="4114800"/>
+          </a:xfrm>
+          <a:prstGeom prst="rect">
+            <a:avLst/>
+          </a:prstGeom>
+        </p:spPr>
+        <p:txBody>
+          <a:bodyPr vert="horz" lIns="91440" tIns="45720" rIns="91440" bIns="45720" rtlCol="0"/>
+          <a:lstStyle/>
+          <a:p>
+            <a:pPr lvl="0"/>
+            <a:r>
+              <a:rPr lang="ga-IE" smtClean="0"/>
+              <a:t>Click to edit Master text styles</a:t>
+            </a:r>
+          </a:p>
+          <a:p>
+            <a:pPr lvl="1"/>
+            <a:r>
+              <a:rPr lang="ga-IE" smtClean="0"/>
+              <a:t>Second level</a:t>
+            </a:r>
+          </a:p>
+          <a:p>
+            <a:pPr lvl="2"/>
+            <a:r>
+              <a:rPr lang="ga-IE" smtClean="0"/>
+              <a:t>Third level</a:t>
+            </a:r>
+          </a:p>
+          <a:p>
+            <a:pPr lvl="3"/>
+            <a:r>
+              <a:rPr lang="ga-IE" smtClean="0"/>
+              <a:t>Fourth level</a:t>
+            </a:r>
+          </a:p>
+          <a:p>
+            <a:pPr lvl="4"/>
+            <a:r>
+              <a:rPr lang="ga-IE" smtClean="0"/>
+              <a:t>Fifth level</a:t>
+            </a:r>
+            <a:endParaRPr lang="en-US"/>
+          </a:p>
+        </p:txBody>
+      </p:sp>
+      <p:sp>
+        <p:nvSpPr>
+          <p:cNvPr id="6" name="Footer Placeholder 5"/>
+          <p:cNvSpPr>
+            <a:spLocks noGrp="1"/>
+          </p:cNvSpPr>
+          <p:nvPr>
+            <p:ph type="ftr" sz="quarter" idx="4"/>
+          </p:nvPr>
+        </p:nvSpPr>
+        <p:spPr>
+          <a:xfrm>
+            <a:off x="0" y="8685213"/>
+            <a:ext cx="2971800" cy="457200"/>
+          </a:xfrm>
+          <a:prstGeom prst="rect">
+            <a:avLst/>
+          </a:prstGeom>
+        </p:spPr>
+        <p:txBody>
+          <a:bodyPr vert="horz" lIns="91440" tIns="45720" rIns="91440" bIns="45720" rtlCol="0" anchor="b"/>
+          <a:lstStyle>
+            <a:lvl1pPr algn="l">
+              <a:defRPr sz="1200"/>
+            </a:lvl1pPr>
+          </a:lstStyle>
+          <a:p>
+            <a:endParaRPr lang="en-US"/>
+          </a:p>
+        </p:txBody>
+      </p:sp>
+      <p:sp>
+        <p:nvSpPr>
+          <p:cNvPr id="7" name="Slide Number Placeholder 6"/>
+          <p:cNvSpPr>
+            <a:spLocks noGrp="1"/>
+          </p:cNvSpPr>
+          <p:nvPr>
+            <p:ph type="sldNum" sz="quarter" idx="5"/>
+          </p:nvPr>
+        </p:nvSpPr>
+        <p:spPr>
+          <a:xfrm>
+            <a:off x="3884613" y="8685213"/>
+            <a:ext cx="2971800" cy="457200"/>
+          </a:xfrm>
+          <a:prstGeom prst="rect">
+            <a:avLst/>
+          </a:prstGeom>
+        </p:spPr>
+        <p:txBody>
+          <a:bodyPr vert="horz" lIns="91440" tIns="45720" rIns="91440" bIns="45720" rtlCol="0" anchor="b"/>
+          <a:lstStyle>
+            <a:lvl1pPr algn="r">
+              <a:defRPr sz="1200"/>
+            </a:lvl1pPr>
+          </a:lstStyle>
+          <a:p>
+            <a:fld id="{A00DC1EC-C729-8449-8590-D0396952BA3D}" type="slidenum">
+              <a:rPr lang="en-US" smtClean="0"/>
+              <a:t>‹#›</a:t>
+            </a:fld>
+            <a:endParaRPr lang="en-US"/>
+          </a:p>
+        </p:txBody>
+      </p:sp>
+    </p:spTree>
+    <p:extLst>
+      <p:ext uri="{BB962C8B-B14F-4D97-AF65-F5344CB8AC3E}">
+        <p14:creationId xmlns:p14="http://schemas.microsoft.com/office/powerpoint/2010/main" val="3456970563"/>
+      </p:ext>
+    </p:extLst>
+  </p:cSld>
+  <p:clrMap bg1="lt1" tx1="dk1" bg2="lt2" tx2="dk2" accent1="accent1" accent2="accent2" accent3="accent3" accent4="accent4" accent5="accent5" accent6="accent6" hlink="hlink" folHlink="folHlink"/>
+  <p:notesStyle>
+    <a:lvl1pPr marL="0" algn="l" defTabSz="457200" rtl="0" eaLnBrk="1" latinLnBrk="0" hangingPunct="1">
+      <a:defRPr sz="1200" kern="1200">
+        <a:solidFill>
+          <a:schemeClr val="tx1"/>
+        </a:solidFill>
+        <a:latin typeface="+mn-lt"/>
+        <a:ea typeface="+mn-ea"/>
+        <a:cs typeface="+mn-cs"/>
+      </a:defRPr>
+    </a:lvl1pPr>
+    <a:lvl2pPr marL="457200" algn="l" defTabSz="457200" rtl="0" eaLnBrk="1" latinLnBrk="0" hangingPunct="1">
+      <a:defRPr sz="1200" kern="1200">
+        <a:solidFill>
+          <a:schemeClr val="tx1"/>
+        </a:solidFill>
+        <a:latin typeface="+mn-lt"/>
+        <a:ea typeface="+mn-ea"/>
+        <a:cs typeface="+mn-cs"/>
+      </a:defRPr>
+    </a:lvl2pPr>
+    <a:lvl3pPr marL="914400" algn="l" defTabSz="457200" rtl="0" eaLnBrk="1" latinLnBrk="0" hangingPunct="1">
+      <a:defRPr sz="1200" kern="1200">
+        <a:solidFill>
+          <a:schemeClr val="tx1"/>
+        </a:solidFill>
+        <a:latin typeface="+mn-lt"/>
+        <a:ea typeface="+mn-ea"/>
+        <a:cs typeface="+mn-cs"/>
+      </a:defRPr>
+    </a:lvl3pPr>
+    <a:lvl4pPr marL="1371600" algn="l" defTabSz="457200" rtl="0" eaLnBrk="1" latinLnBrk="0" hangingPunct="1">
+      <a:defRPr sz="1200" kern="1200">
+        <a:solidFill>
+          <a:schemeClr val="tx1"/>
+        </a:solidFill>
+        <a:latin typeface="+mn-lt"/>
+        <a:ea typeface="+mn-ea"/>
+        <a:cs typeface="+mn-cs"/>
+      </a:defRPr>
+    </a:lvl4pPr>
+    <a:lvl5pPr marL="1828800" algn="l" defTabSz="457200" rtl="0" eaLnBrk="1" latinLnBrk="0" hangingPunct="1">
+      <a:defRPr sz="1200" kern="1200">
+        <a:solidFill>
+          <a:schemeClr val="tx1"/>
+        </a:solidFill>
+        <a:latin typeface="+mn-lt"/>
+        <a:ea typeface="+mn-ea"/>
+        <a:cs typeface="+mn-cs"/>
+      </a:defRPr>
+    </a:lvl5pPr>
+    <a:lvl6pPr marL="2286000" algn="l" defTabSz="457200" rtl="0" eaLnBrk="1" latinLnBrk="0" hangingPunct="1">
+      <a:defRPr sz="1200" kern="1200">
+        <a:solidFill>
+          <a:schemeClr val="tx1"/>
+        </a:solidFill>
+        <a:latin typeface="+mn-lt"/>
+        <a:ea typeface="+mn-ea"/>
+        <a:cs typeface="+mn-cs"/>
+      </a:defRPr>
+    </a:lvl6pPr>
+    <a:lvl7pPr marL="2743200" algn="l" defTabSz="457200" rtl="0" eaLnBrk="1" latinLnBrk="0" hangingPunct="1">
+      <a:defRPr sz="1200" kern="1200">
+        <a:solidFill>
+          <a:schemeClr val="tx1"/>
+        </a:solidFill>
+        <a:latin typeface="+mn-lt"/>
+        <a:ea typeface="+mn-ea"/>
+        <a:cs typeface="+mn-cs"/>
+      </a:defRPr>
+    </a:lvl7pPr>
+    <a:lvl8pPr marL="3200400" algn="l" defTabSz="457200" rtl="0" eaLnBrk="1" latinLnBrk="0" hangingPunct="1">
+      <a:defRPr sz="1200" kern="1200">
+        <a:solidFill>
+          <a:schemeClr val="tx1"/>
+        </a:solidFill>
+        <a:latin typeface="+mn-lt"/>
+        <a:ea typeface="+mn-ea"/>
+        <a:cs typeface="+mn-cs"/>
+      </a:defRPr>
+    </a:lvl8pPr>
+    <a:lvl9pPr marL="3657600" algn="l" defTabSz="457200" rtl="0" eaLnBrk="1" latinLnBrk="0" hangingPunct="1">
+      <a:defRPr sz="1200" kern="1200">
+        <a:solidFill>
+          <a:schemeClr val="tx1"/>
+        </a:solidFill>
+        <a:latin typeface="+mn-lt"/>
+        <a:ea typeface="+mn-ea"/>
+        <a:cs typeface="+mn-cs"/>
+      </a:defRPr>
+    </a:lvl9pPr>
+  </p:notesStyle>
+</p:notesMaster>
+</file>
+
+<file path=ppt/notesSlides/notesSlide1.xml><?xml version="1.0" encoding="utf-8"?>
+<p:notes xmlns:a="http://schemas.openxmlformats.org/drawingml/2006/main" xmlns:r="http://schemas.openxmlformats.org/officeDocument/2006/relationships" xmlns:p="http://schemas.openxmlformats.org/presentationml/2006/main">
+  <p:cSld>
+    <p:spTree>
+      <p:nvGrpSpPr>
+        <p:cNvPr id="1" name=""/>
+        <p:cNvGrpSpPr/>
+        <p:nvPr/>
+      </p:nvGrpSpPr>
+      <p:grpSpPr>
+        <a:xfrm>
+          <a:off x="0" y="0"/>
+          <a:ext cx="0" cy="0"/>
+          <a:chOff x="0" y="0"/>
+          <a:chExt cx="0" cy="0"/>
+        </a:xfrm>
+      </p:grpSpPr>
+      <p:sp>
+        <p:nvSpPr>
+          <p:cNvPr id="2" name="Slide Image Placeholder 1"/>
+          <p:cNvSpPr>
+            <a:spLocks noGrp="1" noRot="1" noChangeAspect="1"/>
+          </p:cNvSpPr>
+          <p:nvPr>
+            <p:ph type="sldImg"/>
+          </p:nvPr>
+        </p:nvSpPr>
+        <p:spPr/>
+      </p:sp>
+      <p:sp>
+        <p:nvSpPr>
+          <p:cNvPr id="3" name="Notes Placeholder 2"/>
+          <p:cNvSpPr>
+            <a:spLocks noGrp="1"/>
+          </p:cNvSpPr>
+          <p:nvPr>
+            <p:ph type="body" idx="1"/>
+          </p:nvPr>
+        </p:nvSpPr>
+        <p:spPr/>
+        <p:txBody>
+          <a:bodyPr/>
+          <a:lstStyle/>
+          <a:p>
+            <a:r>
+              <a:rPr lang="en-US" dirty="0" smtClean="0"/>
+              <a:t>‘Other’ includes</a:t>
+            </a:r>
+            <a:r>
+              <a:rPr lang="en-US" baseline="0" dirty="0" smtClean="0"/>
+              <a:t> recent delay backlog and daily weather</a:t>
+            </a:r>
+            <a:endParaRPr lang="en-US" dirty="0"/>
+          </a:p>
+        </p:txBody>
+      </p:sp>
+      <p:sp>
+        <p:nvSpPr>
+          <p:cNvPr id="4" name="Slide Number Placeholder 3"/>
+          <p:cNvSpPr>
+            <a:spLocks noGrp="1"/>
+          </p:cNvSpPr>
+          <p:nvPr>
+            <p:ph type="sldNum" sz="quarter" idx="10"/>
+          </p:nvPr>
+        </p:nvSpPr>
+        <p:spPr/>
+        <p:txBody>
+          <a:bodyPr/>
+          <a:lstStyle/>
+          <a:p>
+            <a:fld id="{A00DC1EC-C729-8449-8590-D0396952BA3D}" type="slidenum">
+              <a:rPr lang="en-US" smtClean="0"/>
+              <a:t>4</a:t>
+            </a:fld>
+            <a:endParaRPr lang="en-US"/>
+          </a:p>
+        </p:txBody>
+      </p:sp>
+    </p:spTree>
+    <p:extLst>
+      <p:ext uri="{BB962C8B-B14F-4D97-AF65-F5344CB8AC3E}">
+        <p14:creationId xmlns:p14="http://schemas.microsoft.com/office/powerpoint/2010/main" val="1717480412"/>
+      </p:ext>
+    </p:extLst>
+  </p:cSld>
+  <p:clrMapOvr>
+    <a:masterClrMapping/>
+  </p:clrMapOvr>
+</p:notes>
 </file>
 
 <file path=ppt/slideLayouts/slideLayout1.xml><?xml version="1.0" encoding="utf-8"?>
@@ -5193,6 +9355,12 @@
           <a:p>
             <a:r>
               <a:rPr lang="ga-IE" dirty="0" smtClean="0"/>
+              <a:t>Assume all numbers are reliable, accurate and timely</a:t>
+            </a:r>
+          </a:p>
+          <a:p>
+            <a:r>
+              <a:rPr lang="ga-IE" dirty="0" smtClean="0"/>
               <a:t>Missing ‘actual departure time’ means flight was cancelled</a:t>
             </a:r>
             <a:endParaRPr lang="en-US" dirty="0" smtClean="0"/>
@@ -5209,6 +9377,26 @@
             <a:r>
               <a:rPr lang="en-US" dirty="0" smtClean="0"/>
               <a:t>schedule</a:t>
+            </a:r>
+          </a:p>
+          <a:p>
+            <a:r>
+              <a:rPr lang="en-US" dirty="0" smtClean="0"/>
+              <a:t>Other missing values are replaced with either</a:t>
+            </a:r>
+          </a:p>
+          <a:p>
+            <a:pPr lvl="1"/>
+            <a:r>
+              <a:rPr lang="en-US" dirty="0" smtClean="0"/>
+              <a:t>‘Missing’ if a non-numeric value</a:t>
+            </a:r>
+          </a:p>
+          <a:p>
+            <a:pPr lvl="1"/>
+            <a:r>
+              <a:rPr lang="en-US" dirty="0" smtClean="0"/>
+              <a:t>A default value e.g. average temperature</a:t>
             </a:r>
           </a:p>
           <a:p>
@@ -5266,7 +9454,7 @@
           <a:p>
             <a:r>
               <a:rPr lang="en-US" dirty="0" smtClean="0"/>
-              <a:t>Which data points are relevant</a:t>
+              <a:t>How data was used</a:t>
             </a:r>
             <a:endParaRPr lang="en-US" dirty="0"/>
           </a:p>
@@ -5284,7 +9472,9 @@
         </p:nvSpPr>
         <p:spPr/>
         <p:txBody>
-          <a:bodyPr/>
+          <a:bodyPr>
+            <a:normAutofit/>
+          </a:bodyPr>
           <a:lstStyle/>
           <a:p>
             <a:r>
@@ -5295,22 +9485,35 @@
           <a:p>
             <a:r>
               <a:rPr lang="en-US" dirty="0" smtClean="0"/>
-              <a:t>Added recent delays and cancellations (previous hour and same day)</a:t>
+              <a:t>Calculated backlog of recent delays and cancellations</a:t>
             </a:r>
           </a:p>
           <a:p>
             <a:r>
               <a:rPr lang="en-US" dirty="0" smtClean="0"/>
-              <a:t>Used mean value encoding for categorical variables with high cardinality (average delay, cancellation rate)</a:t>
+              <a:t>Calculated average delays and cancellations for</a:t>
             </a:r>
           </a:p>
           <a:p>
             <a:pPr lvl="1"/>
             <a:r>
               <a:rPr lang="en-US" dirty="0" smtClean="0"/>
-              <a:t>(origin, destination, airline, aircraft model)</a:t>
-            </a:r>
-            <a:endParaRPr lang="en-US" dirty="0"/>
+              <a:t>Origin and Destination airports</a:t>
+            </a:r>
+          </a:p>
+          <a:p>
+            <a:pPr lvl="1"/>
+            <a:r>
+              <a:rPr lang="en-US" dirty="0" smtClean="0"/>
+              <a:t>Airline</a:t>
+            </a:r>
+          </a:p>
+          <a:p>
+            <a:pPr lvl="1"/>
+            <a:r>
+              <a:rPr lang="en-US" dirty="0" smtClean="0"/>
+              <a:t>Aircraft model</a:t>
+            </a:r>
           </a:p>
         </p:txBody>
       </p:sp>
@@ -5377,9 +9580,16 @@
             <p:ph idx="1"/>
           </p:nvPr>
         </p:nvSpPr>
-        <p:spPr/>
-        <p:txBody>
-          <a:bodyPr/>
+        <p:spPr>
+          <a:xfrm>
+            <a:off x="457200" y="2770094"/>
+            <a:ext cx="4834356" cy="3541350"/>
+          </a:xfrm>
+        </p:spPr>
+        <p:txBody>
+          <a:bodyPr>
+            <a:normAutofit lnSpcReduction="10000"/>
+          </a:bodyPr>
           <a:lstStyle/>
           <a:p>
             <a:r>
@@ -5395,27 +9605,37 @@
             </a:r>
           </a:p>
           <a:p>
+            <a:r>
+              <a:rPr lang="en-US" dirty="0" smtClean="0"/>
+              <a:t>Cancellation rate correlated with</a:t>
+            </a:r>
+          </a:p>
+          <a:p>
             <a:pPr lvl="1"/>
-            <a:endParaRPr lang="en-US" dirty="0" smtClean="0"/>
-          </a:p>
-          <a:p>
             <a:r>
               <a:rPr lang="en-US" dirty="0" smtClean="0"/>
-              <a:t>Cancellation rate highly correlated with</a:t>
+              <a:t>Aircraft model	55%</a:t>
             </a:r>
           </a:p>
           <a:p>
             <a:pPr lvl="1"/>
             <a:r>
               <a:rPr lang="en-US" dirty="0" smtClean="0"/>
-              <a:t>Airline that operates the flight (21%)</a:t>
+              <a:t>Airline		21%</a:t>
             </a:r>
           </a:p>
           <a:p>
             <a:pPr lvl="1"/>
             <a:r>
               <a:rPr lang="en-US" dirty="0" smtClean="0"/>
-              <a:t>Aircraft model (55%)</a:t>
+              <a:t>Airport		8%</a:t>
+            </a:r>
+          </a:p>
+          <a:p>
+            <a:pPr lvl="1"/>
+            <a:r>
+              <a:rPr lang="en-US" dirty="0" smtClean="0"/>
+              <a:t>Other		4%</a:t>
             </a:r>
           </a:p>
           <a:p>
@@ -5426,6 +9646,28 @@
           </a:p>
         </p:txBody>
       </p:sp>
+      <p:graphicFrame>
+        <p:nvGraphicFramePr>
+          <p:cNvPr id="4" name="Chart 3"/>
+          <p:cNvGraphicFramePr/>
+          <p:nvPr>
+            <p:extLst>
+              <p:ext uri="{D42A27DB-BD31-4B8C-83A1-F6EECF244321}">
+                <p14:modId xmlns:p14="http://schemas.microsoft.com/office/powerpoint/2010/main" val="1170541411"/>
+              </p:ext>
+            </p:extLst>
+          </p:nvPr>
+        </p:nvGraphicFramePr>
+        <p:xfrm>
+          <a:off x="5291556" y="2405280"/>
+          <a:ext cx="3637727" cy="4167929"/>
+        </p:xfrm>
+        <a:graphic>
+          <a:graphicData uri="http://schemas.openxmlformats.org/drawingml/2006/chart">
+            <c:chart xmlns:c="http://schemas.openxmlformats.org/drawingml/2006/chart" xmlns:r="http://schemas.openxmlformats.org/officeDocument/2006/relationships" r:id="rId3"/>
+          </a:graphicData>
+        </a:graphic>
+      </p:graphicFrame>
     </p:spTree>
     <p:extLst>
       <p:ext uri="{BB962C8B-B14F-4D97-AF65-F5344CB8AC3E}">
@@ -5492,7 +9734,7 @@
         <p:spPr/>
         <p:txBody>
           <a:bodyPr>
-            <a:normAutofit lnSpcReduction="10000"/>
+            <a:normAutofit fontScale="85000" lnSpcReduction="20000"/>
           </a:bodyPr>
           <a:lstStyle/>
           <a:p>
@@ -5522,8 +9764,44 @@
           <a:p>
             <a:r>
               <a:rPr lang="en-US" dirty="0" smtClean="0"/>
-              <a:t> </a:t>
-            </a:r>
+              <a:t>More investigation needed </a:t>
+            </a:r>
+          </a:p>
+          <a:p>
+            <a:pPr lvl="1"/>
+            <a:r>
+              <a:rPr lang="en-US" dirty="0" smtClean="0"/>
+              <a:t>Delay backlog at origin and destination airports</a:t>
+            </a:r>
+          </a:p>
+          <a:p>
+            <a:pPr lvl="1"/>
+            <a:r>
+              <a:rPr lang="en-US" dirty="0" smtClean="0"/>
+              <a:t>Local weather conditions</a:t>
+            </a:r>
+          </a:p>
+          <a:p>
+            <a:pPr lvl="1"/>
+            <a:r>
+              <a:rPr lang="en-US" dirty="0" smtClean="0"/>
+              <a:t>Seasonal factors</a:t>
+            </a:r>
+          </a:p>
+          <a:p>
+            <a:pPr lvl="1"/>
+            <a:r>
+              <a:rPr lang="en-US" dirty="0" smtClean="0"/>
+              <a:t>Classification of short, medium and long delays</a:t>
+            </a:r>
+            <a:endParaRPr lang="en-US" dirty="0" smtClean="0"/>
+          </a:p>
+          <a:p>
+            <a:pPr lvl="1"/>
+            <a:endParaRPr lang="en-US" dirty="0"/>
+          </a:p>
+          <a:p>
+            <a:pPr lvl="1"/>
             <a:endParaRPr lang="en-US" dirty="0" smtClean="0"/>
           </a:p>
         </p:txBody>
@@ -5581,52 +9859,31 @@
           </a:p>
         </p:txBody>
       </p:sp>
-      <p:sp>
-        <p:nvSpPr>
-          <p:cNvPr id="3" name="Content Placeholder 2"/>
-          <p:cNvSpPr>
-            <a:spLocks noGrp="1"/>
-          </p:cNvSpPr>
+      <p:graphicFrame>
+        <p:nvGraphicFramePr>
+          <p:cNvPr id="5" name="Content Placeholder 4"/>
+          <p:cNvGraphicFramePr>
+            <a:graphicFrameLocks noGrp="1"/>
+          </p:cNvGraphicFramePr>
           <p:nvPr>
             <p:ph idx="1"/>
-          </p:nvPr>
-        </p:nvSpPr>
-        <p:spPr/>
-        <p:txBody>
-          <a:bodyPr>
-            <a:normAutofit/>
-          </a:bodyPr>
-          <a:lstStyle/>
-          <a:p>
-            <a:r>
-              <a:rPr lang="en-US" dirty="0" smtClean="0"/>
-              <a:t> Be aware of past reliability data for</a:t>
-            </a:r>
-          </a:p>
-          <a:p>
-            <a:pPr lvl="1"/>
-            <a:r>
-              <a:rPr lang="en-US" dirty="0" smtClean="0"/>
-              <a:t>The airline that will operate your customer’s flight</a:t>
-            </a:r>
-          </a:p>
-          <a:p>
-            <a:pPr lvl="1"/>
-            <a:r>
-              <a:rPr lang="en-US" dirty="0" smtClean="0"/>
-              <a:t>The model of the aircraft that they will be </a:t>
-            </a:r>
-            <a:r>
-              <a:rPr lang="en-US" dirty="0" smtClean="0"/>
-              <a:t>flying in</a:t>
-            </a:r>
-            <a:endParaRPr lang="en-US" dirty="0"/>
-          </a:p>
-          <a:p>
-            <a:endParaRPr lang="en-US" dirty="0" smtClean="0"/>
-          </a:p>
-        </p:txBody>
-      </p:sp>
+            <p:extLst>
+              <p:ext uri="{D42A27DB-BD31-4B8C-83A1-F6EECF244321}">
+                <p14:modId xmlns:p14="http://schemas.microsoft.com/office/powerpoint/2010/main" val="1747542896"/>
+              </p:ext>
+            </p:extLst>
+          </p:nvPr>
+        </p:nvGraphicFramePr>
+        <p:xfrm>
+          <a:off x="739775" y="2770094"/>
+          <a:ext cx="7662864" cy="3267169"/>
+        </p:xfrm>
+        <a:graphic>
+          <a:graphicData uri="http://schemas.openxmlformats.org/drawingml/2006/diagram">
+            <dgm:relIds xmlns:dgm="http://schemas.openxmlformats.org/drawingml/2006/diagram" xmlns:r="http://schemas.openxmlformats.org/officeDocument/2006/relationships" r:dm="rId2" r:lo="rId3" r:qs="rId4" r:cs="rId5"/>
+          </a:graphicData>
+        </a:graphic>
+      </p:graphicFrame>
     </p:spTree>
     <p:extLst>
       <p:ext uri="{BB962C8B-B14F-4D97-AF65-F5344CB8AC3E}">
@@ -5890,4 +10147,324 @@
   </a:objectDefaults>
   <a:extraClrSchemeLst/>
 </a:theme>
+</file>
+
+<file path=ppt/theme/theme2.xml><?xml version="1.0" encoding="utf-8"?>
+<a:theme xmlns:a="http://schemas.openxmlformats.org/drawingml/2006/main" name="Office Theme">
+  <a:themeElements>
+    <a:clrScheme name="Office">
+      <a:dk1>
+        <a:sysClr val="windowText" lastClr="000000"/>
+      </a:dk1>
+      <a:lt1>
+        <a:sysClr val="window" lastClr="FFFFFF"/>
+      </a:lt1>
+      <a:dk2>
+        <a:srgbClr val="1F497D"/>
+      </a:dk2>
+      <a:lt2>
+        <a:srgbClr val="EEECE1"/>
+      </a:lt2>
+      <a:accent1>
+        <a:srgbClr val="4F81BD"/>
+      </a:accent1>
+      <a:accent2>
+        <a:srgbClr val="C0504D"/>
+      </a:accent2>
+      <a:accent3>
+        <a:srgbClr val="9BBB59"/>
+      </a:accent3>
+      <a:accent4>
+        <a:srgbClr val="8064A2"/>
+      </a:accent4>
+      <a:accent5>
+        <a:srgbClr val="4BACC6"/>
+      </a:accent5>
+      <a:accent6>
+        <a:srgbClr val="F79646"/>
+      </a:accent6>
+      <a:hlink>
+        <a:srgbClr val="0000FF"/>
+      </a:hlink>
+      <a:folHlink>
+        <a:srgbClr val="800080"/>
+      </a:folHlink>
+    </a:clrScheme>
+    <a:fontScheme name="Office">
+      <a:majorFont>
+        <a:latin typeface="Calibri"/>
+        <a:ea typeface=""/>
+        <a:cs typeface=""/>
+        <a:font script="Jpan" typeface="ＭＳ Ｐゴシック"/>
+        <a:font script="Hang" typeface="맑은 고딕"/>
+        <a:font script="Hans" typeface="宋体"/>
+        <a:font script="Hant" typeface="新細明體"/>
+        <a:font script="Arab" typeface="Times New Roman"/>
+        <a:font script="Hebr" typeface="Times New Roman"/>
+        <a:font script="Thai" typeface="Angsana New"/>
+        <a:font script="Ethi" typeface="Nyala"/>
+        <a:font script="Beng" typeface="Vrinda"/>
+        <a:font script="Gujr" typeface="Shruti"/>
+        <a:font script="Khmr" typeface="MoolBoran"/>
+        <a:font script="Knda" typeface="Tunga"/>
+        <a:font script="Guru" typeface="Raavi"/>
+        <a:font script="Cans" typeface="Euphemia"/>
+        <a:font script="Cher" typeface="Plantagenet Cherokee"/>
+        <a:font script="Yiii" typeface="Microsoft Yi Baiti"/>
+        <a:font script="Tibt" typeface="Microsoft Himalaya"/>
+        <a:font script="Thaa" typeface="MV Boli"/>
+        <a:font script="Deva" typeface="Mangal"/>
+        <a:font script="Telu" typeface="Gautami"/>
+        <a:font script="Taml" typeface="Latha"/>
+        <a:font script="Syrc" typeface="Estrangelo Edessa"/>
+        <a:font script="Orya" typeface="Kalinga"/>
+        <a:font script="Mlym" typeface="Kartika"/>
+        <a:font script="Laoo" typeface="DokChampa"/>
+        <a:font script="Sinh" typeface="Iskoola Pota"/>
+        <a:font script="Mong" typeface="Mongolian Baiti"/>
+        <a:font script="Viet" typeface="Times New Roman"/>
+        <a:font script="Uigh" typeface="Microsoft Uighur"/>
+        <a:font script="Geor" typeface="Sylfaen"/>
+      </a:majorFont>
+      <a:minorFont>
+        <a:latin typeface="Calibri"/>
+        <a:ea typeface=""/>
+        <a:cs typeface=""/>
+        <a:font script="Jpan" typeface="ＭＳ Ｐゴシック"/>
+        <a:font script="Hang" typeface="맑은 고딕"/>
+        <a:font script="Hans" typeface="宋体"/>
+        <a:font script="Hant" typeface="新細明體"/>
+        <a:font script="Arab" typeface="Arial"/>
+        <a:font script="Hebr" typeface="Arial"/>
+        <a:font script="Thai" typeface="Cordia New"/>
+        <a:font script="Ethi" typeface="Nyala"/>
+        <a:font script="Beng" typeface="Vrinda"/>
+        <a:font script="Gujr" typeface="Shruti"/>
+        <a:font script="Khmr" typeface="DaunPenh"/>
+        <a:font script="Knda" typeface="Tunga"/>
+        <a:font script="Guru" typeface="Raavi"/>
+        <a:font script="Cans" typeface="Euphemia"/>
+        <a:font script="Cher" typeface="Plantagenet Cherokee"/>
+        <a:font script="Yiii" typeface="Microsoft Yi Baiti"/>
+        <a:font script="Tibt" typeface="Microsoft Himalaya"/>
+        <a:font script="Thaa" typeface="MV Boli"/>
+        <a:font script="Deva" typeface="Mangal"/>
+        <a:font script="Telu" typeface="Gautami"/>
+        <a:font script="Taml" typeface="Latha"/>
+        <a:font script="Syrc" typeface="Estrangelo Edessa"/>
+        <a:font script="Orya" typeface="Kalinga"/>
+        <a:font script="Mlym" typeface="Kartika"/>
+        <a:font script="Laoo" typeface="DokChampa"/>
+        <a:font script="Sinh" typeface="Iskoola Pota"/>
+        <a:font script="Mong" typeface="Mongolian Baiti"/>
+        <a:font script="Viet" typeface="Arial"/>
+        <a:font script="Uigh" typeface="Microsoft Uighur"/>
+        <a:font script="Geor" typeface="Sylfaen"/>
+      </a:minorFont>
+    </a:fontScheme>
+    <a:fmtScheme name="Office">
+      <a:fillStyleLst>
+        <a:solidFill>
+          <a:schemeClr val="phClr"/>
+        </a:solidFill>
+        <a:gradFill rotWithShape="1">
+          <a:gsLst>
+            <a:gs pos="0">
+              <a:schemeClr val="phClr">
+                <a:tint val="50000"/>
+                <a:satMod val="300000"/>
+              </a:schemeClr>
+            </a:gs>
+            <a:gs pos="35000">
+              <a:schemeClr val="phClr">
+                <a:tint val="37000"/>
+                <a:satMod val="300000"/>
+              </a:schemeClr>
+            </a:gs>
+            <a:gs pos="100000">
+              <a:schemeClr val="phClr">
+                <a:tint val="15000"/>
+                <a:satMod val="350000"/>
+              </a:schemeClr>
+            </a:gs>
+          </a:gsLst>
+          <a:lin ang="16200000" scaled="1"/>
+        </a:gradFill>
+        <a:gradFill rotWithShape="1">
+          <a:gsLst>
+            <a:gs pos="0">
+              <a:schemeClr val="phClr">
+                <a:tint val="100000"/>
+                <a:shade val="100000"/>
+                <a:satMod val="130000"/>
+              </a:schemeClr>
+            </a:gs>
+            <a:gs pos="100000">
+              <a:schemeClr val="phClr">
+                <a:tint val="50000"/>
+                <a:shade val="100000"/>
+                <a:satMod val="350000"/>
+              </a:schemeClr>
+            </a:gs>
+          </a:gsLst>
+          <a:lin ang="16200000" scaled="0"/>
+        </a:gradFill>
+      </a:fillStyleLst>
+      <a:lnStyleLst>
+        <a:ln w="9525" cap="flat" cmpd="sng" algn="ctr">
+          <a:solidFill>
+            <a:schemeClr val="phClr">
+              <a:shade val="95000"/>
+              <a:satMod val="105000"/>
+            </a:schemeClr>
+          </a:solidFill>
+          <a:prstDash val="solid"/>
+        </a:ln>
+        <a:ln w="25400" cap="flat" cmpd="sng" algn="ctr">
+          <a:solidFill>
+            <a:schemeClr val="phClr"/>
+          </a:solidFill>
+          <a:prstDash val="solid"/>
+        </a:ln>
+        <a:ln w="38100" cap="flat" cmpd="sng" algn="ctr">
+          <a:solidFill>
+            <a:schemeClr val="phClr"/>
+          </a:solidFill>
+          <a:prstDash val="solid"/>
+        </a:ln>
+      </a:lnStyleLst>
+      <a:effectStyleLst>
+        <a:effectStyle>
+          <a:effectLst>
+            <a:outerShdw blurRad="40000" dist="20000" dir="5400000" rotWithShape="0">
+              <a:srgbClr val="000000">
+                <a:alpha val="38000"/>
+              </a:srgbClr>
+            </a:outerShdw>
+          </a:effectLst>
+        </a:effectStyle>
+        <a:effectStyle>
+          <a:effectLst>
+            <a:outerShdw blurRad="40000" dist="23000" dir="5400000" rotWithShape="0">
+              <a:srgbClr val="000000">
+                <a:alpha val="35000"/>
+              </a:srgbClr>
+            </a:outerShdw>
+          </a:effectLst>
+        </a:effectStyle>
+        <a:effectStyle>
+          <a:effectLst>
+            <a:outerShdw blurRad="40000" dist="23000" dir="5400000" rotWithShape="0">
+              <a:srgbClr val="000000">
+                <a:alpha val="35000"/>
+              </a:srgbClr>
+            </a:outerShdw>
+          </a:effectLst>
+          <a:scene3d>
+            <a:camera prst="orthographicFront">
+              <a:rot lat="0" lon="0" rev="0"/>
+            </a:camera>
+            <a:lightRig rig="threePt" dir="t">
+              <a:rot lat="0" lon="0" rev="1200000"/>
+            </a:lightRig>
+          </a:scene3d>
+          <a:sp3d>
+            <a:bevelT w="63500" h="25400"/>
+          </a:sp3d>
+        </a:effectStyle>
+      </a:effectStyleLst>
+      <a:bgFillStyleLst>
+        <a:solidFill>
+          <a:schemeClr val="phClr"/>
+        </a:solidFill>
+        <a:gradFill rotWithShape="1">
+          <a:gsLst>
+            <a:gs pos="0">
+              <a:schemeClr val="phClr">
+                <a:tint val="40000"/>
+                <a:satMod val="350000"/>
+              </a:schemeClr>
+            </a:gs>
+            <a:gs pos="40000">
+              <a:schemeClr val="phClr">
+                <a:tint val="45000"/>
+                <a:shade val="99000"/>
+                <a:satMod val="350000"/>
+              </a:schemeClr>
+            </a:gs>
+            <a:gs pos="100000">
+              <a:schemeClr val="phClr">
+                <a:shade val="20000"/>
+                <a:satMod val="255000"/>
+              </a:schemeClr>
+            </a:gs>
+          </a:gsLst>
+          <a:path path="circle">
+            <a:fillToRect l="50000" t="-80000" r="50000" b="180000"/>
+          </a:path>
+        </a:gradFill>
+        <a:gradFill rotWithShape="1">
+          <a:gsLst>
+            <a:gs pos="0">
+              <a:schemeClr val="phClr">
+                <a:tint val="80000"/>
+                <a:satMod val="300000"/>
+              </a:schemeClr>
+            </a:gs>
+            <a:gs pos="100000">
+              <a:schemeClr val="phClr">
+                <a:shade val="30000"/>
+                <a:satMod val="200000"/>
+              </a:schemeClr>
+            </a:gs>
+          </a:gsLst>
+          <a:path path="circle">
+            <a:fillToRect l="50000" t="50000" r="50000" b="50000"/>
+          </a:path>
+        </a:gradFill>
+      </a:bgFillStyleLst>
+    </a:fmtScheme>
+  </a:themeElements>
+  <a:objectDefaults>
+    <a:spDef>
+      <a:spPr/>
+      <a:bodyPr/>
+      <a:lstStyle/>
+      <a:style>
+        <a:lnRef idx="1">
+          <a:schemeClr val="accent1"/>
+        </a:lnRef>
+        <a:fillRef idx="3">
+          <a:schemeClr val="accent1"/>
+        </a:fillRef>
+        <a:effectRef idx="2">
+          <a:schemeClr val="accent1"/>
+        </a:effectRef>
+        <a:fontRef idx="minor">
+          <a:schemeClr val="lt1"/>
+        </a:fontRef>
+      </a:style>
+    </a:spDef>
+    <a:lnDef>
+      <a:spPr/>
+      <a:bodyPr/>
+      <a:lstStyle/>
+      <a:style>
+        <a:lnRef idx="2">
+          <a:schemeClr val="accent1"/>
+        </a:lnRef>
+        <a:fillRef idx="0">
+          <a:schemeClr val="accent1"/>
+        </a:fillRef>
+        <a:effectRef idx="1">
+          <a:schemeClr val="accent1"/>
+        </a:effectRef>
+        <a:fontRef idx="minor">
+          <a:schemeClr val="tx1"/>
+        </a:fontRef>
+      </a:style>
+    </a:lnDef>
+  </a:objectDefaults>
+  <a:extraClrSchemeLst/>
+</a:theme>
 </file>
</xml_diff>

<commit_message>
First review of slides
</commit_message>
<xml_diff>
--- a/CaseStudyPresentation.pptx
+++ b/CaseStudyPresentation.pptx
@@ -167,7 +167,7 @@
               <c:strCache>
                 <c:ptCount val="5"/>
                 <c:pt idx="0">
-                  <c:v>Aircraft Model</c:v>
+                  <c:v>Aircraft</c:v>
                 </c:pt>
                 <c:pt idx="1">
                   <c:v>Airline</c:v>
@@ -1102,10 +1102,10 @@
         <a:p>
           <a:pPr rtl="0"/>
           <a:r>
-            <a:rPr lang="en-US" smtClean="0"/>
-            <a:t>The model of the aircraft that they will be flying in</a:t>
+            <a:rPr lang="en-US" dirty="0" smtClean="0"/>
+            <a:t>The model of the aircraft that will be used</a:t>
           </a:r>
-          <a:endParaRPr lang="en-US"/>
+          <a:endParaRPr lang="en-US" dirty="0"/>
         </a:p>
       </dgm:t>
     </dgm:pt>
@@ -1141,7 +1141,7 @@
           <a:pPr rtl="0"/>
           <a:r>
             <a:rPr lang="en-US" dirty="0" smtClean="0"/>
-            <a:t>The origin and destination airport</a:t>
+            <a:t>The origin and destination airports</a:t>
           </a:r>
           <a:endParaRPr lang="en-US" dirty="0"/>
         </a:p>
@@ -1283,6 +1283,13 @@
         </dgm:presLayoutVars>
       </dgm:prSet>
       <dgm:spPr/>
+      <dgm:t>
+        <a:bodyPr/>
+        <a:lstStyle/>
+        <a:p>
+          <a:endParaRPr lang="en-US"/>
+        </a:p>
+      </dgm:t>
     </dgm:pt>
     <dgm:pt modelId="{C1FFF8C4-7FEF-FA46-AD40-CF3B65E28326}" type="pres">
       <dgm:prSet presAssocID="{6EBFFEFD-0A87-BE47-9DF7-1FF03D6F0662}" presName="parTrans" presStyleLbl="bgSibTrans2D1" presStyleIdx="2" presStyleCnt="5"/>
@@ -1327,7 +1334,7 @@
       <dgm:spPr/>
     </dgm:pt>
     <dgm:pt modelId="{AED10C36-196C-DC40-8282-184DF90E130D}" type="pres">
-      <dgm:prSet presAssocID="{61DFA804-1803-EC46-8AFD-8AA23F819AF1}" presName="node" presStyleLbl="node1" presStyleIdx="4" presStyleCnt="5">
+      <dgm:prSet presAssocID="{61DFA804-1803-EC46-8AFD-8AA23F819AF1}" presName="node" presStyleLbl="node1" presStyleIdx="4" presStyleCnt="5" custScaleX="118555" custScaleY="108217">
         <dgm:presLayoutVars>
           <dgm:bulletEnabled val="1"/>
         </dgm:presLayoutVars>
@@ -1398,7 +1405,7 @@
       </dsp:nvSpPr>
       <dsp:spPr>
         <a:xfrm>
-          <a:off x="3136386" y="1876440"/>
+          <a:off x="3075127" y="1876440"/>
           <a:ext cx="1390091" cy="1390091"/>
         </a:xfrm>
         <a:prstGeom prst="ellipse">
@@ -1500,7 +1507,7 @@
         </a:p>
       </dsp:txBody>
       <dsp:txXfrm>
-        <a:off x="3339960" y="2080014"/>
+        <a:off x="3278701" y="2080014"/>
         <a:ext cx="982943" cy="982943"/>
       </dsp:txXfrm>
     </dsp:sp>
@@ -1511,7 +1518,7 @@
       </dsp:nvSpPr>
       <dsp:spPr>
         <a:xfrm rot="10800000">
-          <a:off x="1788817" y="2373398"/>
+          <a:off x="1727558" y="2373398"/>
           <a:ext cx="1273452" cy="396176"/>
         </a:xfrm>
         <a:prstGeom prst="leftArrow">
@@ -1602,7 +1609,7 @@
       </dsp:nvSpPr>
       <dsp:spPr>
         <a:xfrm>
-          <a:off x="1128524" y="2043251"/>
+          <a:off x="1067265" y="2043251"/>
           <a:ext cx="1320586" cy="1056469"/>
         </a:xfrm>
         <a:prstGeom prst="roundRect">
@@ -1706,7 +1713,7 @@
         </a:p>
       </dsp:txBody>
       <dsp:txXfrm>
-        <a:off x="1159467" y="2074194"/>
+        <a:off x="1098208" y="2074194"/>
         <a:ext cx="1258700" cy="994583"/>
       </dsp:txXfrm>
     </dsp:sp>
@@ -1717,7 +1724,7 @@
       </dsp:nvSpPr>
       <dsp:spPr>
         <a:xfrm rot="13500000">
-          <a:off x="2200592" y="1379285"/>
+          <a:off x="2139333" y="1379285"/>
           <a:ext cx="1273452" cy="396176"/>
         </a:xfrm>
         <a:prstGeom prst="leftArrow">
@@ -1808,213 +1815,7 @@
       </dsp:nvSpPr>
       <dsp:spPr>
         <a:xfrm>
-          <a:off x="1726792" y="598904"/>
-          <a:ext cx="1320586" cy="1056469"/>
-        </a:xfrm>
-        <a:prstGeom prst="roundRect">
-          <a:avLst>
-            <a:gd name="adj" fmla="val 10000"/>
-          </a:avLst>
-        </a:prstGeom>
-        <a:gradFill rotWithShape="0">
-          <a:gsLst>
-            <a:gs pos="0">
-              <a:schemeClr val="accent1">
-                <a:hueOff val="0"/>
-                <a:satOff val="0"/>
-                <a:lumOff val="0"/>
-                <a:alphaOff val="0"/>
-                <a:tint val="50000"/>
-                <a:shade val="100000"/>
-                <a:alpha val="100000"/>
-                <a:satMod val="150000"/>
-              </a:schemeClr>
-            </a:gs>
-            <a:gs pos="40000">
-              <a:schemeClr val="accent1">
-                <a:hueOff val="0"/>
-                <a:satOff val="0"/>
-                <a:lumOff val="0"/>
-                <a:alphaOff val="0"/>
-                <a:tint val="70000"/>
-                <a:shade val="100000"/>
-                <a:alpha val="100000"/>
-                <a:satMod val="150000"/>
-              </a:schemeClr>
-            </a:gs>
-            <a:gs pos="100000">
-              <a:schemeClr val="accent1">
-                <a:hueOff val="0"/>
-                <a:satOff val="0"/>
-                <a:lumOff val="0"/>
-                <a:alphaOff val="0"/>
-                <a:shade val="90000"/>
-                <a:satMod val="110000"/>
-              </a:schemeClr>
-            </a:gs>
-          </a:gsLst>
-          <a:lin ang="5400000" scaled="0"/>
-        </a:gradFill>
-        <a:ln>
-          <a:noFill/>
-        </a:ln>
-        <a:effectLst>
-          <a:outerShdw blurRad="88900" dist="50800" dir="11400000" sx="102000" sy="101000" algn="tl" rotWithShape="0">
-            <a:srgbClr val="000000">
-              <a:alpha val="35000"/>
-            </a:srgbClr>
-          </a:outerShdw>
-        </a:effectLst>
-        <a:scene3d>
-          <a:camera prst="perspectiveFront" fov="4800000"/>
-          <a:lightRig rig="morning" dir="tl"/>
-        </a:scene3d>
-        <a:sp3d prstMaterial="softmetal">
-          <a:bevelT w="0" h="0"/>
-        </a:sp3d>
-      </dsp:spPr>
-      <dsp:style>
-        <a:lnRef idx="0">
-          <a:scrgbClr r="0" g="0" b="0"/>
-        </a:lnRef>
-        <a:fillRef idx="3">
-          <a:scrgbClr r="0" g="0" b="0"/>
-        </a:fillRef>
-        <a:effectRef idx="2">
-          <a:scrgbClr r="0" g="0" b="0"/>
-        </a:effectRef>
-        <a:fontRef idx="minor">
-          <a:schemeClr val="lt1"/>
-        </a:fontRef>
-      </dsp:style>
-      <dsp:txBody>
-        <a:bodyPr spcFirstLastPara="0" vert="horz" wrap="square" lIns="26670" tIns="26670" rIns="26670" bIns="26670" numCol="1" spcCol="1270" anchor="ctr" anchorCtr="0">
-          <a:noAutofit/>
-        </a:bodyPr>
-        <a:lstStyle/>
-        <a:p>
-          <a:pPr lvl="0" algn="ctr" defTabSz="622300" rtl="0">
-            <a:lnSpc>
-              <a:spcPct val="90000"/>
-            </a:lnSpc>
-            <a:spcBef>
-              <a:spcPct val="0"/>
-            </a:spcBef>
-            <a:spcAft>
-              <a:spcPct val="35000"/>
-            </a:spcAft>
-          </a:pPr>
-          <a:r>
-            <a:rPr lang="en-US" sz="1400" kern="1200" smtClean="0"/>
-            <a:t>The model of the aircraft that they will be flying in</a:t>
-          </a:r>
-          <a:endParaRPr lang="en-US" sz="1400" kern="1200"/>
-        </a:p>
-      </dsp:txBody>
-      <dsp:txXfrm>
-        <a:off x="1757735" y="629847"/>
-        <a:ext cx="1258700" cy="994583"/>
-      </dsp:txXfrm>
-    </dsp:sp>
-    <dsp:sp modelId="{C1FFF8C4-7FEF-FA46-AD40-CF3B65E28326}">
-      <dsp:nvSpPr>
-        <dsp:cNvPr id="0" name=""/>
-        <dsp:cNvSpPr/>
-      </dsp:nvSpPr>
-      <dsp:spPr>
-        <a:xfrm rot="16200000">
-          <a:off x="3194705" y="967509"/>
-          <a:ext cx="1273452" cy="396176"/>
-        </a:xfrm>
-        <a:prstGeom prst="leftArrow">
-          <a:avLst>
-            <a:gd name="adj1" fmla="val 60000"/>
-            <a:gd name="adj2" fmla="val 50000"/>
-          </a:avLst>
-        </a:prstGeom>
-        <a:gradFill rotWithShape="0">
-          <a:gsLst>
-            <a:gs pos="0">
-              <a:schemeClr val="accent1">
-                <a:tint val="60000"/>
-                <a:hueOff val="0"/>
-                <a:satOff val="0"/>
-                <a:lumOff val="0"/>
-                <a:alphaOff val="0"/>
-                <a:tint val="50000"/>
-                <a:shade val="100000"/>
-                <a:alpha val="100000"/>
-                <a:satMod val="150000"/>
-              </a:schemeClr>
-            </a:gs>
-            <a:gs pos="40000">
-              <a:schemeClr val="accent1">
-                <a:tint val="60000"/>
-                <a:hueOff val="0"/>
-                <a:satOff val="0"/>
-                <a:lumOff val="0"/>
-                <a:alphaOff val="0"/>
-                <a:tint val="70000"/>
-                <a:shade val="100000"/>
-                <a:alpha val="100000"/>
-                <a:satMod val="150000"/>
-              </a:schemeClr>
-            </a:gs>
-            <a:gs pos="100000">
-              <a:schemeClr val="accent1">
-                <a:tint val="60000"/>
-                <a:hueOff val="0"/>
-                <a:satOff val="0"/>
-                <a:lumOff val="0"/>
-                <a:alphaOff val="0"/>
-                <a:shade val="90000"/>
-                <a:satMod val="110000"/>
-              </a:schemeClr>
-            </a:gs>
-          </a:gsLst>
-          <a:lin ang="5400000" scaled="0"/>
-        </a:gradFill>
-        <a:ln>
-          <a:noFill/>
-        </a:ln>
-        <a:effectLst>
-          <a:outerShdw blurRad="88900" dist="50800" dir="11400000" sx="102000" sy="101000" algn="tl" rotWithShape="0">
-            <a:srgbClr val="000000">
-              <a:alpha val="35000"/>
-            </a:srgbClr>
-          </a:outerShdw>
-        </a:effectLst>
-        <a:scene3d>
-          <a:camera prst="perspectiveFront" fov="4800000"/>
-          <a:lightRig rig="morning" dir="tl"/>
-        </a:scene3d>
-        <a:sp3d prstMaterial="softmetal">
-          <a:bevelT w="0" h="0"/>
-        </a:sp3d>
-      </dsp:spPr>
-      <dsp:style>
-        <a:lnRef idx="0">
-          <a:scrgbClr r="0" g="0" b="0"/>
-        </a:lnRef>
-        <a:fillRef idx="3">
-          <a:scrgbClr r="0" g="0" b="0"/>
-        </a:fillRef>
-        <a:effectRef idx="2">
-          <a:scrgbClr r="0" g="0" b="0"/>
-        </a:effectRef>
-        <a:fontRef idx="minor">
-          <a:schemeClr val="lt1"/>
-        </a:fontRef>
-      </dsp:style>
-    </dsp:sp>
-    <dsp:sp modelId="{EAACD24D-7FD7-5C45-A629-68E82AB1AE08}">
-      <dsp:nvSpPr>
-        <dsp:cNvPr id="0" name=""/>
-        <dsp:cNvSpPr/>
-      </dsp:nvSpPr>
-      <dsp:spPr>
-        <a:xfrm>
-          <a:off x="3171138" y="637"/>
+          <a:off x="1665533" y="598904"/>
           <a:ext cx="1320586" cy="1056469"/>
         </a:xfrm>
         <a:prstGeom prst="roundRect">
@@ -2112,13 +1913,219 @@
           </a:pPr>
           <a:r>
             <a:rPr lang="en-US" sz="1400" kern="1200" dirty="0" smtClean="0"/>
-            <a:t>The origin and destination airport</a:t>
+            <a:t>The model of the aircraft that will be used</a:t>
           </a:r>
           <a:endParaRPr lang="en-US" sz="1400" kern="1200" dirty="0"/>
         </a:p>
       </dsp:txBody>
       <dsp:txXfrm>
-        <a:off x="3202081" y="31580"/>
+        <a:off x="1696476" y="629847"/>
+        <a:ext cx="1258700" cy="994583"/>
+      </dsp:txXfrm>
+    </dsp:sp>
+    <dsp:sp modelId="{C1FFF8C4-7FEF-FA46-AD40-CF3B65E28326}">
+      <dsp:nvSpPr>
+        <dsp:cNvPr id="0" name=""/>
+        <dsp:cNvSpPr/>
+      </dsp:nvSpPr>
+      <dsp:spPr>
+        <a:xfrm rot="16200000">
+          <a:off x="3133447" y="967509"/>
+          <a:ext cx="1273452" cy="396176"/>
+        </a:xfrm>
+        <a:prstGeom prst="leftArrow">
+          <a:avLst>
+            <a:gd name="adj1" fmla="val 60000"/>
+            <a:gd name="adj2" fmla="val 50000"/>
+          </a:avLst>
+        </a:prstGeom>
+        <a:gradFill rotWithShape="0">
+          <a:gsLst>
+            <a:gs pos="0">
+              <a:schemeClr val="accent1">
+                <a:tint val="60000"/>
+                <a:hueOff val="0"/>
+                <a:satOff val="0"/>
+                <a:lumOff val="0"/>
+                <a:alphaOff val="0"/>
+                <a:tint val="50000"/>
+                <a:shade val="100000"/>
+                <a:alpha val="100000"/>
+                <a:satMod val="150000"/>
+              </a:schemeClr>
+            </a:gs>
+            <a:gs pos="40000">
+              <a:schemeClr val="accent1">
+                <a:tint val="60000"/>
+                <a:hueOff val="0"/>
+                <a:satOff val="0"/>
+                <a:lumOff val="0"/>
+                <a:alphaOff val="0"/>
+                <a:tint val="70000"/>
+                <a:shade val="100000"/>
+                <a:alpha val="100000"/>
+                <a:satMod val="150000"/>
+              </a:schemeClr>
+            </a:gs>
+            <a:gs pos="100000">
+              <a:schemeClr val="accent1">
+                <a:tint val="60000"/>
+                <a:hueOff val="0"/>
+                <a:satOff val="0"/>
+                <a:lumOff val="0"/>
+                <a:alphaOff val="0"/>
+                <a:shade val="90000"/>
+                <a:satMod val="110000"/>
+              </a:schemeClr>
+            </a:gs>
+          </a:gsLst>
+          <a:lin ang="5400000" scaled="0"/>
+        </a:gradFill>
+        <a:ln>
+          <a:noFill/>
+        </a:ln>
+        <a:effectLst>
+          <a:outerShdw blurRad="88900" dist="50800" dir="11400000" sx="102000" sy="101000" algn="tl" rotWithShape="0">
+            <a:srgbClr val="000000">
+              <a:alpha val="35000"/>
+            </a:srgbClr>
+          </a:outerShdw>
+        </a:effectLst>
+        <a:scene3d>
+          <a:camera prst="perspectiveFront" fov="4800000"/>
+          <a:lightRig rig="morning" dir="tl"/>
+        </a:scene3d>
+        <a:sp3d prstMaterial="softmetal">
+          <a:bevelT w="0" h="0"/>
+        </a:sp3d>
+      </dsp:spPr>
+      <dsp:style>
+        <a:lnRef idx="0">
+          <a:scrgbClr r="0" g="0" b="0"/>
+        </a:lnRef>
+        <a:fillRef idx="3">
+          <a:scrgbClr r="0" g="0" b="0"/>
+        </a:fillRef>
+        <a:effectRef idx="2">
+          <a:scrgbClr r="0" g="0" b="0"/>
+        </a:effectRef>
+        <a:fontRef idx="minor">
+          <a:schemeClr val="lt1"/>
+        </a:fontRef>
+      </dsp:style>
+    </dsp:sp>
+    <dsp:sp modelId="{EAACD24D-7FD7-5C45-A629-68E82AB1AE08}">
+      <dsp:nvSpPr>
+        <dsp:cNvPr id="0" name=""/>
+        <dsp:cNvSpPr/>
+      </dsp:nvSpPr>
+      <dsp:spPr>
+        <a:xfrm>
+          <a:off x="3109879" y="637"/>
+          <a:ext cx="1320586" cy="1056469"/>
+        </a:xfrm>
+        <a:prstGeom prst="roundRect">
+          <a:avLst>
+            <a:gd name="adj" fmla="val 10000"/>
+          </a:avLst>
+        </a:prstGeom>
+        <a:gradFill rotWithShape="0">
+          <a:gsLst>
+            <a:gs pos="0">
+              <a:schemeClr val="accent1">
+                <a:hueOff val="0"/>
+                <a:satOff val="0"/>
+                <a:lumOff val="0"/>
+                <a:alphaOff val="0"/>
+                <a:tint val="50000"/>
+                <a:shade val="100000"/>
+                <a:alpha val="100000"/>
+                <a:satMod val="150000"/>
+              </a:schemeClr>
+            </a:gs>
+            <a:gs pos="40000">
+              <a:schemeClr val="accent1">
+                <a:hueOff val="0"/>
+                <a:satOff val="0"/>
+                <a:lumOff val="0"/>
+                <a:alphaOff val="0"/>
+                <a:tint val="70000"/>
+                <a:shade val="100000"/>
+                <a:alpha val="100000"/>
+                <a:satMod val="150000"/>
+              </a:schemeClr>
+            </a:gs>
+            <a:gs pos="100000">
+              <a:schemeClr val="accent1">
+                <a:hueOff val="0"/>
+                <a:satOff val="0"/>
+                <a:lumOff val="0"/>
+                <a:alphaOff val="0"/>
+                <a:shade val="90000"/>
+                <a:satMod val="110000"/>
+              </a:schemeClr>
+            </a:gs>
+          </a:gsLst>
+          <a:lin ang="5400000" scaled="0"/>
+        </a:gradFill>
+        <a:ln>
+          <a:noFill/>
+        </a:ln>
+        <a:effectLst>
+          <a:outerShdw blurRad="88900" dist="50800" dir="11400000" sx="102000" sy="101000" algn="tl" rotWithShape="0">
+            <a:srgbClr val="000000">
+              <a:alpha val="35000"/>
+            </a:srgbClr>
+          </a:outerShdw>
+        </a:effectLst>
+        <a:scene3d>
+          <a:camera prst="perspectiveFront" fov="4800000"/>
+          <a:lightRig rig="morning" dir="tl"/>
+        </a:scene3d>
+        <a:sp3d prstMaterial="softmetal">
+          <a:bevelT w="0" h="0"/>
+        </a:sp3d>
+      </dsp:spPr>
+      <dsp:style>
+        <a:lnRef idx="0">
+          <a:scrgbClr r="0" g="0" b="0"/>
+        </a:lnRef>
+        <a:fillRef idx="3">
+          <a:scrgbClr r="0" g="0" b="0"/>
+        </a:fillRef>
+        <a:effectRef idx="2">
+          <a:scrgbClr r="0" g="0" b="0"/>
+        </a:effectRef>
+        <a:fontRef idx="minor">
+          <a:schemeClr val="lt1"/>
+        </a:fontRef>
+      </dsp:style>
+      <dsp:txBody>
+        <a:bodyPr spcFirstLastPara="0" vert="horz" wrap="square" lIns="26670" tIns="26670" rIns="26670" bIns="26670" numCol="1" spcCol="1270" anchor="ctr" anchorCtr="0">
+          <a:noAutofit/>
+        </a:bodyPr>
+        <a:lstStyle/>
+        <a:p>
+          <a:pPr lvl="0" algn="ctr" defTabSz="622300" rtl="0">
+            <a:lnSpc>
+              <a:spcPct val="90000"/>
+            </a:lnSpc>
+            <a:spcBef>
+              <a:spcPct val="0"/>
+            </a:spcBef>
+            <a:spcAft>
+              <a:spcPct val="35000"/>
+            </a:spcAft>
+          </a:pPr>
+          <a:r>
+            <a:rPr lang="en-US" sz="1400" kern="1200" dirty="0" smtClean="0"/>
+            <a:t>The origin and destination airports</a:t>
+          </a:r>
+          <a:endParaRPr lang="en-US" sz="1400" kern="1200" dirty="0"/>
+        </a:p>
+      </dsp:txBody>
+      <dsp:txXfrm>
+        <a:off x="3140822" y="31580"/>
         <a:ext cx="1258700" cy="994583"/>
       </dsp:txXfrm>
     </dsp:sp>
@@ -2129,7 +2136,7 @@
       </dsp:nvSpPr>
       <dsp:spPr>
         <a:xfrm rot="18900000">
-          <a:off x="4188818" y="1379285"/>
+          <a:off x="4127560" y="1379285"/>
           <a:ext cx="1273452" cy="396176"/>
         </a:xfrm>
         <a:prstGeom prst="leftArrow">
@@ -2220,7 +2227,7 @@
       </dsp:nvSpPr>
       <dsp:spPr>
         <a:xfrm>
-          <a:off x="4615485" y="598904"/>
+          <a:off x="4554226" y="598904"/>
           <a:ext cx="1320586" cy="1056469"/>
         </a:xfrm>
         <a:prstGeom prst="roundRect">
@@ -2324,7 +2331,7 @@
         </a:p>
       </dsp:txBody>
       <dsp:txXfrm>
-        <a:off x="4646428" y="629847"/>
+        <a:off x="4585169" y="629847"/>
         <a:ext cx="1258700" cy="994583"/>
       </dsp:txXfrm>
     </dsp:sp>
@@ -2335,7 +2342,7 @@
       </dsp:nvSpPr>
       <dsp:spPr>
         <a:xfrm>
-          <a:off x="4600593" y="2373398"/>
+          <a:off x="4539335" y="2373398"/>
           <a:ext cx="1273452" cy="396176"/>
         </a:xfrm>
         <a:prstGeom prst="leftArrow">
@@ -2426,8 +2433,8 @@
       </dsp:nvSpPr>
       <dsp:spPr>
         <a:xfrm>
-          <a:off x="5213753" y="2043251"/>
-          <a:ext cx="1320586" cy="1056469"/>
+          <a:off x="5029976" y="1999846"/>
+          <a:ext cx="1565621" cy="1143279"/>
         </a:xfrm>
         <a:prstGeom prst="roundRect">
           <a:avLst>
@@ -2530,8 +2537,8 @@
         </a:p>
       </dsp:txBody>
       <dsp:txXfrm>
-        <a:off x="5244696" y="2074194"/>
-        <a:ext cx="1258700" cy="994583"/>
+        <a:off x="5063461" y="2033331"/>
+        <a:ext cx="1498651" cy="1076309"/>
       </dsp:txXfrm>
     </dsp:sp>
   </dsp:spTree>
@@ -4265,6 +4272,98 @@
     <p:extLst>
       <p:ext uri="{BB962C8B-B14F-4D97-AF65-F5344CB8AC3E}">
         <p14:creationId xmlns:p14="http://schemas.microsoft.com/office/powerpoint/2010/main" val="1717480412"/>
+      </p:ext>
+    </p:extLst>
+  </p:cSld>
+  <p:clrMapOvr>
+    <a:masterClrMapping/>
+  </p:clrMapOvr>
+</p:notes>
+</file>
+
+<file path=ppt/notesSlides/notesSlide2.xml><?xml version="1.0" encoding="utf-8"?>
+<p:notes xmlns:a="http://schemas.openxmlformats.org/drawingml/2006/main" xmlns:r="http://schemas.openxmlformats.org/officeDocument/2006/relationships" xmlns:p="http://schemas.openxmlformats.org/presentationml/2006/main">
+  <p:cSld>
+    <p:spTree>
+      <p:nvGrpSpPr>
+        <p:cNvPr id="1" name=""/>
+        <p:cNvGrpSpPr/>
+        <p:nvPr/>
+      </p:nvGrpSpPr>
+      <p:grpSpPr>
+        <a:xfrm>
+          <a:off x="0" y="0"/>
+          <a:ext cx="0" cy="0"/>
+          <a:chOff x="0" y="0"/>
+          <a:chExt cx="0" cy="0"/>
+        </a:xfrm>
+      </p:grpSpPr>
+      <p:sp>
+        <p:nvSpPr>
+          <p:cNvPr id="2" name="Slide Image Placeholder 1"/>
+          <p:cNvSpPr>
+            <a:spLocks noGrp="1" noRot="1" noChangeAspect="1"/>
+          </p:cNvSpPr>
+          <p:nvPr>
+            <p:ph type="sldImg"/>
+          </p:nvPr>
+        </p:nvSpPr>
+        <p:spPr/>
+      </p:sp>
+      <p:sp>
+        <p:nvSpPr>
+          <p:cNvPr id="3" name="Notes Placeholder 2"/>
+          <p:cNvSpPr>
+            <a:spLocks noGrp="1"/>
+          </p:cNvSpPr>
+          <p:nvPr>
+            <p:ph type="body" idx="1"/>
+          </p:nvPr>
+        </p:nvSpPr>
+        <p:spPr/>
+        <p:txBody>
+          <a:bodyPr/>
+          <a:lstStyle/>
+          <a:p>
+            <a:r>
+              <a:rPr lang="en-US" dirty="0" smtClean="0"/>
+              <a:t>Regression</a:t>
+            </a:r>
+            <a:r>
+              <a:rPr lang="en-US" baseline="0" dirty="0" smtClean="0"/>
+              <a:t> was hard to solve; might be better to also use multi-label classification problem for short, medium and long delays, and else add seasonal factors into the feature set</a:t>
+            </a:r>
+            <a:endParaRPr lang="en-US" dirty="0"/>
+          </a:p>
+        </p:txBody>
+      </p:sp>
+      <p:sp>
+        <p:nvSpPr>
+          <p:cNvPr id="4" name="Slide Number Placeholder 3"/>
+          <p:cNvSpPr>
+            <a:spLocks noGrp="1"/>
+          </p:cNvSpPr>
+          <p:nvPr>
+            <p:ph type="sldNum" sz="quarter" idx="10"/>
+          </p:nvPr>
+        </p:nvSpPr>
+        <p:spPr/>
+        <p:txBody>
+          <a:bodyPr/>
+          <a:lstStyle/>
+          <a:p>
+            <a:fld id="{A00DC1EC-C729-8449-8590-D0396952BA3D}" type="slidenum">
+              <a:rPr lang="en-US" smtClean="0"/>
+              <a:t>5</a:t>
+            </a:fld>
+            <a:endParaRPr lang="en-US"/>
+          </a:p>
+        </p:txBody>
+      </p:sp>
+    </p:spTree>
+    <p:extLst>
+      <p:ext uri="{BB962C8B-B14F-4D97-AF65-F5344CB8AC3E}">
+        <p14:creationId xmlns:p14="http://schemas.microsoft.com/office/powerpoint/2010/main" val="1739862489"/>
       </p:ext>
     </p:extLst>
   </p:cSld>
@@ -9594,7 +9693,7 @@
           <a:p>
             <a:r>
               <a:rPr lang="en-US" dirty="0" smtClean="0"/>
-              <a:t>Classification problem, with class imbalance</a:t>
+              <a:t>Binary classification problem, with class imbalance</a:t>
             </a:r>
           </a:p>
           <a:p>
@@ -9653,7 +9752,7 @@
           <p:nvPr>
             <p:extLst>
               <p:ext uri="{D42A27DB-BD31-4B8C-83A1-F6EECF244321}">
-                <p14:modId xmlns:p14="http://schemas.microsoft.com/office/powerpoint/2010/main" val="1170541411"/>
+                <p14:modId xmlns:p14="http://schemas.microsoft.com/office/powerpoint/2010/main" val="972048327"/>
               </p:ext>
             </p:extLst>
           </p:nvPr>
@@ -9734,7 +9833,7 @@
         <p:spPr/>
         <p:txBody>
           <a:bodyPr>
-            <a:normAutofit fontScale="85000" lnSpcReduction="20000"/>
+            <a:normAutofit fontScale="92500" lnSpcReduction="10000"/>
           </a:bodyPr>
           <a:lstStyle/>
           <a:p>
@@ -9751,13 +9850,18 @@
             </a:r>
           </a:p>
           <a:p>
+            <a:pPr lvl="1"/>
             <a:r>
               <a:rPr lang="en-US" dirty="0" smtClean="0"/>
-              <a:t>Delayed departures are the single most important factor in delayed arrivals; flights do catch up some of the lost time but not all of it</a:t>
-            </a:r>
+              <a:t>Length of departure delay in is the single most important factor in length of arrival delay (62% explained variance)</a:t>
+            </a:r>
+            <a:endParaRPr lang="en-US" dirty="0" smtClean="0"/>
+          </a:p>
+          <a:p>
+            <a:pPr lvl="1"/>
             <a:r>
               <a:rPr lang="en-US" dirty="0" smtClean="0"/>
-              <a:t> </a:t>
+              <a:t>Length of departure delay is hard to predict (31% predictable)</a:t>
             </a:r>
             <a:endParaRPr lang="en-US" dirty="0" smtClean="0"/>
           </a:p>
@@ -9771,28 +9875,14 @@
             <a:pPr lvl="1"/>
             <a:r>
               <a:rPr lang="en-US" dirty="0" smtClean="0"/>
-              <a:t>Delay backlog at origin and destination airports</a:t>
+              <a:t>Seasonal factors (time of day, month of year, major holidays)</a:t>
             </a:r>
           </a:p>
           <a:p>
             <a:pPr lvl="1"/>
             <a:r>
               <a:rPr lang="en-US" dirty="0" smtClean="0"/>
-              <a:t>Local weather conditions</a:t>
-            </a:r>
-          </a:p>
-          <a:p>
-            <a:pPr lvl="1"/>
-            <a:r>
-              <a:rPr lang="en-US" dirty="0" smtClean="0"/>
-              <a:t>Seasonal factors</a:t>
-            </a:r>
-          </a:p>
-          <a:p>
-            <a:pPr lvl="1"/>
-            <a:r>
-              <a:rPr lang="en-US" dirty="0" smtClean="0"/>
-              <a:t>Classification of short, medium and long delays</a:t>
+              <a:t>Classification of short (&lt;10min), medium (&lt; 2hrs) and long delays</a:t>
             </a:r>
             <a:endParaRPr lang="en-US" dirty="0" smtClean="0"/>
           </a:p>
@@ -9869,7 +9959,7 @@
             <p:ph idx="1"/>
             <p:extLst>
               <p:ext uri="{D42A27DB-BD31-4B8C-83A1-F6EECF244321}">
-                <p14:modId xmlns:p14="http://schemas.microsoft.com/office/powerpoint/2010/main" val="1747542896"/>
+                <p14:modId xmlns:p14="http://schemas.microsoft.com/office/powerpoint/2010/main" val="1644394988"/>
               </p:ext>
             </p:extLst>
           </p:nvPr>

</xml_diff>